<commit_message>
Update Chapter 9 - Collections and Generics.pptx
</commit_message>
<xml_diff>
--- a/OCP17/Chapter 9 - Collections and Generics.pptx
+++ b/OCP17/Chapter 9 - Collections and Generics.pptx
@@ -5,7 +5,7 @@
     <p:sldMasterId id="2147483648" r:id="rId1"/>
   </p:sldMasterIdLst>
   <p:notesMasterIdLst>
-    <p:notesMasterId r:id="rId44"/>
+    <p:notesMasterId r:id="rId48"/>
   </p:notesMasterIdLst>
   <p:sldIdLst>
     <p:sldId id="256" r:id="rId2"/>
@@ -50,6 +50,10 @@
     <p:sldId id="297" r:id="rId41"/>
     <p:sldId id="298" r:id="rId42"/>
     <p:sldId id="299" r:id="rId43"/>
+    <p:sldId id="300" r:id="rId44"/>
+    <p:sldId id="301" r:id="rId45"/>
+    <p:sldId id="302" r:id="rId46"/>
+    <p:sldId id="303" r:id="rId47"/>
   </p:sldIdLst>
   <p:sldSz cx="12192000" cy="6858000"/>
   <p:notesSz cx="6858000" cy="9144000"/>
@@ -195,6 +199,10 @@
             <p14:sldId id="297"/>
             <p14:sldId id="298"/>
             <p14:sldId id="299"/>
+            <p14:sldId id="300"/>
+            <p14:sldId id="301"/>
+            <p14:sldId id="302"/>
+            <p14:sldId id="303"/>
           </p14:sldIdLst>
         </p14:section>
       </p14:sectionLst>
@@ -1564,6 +1572,202 @@
 </inkml:ink>
 </file>
 
+<file path=ppt/ink/ink43.xml><?xml version="1.0" encoding="utf-8"?>
+<inkml:ink xmlns:inkml="http://www.w3.org/2003/InkML">
+  <inkml:definitions>
+    <inkml:context xml:id="ctx0">
+      <inkml:inkSource xml:id="inkSrc0">
+        <inkml:traceFormat>
+          <inkml:channel name="X" type="integer" min="-2.14748E9" max="2.14748E9" units="cm"/>
+          <inkml:channel name="Y" type="integer" min="-2.14748E9" max="2.14748E9" units="cm"/>
+          <inkml:channel name="F" type="integer" max="32767" units="dev"/>
+        </inkml:traceFormat>
+        <inkml:channelProperties>
+          <inkml:channelProperty channel="X" name="resolution" value="1000" units="1/cm"/>
+          <inkml:channelProperty channel="Y" name="resolution" value="1000" units="1/cm"/>
+          <inkml:channelProperty channel="F" name="resolution" value="0" units="1/dev"/>
+        </inkml:channelProperties>
+      </inkml:inkSource>
+      <inkml:timestamp xml:id="ts0" timeString="2025-12-11T02:10:39.108"/>
+    </inkml:context>
+    <inkml:brush xml:id="br0">
+      <inkml:brushProperty name="width" value="0.35" units="cm"/>
+      <inkml:brushProperty name="height" value="0.35" units="cm"/>
+      <inkml:brushProperty name="color" value="#E71224"/>
+    </inkml:brush>
+  </inkml:definitions>
+  <inkml:trace contextRef="#ctx0" brushRef="#br0">0 0 24575,'51'0'0,"13"0"0,-11 0 0,4 0-492,-3 0 0,2 0 241,7 0 1,3 0 250,7 0 0,1 0 0,-11 0 0,1 0-492,10 0 0,1 0 479,-6 0 0,-4 0 13,-11 0 0,-1 0 196,-1 0 0,-2 0-196,38 0 0,-5 0 0,1 0 0,-13 0 0,-12 0 0,-16 0 0,-7 0 0,-6 0 705,-3 0-705,-1 0 983,-1 0-791,1 0 31,-1 0-223,3 0 0,0 0 0,6 0 0,0 0 0,3 0 0,5 0 0,0 0 0,6 0 0,2 0 0,3 0 0,7 0 0,3 0 0,3 0 0,3 0 0,1 0 0,-3 0 0,-3 3 0,-7 0 0,-2 0 0,-8 0 0,-8-3 0,-2 2 0,-4 0 0,0 1 0,-1-1 0,-6-1 0,0-1 0,-1 0 0,-2 0 0,-1 2 0,-5 1 0,-1-1 0,-1 0 0,-2-2 0,1 0 0,-1 0 0,1 0 0,3 0 0,1 0 0,1 0 0,-1 0 0,1 0 0,1 0 0,1 0 0,1 0 0,2 0 0,0 0 0,-5 0 0,0 0 0,-3 0 0,0 0 0,1 0 0,-1 0 0,-2 0 0,-2 0 0,-1 0 0,-2 0 0,0 0 0,3 0 0,-4 0 0,4 0 0</inkml:trace>
+</inkml:ink>
+</file>
+
+<file path=ppt/ink/ink44.xml><?xml version="1.0" encoding="utf-8"?>
+<inkml:ink xmlns:inkml="http://www.w3.org/2003/InkML">
+  <inkml:definitions>
+    <inkml:context xml:id="ctx0">
+      <inkml:inkSource xml:id="inkSrc0">
+        <inkml:traceFormat>
+          <inkml:channel name="X" type="integer" min="-2.14748E9" max="2.14748E9" units="cm"/>
+          <inkml:channel name="Y" type="integer" min="-2.14748E9" max="2.14748E9" units="cm"/>
+          <inkml:channel name="F" type="integer" max="32767" units="dev"/>
+        </inkml:traceFormat>
+        <inkml:channelProperties>
+          <inkml:channelProperty channel="X" name="resolution" value="1000" units="1/cm"/>
+          <inkml:channelProperty channel="Y" name="resolution" value="1000" units="1/cm"/>
+          <inkml:channelProperty channel="F" name="resolution" value="0" units="1/dev"/>
+        </inkml:channelProperties>
+      </inkml:inkSource>
+      <inkml:timestamp xml:id="ts0" timeString="2025-12-11T02:10:41.533"/>
+    </inkml:context>
+    <inkml:brush xml:id="br0">
+      <inkml:brushProperty name="width" value="0.35" units="cm"/>
+      <inkml:brushProperty name="height" value="0.35" units="cm"/>
+      <inkml:brushProperty name="color" value="#E71224"/>
+    </inkml:brush>
+  </inkml:definitions>
+  <inkml:trace contextRef="#ctx0" brushRef="#br0">0 22 24575,'33'0'0,"-1"0"0,-5 0 0,4 0 0,0 0 0,1 0 0,-1 0 0,-2 0 0,4 0 0,6 0 0,5 0 0,3 0 0,-1 0 0,-1 0 0,0 0 0,1 0 0,-4 0 0,0 0 0,-2 0 0,-2 0 0,-3 0 0,-3 0 0,-2 0 0,2 0 0,3 0 0,2 0 0,1 0 0,-3 0 0,2-2 0,-2-1 0,0 0 0,2-2 0,-3 2 0,-3 0 0,-4 0 0,-5 3 0,2 0 0,1 0 0,0 0 0,-1 0 0,0 0 0,0 0 0,1 0 0,0 0 0,0 0 0,0 0 0,-1 0 0,2 0 0,2 0 0,2 0 0,5 0 0,-1 0 0,4 0 0,2 0 0,1 0 0,1 0 0,-1 0 0,1 0 0,0 0 0,1 0 0,-4 0 0,-4 0 0,0 0 0,0 0 0,5 0 0,4 0 0,-2 0 0,0 0 0,-1 0 0,-2 0 0,3 0 0,-1 0 0,0 0 0,2 0 0,-4 0 0,-1 0 0,-1 0 0,3 0 0,3 0 0,-1 0 0,0 0 0,-1 0 0,-1 0 0,1 0 0,-3 0 0,-3 0 0,1 0 0,-3 0 0,-2 0 0,-2 0 0,-5 0 0,0 0 0,3 0 0,1 0 0,2 0 0,-2 0 0,0 0 0,0 0 0,1 0 0,-1 0 0,-1 0 0,-5 0 0,-1 0 0,0 0 0,0 0 0,5 0 0,1 0 0,4 0 0,2 0 0,2 0 0,2 0 0,1 0 0,0 0 0,1 0 0,-3 0 0,2 0 0,-1 0 0,0 0 0,3 0 0,1 0 0,0 0 0,4 0 0,-3 0 0,-1 0 0,-2 0 0,-4 0 0,2 0 0,-3 0 0,-1 0 0,-1 0 0,-3 0 0,1 0 0,2 0 0,3 0 0,0 0 0,-1 0 0,0 0 0,1 0 0,3 0 0,3 0 0,-3 0 0,1 0 0,-5 0 0,-5 0 0,1 0 0,-6 0 0,2 0 0,-4 0 0,-2 0 0,-2 0 0,-2 0 0,-2 0 0,0 0 0,-1 0 0,-2 0 0,0 0 0,-2 0 0,1 0 0,-1 0 0,1 0 0,-2 0 0,1 2 0,0 0 0</inkml:trace>
+</inkml:ink>
+</file>
+
+<file path=ppt/ink/ink45.xml><?xml version="1.0" encoding="utf-8"?>
+<inkml:ink xmlns:inkml="http://www.w3.org/2003/InkML">
+  <inkml:definitions>
+    <inkml:context xml:id="ctx0">
+      <inkml:inkSource xml:id="inkSrc0">
+        <inkml:traceFormat>
+          <inkml:channel name="X" type="integer" min="-2.14748E9" max="2.14748E9" units="cm"/>
+          <inkml:channel name="Y" type="integer" min="-2.14748E9" max="2.14748E9" units="cm"/>
+          <inkml:channel name="F" type="integer" max="32767" units="dev"/>
+        </inkml:traceFormat>
+        <inkml:channelProperties>
+          <inkml:channelProperty channel="X" name="resolution" value="1000" units="1/cm"/>
+          <inkml:channelProperty channel="Y" name="resolution" value="1000" units="1/cm"/>
+          <inkml:channelProperty channel="F" name="resolution" value="0" units="1/dev"/>
+        </inkml:channelProperties>
+      </inkml:inkSource>
+      <inkml:timestamp xml:id="ts0" timeString="2025-12-11T02:10:43.545"/>
+    </inkml:context>
+    <inkml:brush xml:id="br0">
+      <inkml:brushProperty name="width" value="0.35" units="cm"/>
+      <inkml:brushProperty name="height" value="0.35" units="cm"/>
+      <inkml:brushProperty name="color" value="#E71224"/>
+    </inkml:brush>
+  </inkml:definitions>
+  <inkml:trace contextRef="#ctx0" brushRef="#br0">1 0 24575,'30'0'0,"1"0"0,-8 0 0,4 2 0,3 3 0,3 3 0,2 2 0,-1 0 0,-4 0 0,-3 0 0,-1-3 0,-3-1 0,-4-2 0,-3-1 0,-1 1 0,-1 1 0,-2-1 0,-1-1 0,-2 0 0,-1 0 0,1 3 0,-2-1 0,1 3 0,-2-2 0,-1 1 0,1 2 0,-1-3 0,1 4 0,-2-3 0,0 0 0,3 4 0,-4-3 0,-1 2 0,-16-6 0,0-2 0,-13-2 0,4 0 0,-1 0 0,2 0 0,6 0 0,2 0 0,2 0 0,2 0 0,1 0 0,0 0 0,-1 0 0,0 0 0,1 0 0,0 0 0,0 0 0,1 0 0,-5 0 0,4 0 0,-3 0 0,4 0 0,-2-2 0,1 0 0,0-1 0,-1-1 0,3-1 0,0 0 0,-3-2 0,3 5 0,-3 0 0,-1 1 0,1 1 0,0 0 0,1 0 0,-2 0 0,2 0 0,-4 0 0,5 0 0,-1 0 0,-3 0 0,4 0 0,-3 0 0,0 0 0,-2 0 0</inkml:trace>
+</inkml:ink>
+</file>
+
+<file path=ppt/ink/ink46.xml><?xml version="1.0" encoding="utf-8"?>
+<inkml:ink xmlns:inkml="http://www.w3.org/2003/InkML">
+  <inkml:definitions>
+    <inkml:context xml:id="ctx0">
+      <inkml:inkSource xml:id="inkSrc0">
+        <inkml:traceFormat>
+          <inkml:channel name="X" type="integer" min="-2.14748E9" max="2.14748E9" units="cm"/>
+          <inkml:channel name="Y" type="integer" min="-2.14748E9" max="2.14748E9" units="cm"/>
+          <inkml:channel name="F" type="integer" max="32767" units="dev"/>
+        </inkml:traceFormat>
+        <inkml:channelProperties>
+          <inkml:channelProperty channel="X" name="resolution" value="1000" units="1/cm"/>
+          <inkml:channelProperty channel="Y" name="resolution" value="1000" units="1/cm"/>
+          <inkml:channelProperty channel="F" name="resolution" value="0" units="1/dev"/>
+        </inkml:channelProperties>
+      </inkml:inkSource>
+      <inkml:timestamp xml:id="ts0" timeString="2025-12-11T02:10:45.008"/>
+    </inkml:context>
+    <inkml:brush xml:id="br0">
+      <inkml:brushProperty name="width" value="0.35" units="cm"/>
+      <inkml:brushProperty name="height" value="0.35" units="cm"/>
+      <inkml:brushProperty name="color" value="#E71224"/>
+    </inkml:brush>
+  </inkml:definitions>
+  <inkml:trace contextRef="#ctx0" brushRef="#br0">0 1 24575,'50'4'0,"-2"-1"0,-7-3 0,3 0 0,1 0 0,-8 0 0,-2 0 0,-7 0 0,2 0 0,-1 0 0,-2 0 0,-3 0 0,-3 0 0,0 0 0,-2 2 0,1 0 0,-4 1 0,0-1 0,-3-2 0,-3 0 0,1 0 0,-2 0 0,3 1 0,1 2 0,-1-1 0,1 0 0,-2 0 0,3 0 0,-1 2 0,-1 0 0,1-1 0,-2-2 0,-1-1 0,1 2 0,-2 0 0,1 0 0,0 0 0,-1-1 0,1-1 0</inkml:trace>
+</inkml:ink>
+</file>
+
+<file path=ppt/ink/ink47.xml><?xml version="1.0" encoding="utf-8"?>
+<inkml:ink xmlns:inkml="http://www.w3.org/2003/InkML">
+  <inkml:definitions>
+    <inkml:context xml:id="ctx0">
+      <inkml:inkSource xml:id="inkSrc0">
+        <inkml:traceFormat>
+          <inkml:channel name="X" type="integer" min="-2.14748E9" max="2.14748E9" units="cm"/>
+          <inkml:channel name="Y" type="integer" min="-2.14748E9" max="2.14748E9" units="cm"/>
+          <inkml:channel name="F" type="integer" max="32767" units="dev"/>
+        </inkml:traceFormat>
+        <inkml:channelProperties>
+          <inkml:channelProperty channel="X" name="resolution" value="1000" units="1/cm"/>
+          <inkml:channelProperty channel="Y" name="resolution" value="1000" units="1/cm"/>
+          <inkml:channelProperty channel="F" name="resolution" value="0" units="1/dev"/>
+        </inkml:channelProperties>
+      </inkml:inkSource>
+      <inkml:timestamp xml:id="ts0" timeString="2025-12-11T02:10:49.002"/>
+    </inkml:context>
+    <inkml:brush xml:id="br0">
+      <inkml:brushProperty name="width" value="0.35" units="cm"/>
+      <inkml:brushProperty name="height" value="0.35" units="cm"/>
+      <inkml:brushProperty name="color" value="#E71224"/>
+    </inkml:brush>
+  </inkml:definitions>
+  <inkml:trace contextRef="#ctx0" brushRef="#br0">79 0 24575,'66'0'0,"19"0"0,-36 0 0,3 0-492,10 0 0,3 0 0,8 0 0,1 0 224,-2 0 1,0 0 267,2 0 0,-2 0 0,-9 0 0,-3 0 0,39 0 12,-10 0-12,-7 0 0,-1 0 0,2 0 593,-10 0-593,-11 0 0,-7 0 0,-7 0 983,1 0-715,4 0 379,2 0-647,12 0 0,-5 0 0,5 3 0,4 2 0,-1 4 0,12 2 0,4 5-423,7 1 423,-7 0 0,-3-1 0,-3-3 0,-7 0 0,4-3 0,-8-1 0,-6-3 0,-6-3 0,-6 2 0,-3-3 0,2 1 0,2 2 423,1-2-423,0 0 0,-2 0 0,-2-3 0,-3 0 0,-4 0 0,-1 0 0,-9 0 0,-5 2 0,-1 0 0,-4 1 0,1-1 0,1-2 0,-1 2 0,2 1 0,-1-1 0,2 0 0,2-2 0,0 0 0,2 0 0,0 0 0,-2 0 0,3 0 0,3 0 0,5 0 0,4 0 0,2 0 0,0 0 0,1 0 0,-1-2 0,0-3 0,-2-1 0,-5-2 0,-5 3 0,-6 0 0,-5 0 0,-5 2 0,-5-1 0,-2 0 0,-1 0 0,-2 0 0,-2-6 0,-2 3 0,-2-5 0,-1 1 0,-4 4 0,-3 0 0,-6 3 0,-7 2 0,-1-1 0,-3 1 0,-3 1 0,-5 1 0,-2 0 0,0 0 0,5 0 0,0 0 0,-2 0 0,-5 0 0,-9 0 0,-3 0 0,-1 0 0,-2 0 0,1 0 0,0 0 0,1 0 0,1 0 0,-1 0 0,-1 0 0,-1 0 0,-2 0 0,-14 0 0,-2 2 0,-13 3 0,0 3 0,7 2 0,-1-1 0,11-3 0,-5 0 0,8 3 0,2-2 0,8 0 0,7-2 0,-3-1 0,-1 2 0,-6 0 0,-9 2 0,-2 0 0,-11 1 0,-7 1 0,5 0 0,-12 4 0,2-1 0,6 0 0,-3 0 0,10-1 0,10 0 0,-5-1 0,8 0 0,2-2 0,-4 0 0,6 0 0,1 0 0,3 0 0,4-1 0,5 1 0,4-1 0,5 0 0,3 0 0,3-3 0,7-1 0,1 0 0,1 0 0,-2 0 0,-3 1 0,-1 0 0,-6-2 0,-3 2 0,-5-2 0,-2 3 0,-4-1 0,0 0 0,5 1 0,4-4 0,7 2 0,2 0 0,1 1 0,3 0 0,3 0 0,4-2 0,2-1 0,3 1 0,0-1 0,-2 0 0,0 3 0,-3-1 0,1 0 0,0 0 0,-3 0 0,-1 1 0,-1 0 0,-1 2 0,0-2 0,-2 2 0,1 0 0,0-1 0,2 0 0,1-1 0,2-1 0,4 1 0,3-2 0,4 1 0,2-2 0,-5 0 0,3-2 0,-4 1 0,5-1 0,-1 0 0,0 1 0,4 10 0,6-3 0,12 5 0,8-7 0,7-1 0,1 0 0,2-1 0,4 0 0,6 1 0,0-2 0,0 2 0,3-1 0,2 1 0,10 0 0,9 1 0,4 0 0,12-2 0,8-1-478,0-3 478,7 0 0,-46 0 0,0 0 0,41 0 0,8 0 0,-7 0 0,-3 0 0,4 0 0,-4 0 0,-4 0 0,-9 0 0,-7 0 0,-9-3 0,-9 0 0,-6-2 0,-4 0 0,-2 2 0,1-2 478,-1 2-478,-4 0 0,-2-1 0,-1 1 0,2-3 0,7 1 0,5-1 0,5 1 0,3-1 0,-3 1 0,4 1 0,0 0 0,1 1 0,8 0 0,-2-2 0,0 2 0,-4-1 0,-10 1 0,-2 3 0,-10 0 0,-3 0 0,-5-1 0,-7 1 0,0 0 0,-1 0 0,4 0 0,6-2 0,5 0 0,5-1 0,14 0 0,1 3 0,7 0 0,8-1 0,-6 1 0,8 0 0,-6 0 0,-8 0 0,-3 0 0,-4 0 0,-1 0 0,2 0 0,-5 0 0,-4 0 0,-3 0 0,-4-2 0,-2 0 0,-5-1 0,-1 0 0,-1 3 0,0 0 0,0 0 0,1 0 0,3 0 0,5 0 0,6 0 0,5 0 0,2 0 0,3 0 0,4 0 0,-1 0 0,-3 0 0,-3 0 0,-9 0 0,-6 0 0,-5 0 0,-3 0 0,-2 0 0,1 0 0,-2 0 0,-3 0 0,-1 0 0,-2 0 0,0 0 0,-1 0 0,0 0 0,2 0 0,3 0 0,-1 0 0,0 0 0,1 0 0,1 0 0,0 0 0,-2 0 0,-1 0 0,-4 0 0,-1 0 0,-2 0 0,-3 0 0,-33-3 0,15 2 0,-27-3 0,23 4 0,1 0 0,-4 0 0,2 0 0,0 0 0,0 0 0,6 0 0,-2 0 0,1 0 0,1 0 0,-5 0 0,7 0 0,-2 0 0</inkml:trace>
+</inkml:ink>
+</file>
+
+<file path=ppt/ink/ink48.xml><?xml version="1.0" encoding="utf-8"?>
+<inkml:ink xmlns:inkml="http://www.w3.org/2003/InkML">
+  <inkml:definitions>
+    <inkml:context xml:id="ctx0">
+      <inkml:inkSource xml:id="inkSrc0">
+        <inkml:traceFormat>
+          <inkml:channel name="X" type="integer" min="-2.14748E9" max="2.14748E9" units="cm"/>
+          <inkml:channel name="Y" type="integer" min="-2.14748E9" max="2.14748E9" units="cm"/>
+          <inkml:channel name="F" type="integer" max="32767" units="dev"/>
+        </inkml:traceFormat>
+        <inkml:channelProperties>
+          <inkml:channelProperty channel="X" name="resolution" value="1000" units="1/cm"/>
+          <inkml:channelProperty channel="Y" name="resolution" value="1000" units="1/cm"/>
+          <inkml:channelProperty channel="F" name="resolution" value="0" units="1/dev"/>
+        </inkml:channelProperties>
+      </inkml:inkSource>
+      <inkml:timestamp xml:id="ts0" timeString="2025-12-11T02:10:50.570"/>
+    </inkml:context>
+    <inkml:brush xml:id="br0">
+      <inkml:brushProperty name="width" value="0.35" units="cm"/>
+      <inkml:brushProperty name="height" value="0.35" units="cm"/>
+      <inkml:brushProperty name="color" value="#E71224"/>
+    </inkml:brush>
+  </inkml:definitions>
+  <inkml:trace contextRef="#ctx0" brushRef="#br0">1 131 24575,'41'-5'0,"2"2"0,-8 3 0,10 0 0,13 0 0,-1 0 0,4 0 0,-7 0 0,-11 0 0,0 0 0,-11 0 0,-7 0 0,-4 0 0,-6 0 0,-1 0 0,-3 0 0,-1 0 0,-1 0 0,-23-17 0,6 10 0,-21-15 0,9 15 0,-2-2 0,-1-1 0,1 2 0,2 1 0,1 2 0,1 2 0,0-1 0,0 2 0,3-1 0,1 1 0,0 2 0,0 0 0,-1-1 0,-1-1 0,1-1 0,3 1 0,3 0 0,-2 0 0,4 0 0,-5 0 0,3 2 0,-2 0 0,3 0 0,0 0 0,-7 0 0,3 0 0,-3 0 0,5 0 0,2 0 0,-3 0 0,2 0 0,-2 0 0</inkml:trace>
+</inkml:ink>
+</file>
+
+<file path=ppt/ink/ink49.xml><?xml version="1.0" encoding="utf-8"?>
+<inkml:ink xmlns:inkml="http://www.w3.org/2003/InkML">
+  <inkml:definitions>
+    <inkml:context xml:id="ctx0">
+      <inkml:inkSource xml:id="inkSrc0">
+        <inkml:traceFormat>
+          <inkml:channel name="X" type="integer" min="-2.14748E9" max="2.14748E9" units="cm"/>
+          <inkml:channel name="Y" type="integer" min="-2.14748E9" max="2.14748E9" units="cm"/>
+          <inkml:channel name="F" type="integer" max="32767" units="dev"/>
+        </inkml:traceFormat>
+        <inkml:channelProperties>
+          <inkml:channelProperty channel="X" name="resolution" value="1000" units="1/cm"/>
+          <inkml:channelProperty channel="Y" name="resolution" value="1000" units="1/cm"/>
+          <inkml:channelProperty channel="F" name="resolution" value="0" units="1/dev"/>
+        </inkml:channelProperties>
+      </inkml:inkSource>
+      <inkml:timestamp xml:id="ts0" timeString="2025-12-11T02:10:52.600"/>
+    </inkml:context>
+    <inkml:brush xml:id="br0">
+      <inkml:brushProperty name="width" value="0.35" units="cm"/>
+      <inkml:brushProperty name="height" value="0.35" units="cm"/>
+      <inkml:brushProperty name="color" value="#E71224"/>
+    </inkml:brush>
+  </inkml:definitions>
+  <inkml:trace contextRef="#ctx0" brushRef="#br0">171 90 24575,'40'0'0,"3"0"0,0 0 0,1 0 0,8 0 0,2 0 0,8 0 0,2 0 0,-2 0 0,-4 0 0,-10 0 0,-5 0 0,-10 0 0,-8 0 0,-6 0 0,-7 0 0,-2 0 0,-37-10 0,6 2 0,-30-8 0,16 6 0,-1 3 0,-3-1 0,3 3 0,-1 1 0,2 2 0,4 1 0,-3 0 0,3 1 0,2 0 0,1 0 0,0 0 0,4 0 0,1 0 0,5 0 0,2 0 0,0-2 0,-1 0 0,3-2 0,0 0 0,2 1 0,0 1 0,-1 2 0,2-1 0,-3 1 0,-2 0 0,0 0 0,1 0 0,0 0 0,-2 0 0,2 0 0,-3 0 0,4 0 0,1 0 0,2 0 0,2 2 0,0 0 0,2 5 0,1 1 0</inkml:trace>
+</inkml:ink>
+</file>
+
 <file path=ppt/ink/ink5.xml><?xml version="1.0" encoding="utf-8"?>
 <inkml:ink xmlns:inkml="http://www.w3.org/2003/InkML">
   <inkml:definitions>
@@ -1589,6 +1793,146 @@
     </inkml:brush>
   </inkml:definitions>
   <inkml:trace contextRef="#ctx0" brushRef="#br0">0 1 24575,'83'29'0,"-28"-12"0,2-2 0,32 1-492,-23-6 0,3 0 0,-9-1 0,-1-1 61,-5 0 0,1 0 431,17-3 0,-3-1 0,13 2 0,3-5 0,2-2 0,-1 1 0,6 0 0,8 0 0,-4 0 0,-3 0 0,-9 0 0,-1 0-492,11 0 0,-2 0 0,-11 0 0,-7 0 365,24 0 103,-27 0 0,0 0 24,-18 0 0,-4 0 0,19 0 0,11 0 0,-43 0 0,30 0 983,-20 0-769,33 0-214,-20 0 0,12 0 301,3 0 1,6 0-302,-20 0 0,2 0 0,31 4 0,1 0 0,-28-3 0,-3 0-22,6 3 1,1 0 21,0-4 0,-1 0 0,1 0 0,-1 0 0,-4 0 0,-1 0 0,0 0 0,-1 0-443,-9 0 1,-2 0 442,1-4 0,-2 1-292,32 1 292,8-5 0,-7 7 0,9 0 0,1 0 0,-43 4 0,1 0 439,1-4 1,1 1-440,4 7 0,0-1 0,1-6 0,-2 0 0,-3 3 0,-1-1 0,40-3 0,-2 0 0,-17 0 0,7 0 0,0 0 0,3 0 0,9 7 0,1-5 0,-43 5 0,1 0 0,1-2 0,0-1 0,1 1 0,-1 0 0,-1-1 0,-1-1 983,33-3-909,-3 0-74,-10-6 0,0-2 0,0-6 0,0 6 0,10-6 0,3 6 0,-33 3 0,2 1 0,0 0 0,0 1 0,0 3 0,0 0 0,41-6 0,-13 4 0,-20-4 0,17 6 0,-14 0 0,27 0 0,-18 0 0,18 0 0,-7 0 333,10 0-333,-1 0 0,1 0 0,-43 0 0,1 0 0,1-1 0,0 2 0,10 2 0,1 2 0,-5-1 0,1 1 0,8 3 0,0 1 0,-8-4 0,-1-1-492,9 5 0,1-2 447,-5-6 0,1 0 45,4 3 0,1 0 0,0-4 0,-1 0 0,1 0 0,-1 0 0,1 0 0,0 0 0,-1 0 0,1 0 0,4 0 0,1 0 0,-4 0 0,0 0 0,3 0 0,1 0 0,-5 0 0,-1 0 0,-4 0 0,-1 0 0,0-4 0,-2 0-98,-3 3 0,-1 0 98,-5-3 0,0 1 0,4 3 0,0 0 0,1-4 0,0 0 0,2 3 0,-1 0 0,0-3 0,-2 0 0,-4 4 0,-2 0 129,33 0-129,-3 0 0,10 0-376,5 0 376,-38 0 0,1 0 0,-1 0 0,0 0 0,-5 0 0,0 0 0,0 0 0,-2 0 0,32 0 0,-2-6 983,-10-2-849,1-6-134,-1 0 0,0 6 0,20-6 0,5 12-149,-38-2 0,1 1 149,-2 2 0,2 2 0,4-1 0,0 0 0,-3 0 0,-1 0 0,5 0 0,-1 0 0,-9-3 0,-2-1 56,0 0 1,0-1-57,41-4 0,-43 5 0,4 1-492,29 3 0,1 0 194,-23 0 0,-1 0 298,24 0 0,-3 0 105,2 0-105,-22 0 0,5 0 983,-43-3-759,15 3-224,-30-3 0,2 3 983,5 0 0,13 0 0,-5 0-955,41 6-28,-36 0 0,28 2 0,-35-4 0,-11-7 0,-8-1 0</inkml:trace>
+</inkml:ink>
+</file>
+
+<file path=ppt/ink/ink50.xml><?xml version="1.0" encoding="utf-8"?>
+<inkml:ink xmlns:inkml="http://www.w3.org/2003/InkML">
+  <inkml:definitions>
+    <inkml:context xml:id="ctx0">
+      <inkml:inkSource xml:id="inkSrc0">
+        <inkml:traceFormat>
+          <inkml:channel name="X" type="integer" min="-2.14748E9" max="2.14748E9" units="cm"/>
+          <inkml:channel name="Y" type="integer" min="-2.14748E9" max="2.14748E9" units="cm"/>
+          <inkml:channel name="F" type="integer" max="32767" units="dev"/>
+        </inkml:traceFormat>
+        <inkml:channelProperties>
+          <inkml:channelProperty channel="X" name="resolution" value="1000" units="1/cm"/>
+          <inkml:channelProperty channel="Y" name="resolution" value="1000" units="1/cm"/>
+          <inkml:channelProperty channel="F" name="resolution" value="0" units="1/dev"/>
+        </inkml:channelProperties>
+      </inkml:inkSource>
+      <inkml:timestamp xml:id="ts0" timeString="2025-12-11T02:10:54.204"/>
+    </inkml:context>
+    <inkml:brush xml:id="br0">
+      <inkml:brushProperty name="width" value="0.35" units="cm"/>
+      <inkml:brushProperty name="height" value="0.35" units="cm"/>
+      <inkml:brushProperty name="color" value="#E71224"/>
+    </inkml:brush>
+  </inkml:definitions>
+  <inkml:trace contextRef="#ctx0" brushRef="#br0">235 158 24575,'44'0'0,"9"0"0,10 0 0,-3 0 0,5-2 0,-6-2 0,-3 3 0,2 2 0,-13 5 0,-7 1 0,-8 0 0,-7 0 0,-8 1 0,-6-1 0,-33-2 0,7-3 0,-33-2 0,11 0 0,-7 0 0,2 0 0,7 0 0,3 0 0,2 0 0,-4 0 0,-4 0 0,-1 0 0,-3 0 0,-4 0 0,-1 0 0,-1-2 0,1-4 0,6-2 0,6 0 0,6 1 0,10 2 0,5 1 0,5-2 0,4 0 0,2-2 0,4-4 0,0 1 0,1-3 0,0 2 0,0-2 0,0 0 0,0 2 0,0 1 0,0 2 0,5 0 0,0 2 0,7 1 0,-4 2 0,3 2 0,-3 0 0,0 2 0,4-1 0,-2 1 0,2 0 0,-3 0 0,-1 0 0,0 0 0</inkml:trace>
+</inkml:ink>
+</file>
+
+<file path=ppt/ink/ink51.xml><?xml version="1.0" encoding="utf-8"?>
+<inkml:ink xmlns:inkml="http://www.w3.org/2003/InkML">
+  <inkml:definitions>
+    <inkml:context xml:id="ctx0">
+      <inkml:inkSource xml:id="inkSrc0">
+        <inkml:traceFormat>
+          <inkml:channel name="X" type="integer" min="-2.14748E9" max="2.14748E9" units="cm"/>
+          <inkml:channel name="Y" type="integer" min="-2.14748E9" max="2.14748E9" units="cm"/>
+          <inkml:channel name="F" type="integer" max="32767" units="dev"/>
+        </inkml:traceFormat>
+        <inkml:channelProperties>
+          <inkml:channelProperty channel="X" name="resolution" value="1000" units="1/cm"/>
+          <inkml:channelProperty channel="Y" name="resolution" value="1000" units="1/cm"/>
+          <inkml:channelProperty channel="F" name="resolution" value="0" units="1/dev"/>
+        </inkml:channelProperties>
+      </inkml:inkSource>
+      <inkml:timestamp xml:id="ts0" timeString="2025-12-11T02:11:00.208"/>
+    </inkml:context>
+    <inkml:brush xml:id="br0">
+      <inkml:brushProperty name="width" value="0.35" units="cm"/>
+      <inkml:brushProperty name="height" value="0.35" units="cm"/>
+      <inkml:brushProperty name="color" value="#E71224"/>
+    </inkml:brush>
+  </inkml:definitions>
+  <inkml:trace contextRef="#ctx0" brushRef="#br0">1 9 24575,'71'-5'0,"7"2"0,10 3 0,-34 0 0,3 0-492,6 0 0,2 0 0,7 0 0,2 0 0,3 0 0,-1 0 0,3 0 0,1 0 0,1 0 0,0 0 0,-10 0 0,-1 0 0,-4 0 0,-1 0 0,-4 0 0,-1 0 344,-8 0 1,0 0 638,1 0 1,-1 0 2,41 0-494,-9 0 0,1 0 0,-12 0 0,-9 0 0,-9 0 983,-9 0 0,-1 0 0,-2 0 0,-2 0 0,3 0 0,10 0-191,10 0-792,6 0 0,2 0 0,5 0 0,6 0 0,2 0 0,-2 0 0,-11 0 0,-3 0 0,2 0 0,-9 0 0,-3 0 0,-5 2 0,-1 1 0,6 2 0,-2 2 0,0 2 0,0 0 0,0-1 0,3 1 0,1 0 0,0 3 0,-1 0 0,-5-1 0,-8 0 0,-6-2 0,-3 0 0,1 1 0,4-1 0,1-1 0,4-1 0,2-3 0,0-1 0,-1-1 0,-7 1 0,-1 0 0,-1 0 0,-4-3 0,1 1 0,4 2 0,4 0 0,9-1 0,1 1 0,1 0 0,-5-1 0,-7 1 0,-5-3 0,-9 0 0,-6 0 0,-8 0 0,-5 0 0,-5-1 0,-2-10 0,-2 1 0,-3-4 0,-4 6 0,-4 1 0,-8 2 0,-5-2 0,-6 0 0,-8-2 0,-4-1 0,-4 1 0,-5 0 0,0 1 0,-3-1 0,-16-4 0,-6 4 0,-1 1 0,-4-1 0,12 3 0,-3-3 0,-9 2 0,-1 2 0,0 2 0,5 2 0,8 0 0,7 1 0,9 0 0,7 0 0,3 0 0,7 0 0,-1 0 0,-5 0 0,-6 0 0,-17 0 0,-14 3 0,-13 3-492,36-2 0,-1 2 353,-8 2 1,-2 1 138,-10 2 0,-3 2-492,-8 3 0,-1 1 0,-5 2 0,-1 1 325,-4 1 1,-1 1 166,32-7 0,1 1 0,1 0 0,-23 4 0,1 0 0,5 0 0,2-2-492,5-1 0,2-1 376,6-2 0,1-1 116,-8 3 0,-1-1 0,9 0 0,1-2-308,3-1 0,1 0 308,3-2 0,1-1 0,-35 6 765,1-1-765,14-1 0,1 0 983,10-1 0,6-3-794,8-3 794,9-4-572,3-2 382,6 0-793,0 0 287,6 0-287,6 0 0,3 0 0,3 0 0,3 0 0,1 0 0,0 0 0,-2 0 0,-1 0 0,-2 0 0,-2 0 0,-1 0 0,-2 0 0,-1 0 0,5 0 0,0 0 0,2 0 0,3 0 0,1 0 0,2 0 0,-1 0 0,-4 0 0,0-1 0,0-2 0,0-3 0,2-2 0,2-1 0,2 1 0,5-1 0,2 0 0,0 1 0,8-5 0,7 5 0,8 0 0,7 5 0,2 3 0,7 0 0,15 0 0,13 0 0,9 0 0,14 0-679,3 0 679,-41 0 0,2 0 0,5 0 0,1 0 0,1 2 0,0 0 0,2 1 0,-1 1 0,0 1 0,-2 0 0,35 8 0,-1 4 0,-10 2 0,7 4 0,-37-10 0,1-1 0,-3-1 0,0-2 0,47 10 0,-11-5 0,-5 0 0,-4-4-145,4-3 145,-8-4 0,-7-3 0,-12 0 0,-8 0 0,-2 0 0,-2 0 0,3 0 673,0 0-673,-1 0 151,0 0-151,1 0 0,-1 0 0,0 0 0,3 0 0,0 0 0,0 0 0,-6 0 0,-4 0 0,0 0 0,1 0 0,2 0 0,-2 0 0,-4 0 0,-2 0 0,2 0 0,0 0 0,2-2 0,0-3 0,0-3 0,-4-2 0,-5 3 0,-3 0 0,-6 3 0,-2-1 0,-2 0 0,-4 3 0,-1-2 0,-3-1 0,-2-5 0,-3 2 0,-2-3 0,-5 3 0,1 2 0,-12 2 0,2 0 0,-8 1 0,0 1 0,-6 0 0,-12 2 0,-13 0 0,-22 0 0,-20 0-492,38 0 0,-2 0 452,1 0 1,0 0 39,0 0 0,1 0 0,2 0 0,0 0-338,-45 0 338,49 0 0,0 0 0,-41 0 0,-3 0 0,11 0 0,1 0 0,2 0 0,10 0 0,-15 0 0,2 0 0,7 0 0,-2 0 0,3 0 0,-10 0 0,-7-3 0,1-3 0,-3-2 0,14 0 0,-1 2 0,0 3 0,3 0 0,-7 1 0,2 2 0,-1-1 0,-4 1 0,8 0 0,5 0 0,9 0 0,9 0 983,6 0-922,5 0-61,10 0 357,4 0-357,6 0 0,5 0 0,1 0 0,6 0 0,2 0 0,7 0 0,31 0 0,-3 0 0,43 0 0,-7 0 0,17 0 0,9 0 0,-5 0 0,8 0 0,-13 0 0,-10 0 0,-3 0 0,-3 0 0,7 0 0,3 0 0,-5 0 0,-10 0 0,-8 0 0,-10 0 0,-8 0 0,-6 0 0,-6 0 0,-4 0 0,-3 0 0,-23-17 0,11 6 0,-20-14 0,16 11 0,0 0 0,1-1 0,-2 2 0,0 2 0,0 1 0,-4 4 0,-1-1 0,-2 2 0,-2 1 0,-3-1 0,0 1 0,-3-2 0,-2 2 0,1-3 0,0 0 0,4 1 0,7-1 0,6 1 0,4-1 0,3-5 0,5 5 0,4-1 0,6 6 0,7 2 0,2 0 0,4 0 0,6 0 0,0 0 0,2 0 0,1 0 0,0 0 0,-1 0 0,-3 0 0,-7 0 0,-6 0 0,-7 0 0,-3 0 0,-32 15 0,8-3 0,-25 14 0,19-8 0,2-1 0,1 7 0,2 2 0,3 2 0,2 2 0,6-8 0,2 1 0,3-2 0,-1-3 0,1-2 0,0-2 0,4-2 0,5-1 0,4-3 0,7 0 0,6-1 0,4-1 0,4 2 0,-1-1 0,-3 3 0,-4 1 0,-3 3 0,-6 0 0,-2 2 0,-3 0 0,-3 0 0,-1-1 0,-2-3 0,-1-3 0,-1-1 0,4-1 0,-1-2 0,3-3 0,2-1 0,-3-3 0,3-2 0,-4-1 0,-1 1 0,4 2 0,-42 20 0,13-6 0,-36 13 0,16-9 0,-14 5 0,-6 0 0,1-1 0,4-3 0,15-7 0,-1 1 0,1 2 0,1 1 0,0-1 0,2-1 0,2-3 0,-1 0 0,0 0 0,2 1 0,0-1 0,6-2 0,2-2 0,2 1 0,2-2 0,1 1 0,2 0 0,1-3 0,3 2 0,2-2 0,-3 2 0,1 0 0,-4-2 0,-1 2 0,-1-2 0,-2 3 0,-3 0 0,-4 0 0,0 0 0,1 0 0,-1 2 0,0 1 0,-1-1 0,3-1 0,6 0 0,4-1 0,4 2 0,3-2 0,32-6 0,-6 1 0,28-4 0,-17 1 0,10 0 0,8 0 0,4 1 0,1-1 0,-2 0 0,-6 0 0,-1 1 0,1 2 0,0 0 0,4 0 0,1 0 0,-5 0 0,0 0 0,-2 0 0,-1 0 0,-2 0 0,-1 0 0,-3 0 0,3 2 0,-4 1 0,-3 2 0,1 1 0,0-1 0,2 2 0,1-1 0,-3-3 0,-1 1 0,-2-1 0,-3 0 0,-2-1 0,-2-2 0,-2 0 0,-3 0 0,-4 0 0,-3 0 0,-2 0 0,3-1 0,-4-12 0,0 2 0,-5-12 0,-1 6 0,0 0 0,0-2 0,-2 3 0,-2 1 0,-3 1 0,-3 3 0,-2 1 0,-5 0 0,-2 3 0,-4-1 0,-4 2 0,-1 1 0,-6 2 0,-1 3 0,-2 0 0,-3 0 0,4 0 0,1 0 0,1 0 0,2 0 0,0 0 0,3 0 0,6 0 0,3 0 0,5 0 0,1 0 0,0 0 0,0 2 0,-4 2 0,1 2 0,-4 3 0,-5-1 0,-3 1 0,-7 2 0,-3-1 0,1-1 0,2-3 0,1-1 0,6-1 0,0-1 0,4 1 0,5-2 0,2 1 0,5 0 0,0-1 0,0 0 0,1 0 0,-2-1 0,-1-1 0,-2 1 0,-1-1 0,-1 1 0,0 2 0,2-1 0,1 2 0,0-1 0,1 1 0,-1 1 0,3-3 0,1 0 0,2-2 0,-1 0 0,2 0 0</inkml:trace>
+</inkml:ink>
+</file>
+
+<file path=ppt/ink/ink52.xml><?xml version="1.0" encoding="utf-8"?>
+<inkml:ink xmlns:inkml="http://www.w3.org/2003/InkML">
+  <inkml:definitions>
+    <inkml:context xml:id="ctx0">
+      <inkml:inkSource xml:id="inkSrc0">
+        <inkml:traceFormat>
+          <inkml:channel name="X" type="integer" min="-2.14748E9" max="2.14748E9" units="cm"/>
+          <inkml:channel name="Y" type="integer" min="-2.14748E9" max="2.14748E9" units="cm"/>
+          <inkml:channel name="F" type="integer" max="32767" units="dev"/>
+        </inkml:traceFormat>
+        <inkml:channelProperties>
+          <inkml:channelProperty channel="X" name="resolution" value="1000" units="1/cm"/>
+          <inkml:channelProperty channel="Y" name="resolution" value="1000" units="1/cm"/>
+          <inkml:channelProperty channel="F" name="resolution" value="0" units="1/dev"/>
+        </inkml:channelProperties>
+      </inkml:inkSource>
+      <inkml:timestamp xml:id="ts0" timeString="2025-12-11T02:11:01.620"/>
+    </inkml:context>
+    <inkml:brush xml:id="br0">
+      <inkml:brushProperty name="width" value="0.35" units="cm"/>
+      <inkml:brushProperty name="height" value="0.35" units="cm"/>
+      <inkml:brushProperty name="color" value="#E71224"/>
+    </inkml:brush>
+  </inkml:definitions>
+  <inkml:trace contextRef="#ctx0" brushRef="#br0">1 1 24575,'30'0'0,"-5"0"0,-9 0 0,0 0 0,5 0 0,2 0 0,2 0 0,3 0 0,0 0 0,5 0 0,1 0 0,-3 0 0,-2 0 0,-6 0 0,-1 0 0,0 0 0,-2 0 0,-3 0 0,-2 0 0,-3 0 0,-3 1 0,0 2 0,-1-1 0,3 0 0,-2-2 0,1 0 0,2 0 0,-3 0 0,3 0 0,-4 0 0,0 0 0,3 0 0,-3 0 0,3 0 0,-1 0 0,2 0 0</inkml:trace>
+</inkml:ink>
+</file>
+
+<file path=ppt/ink/ink53.xml><?xml version="1.0" encoding="utf-8"?>
+<inkml:ink xmlns:inkml="http://www.w3.org/2003/InkML">
+  <inkml:definitions>
+    <inkml:context xml:id="ctx0">
+      <inkml:inkSource xml:id="inkSrc0">
+        <inkml:traceFormat>
+          <inkml:channel name="X" type="integer" min="-2.14748E9" max="2.14748E9" units="cm"/>
+          <inkml:channel name="Y" type="integer" min="-2.14748E9" max="2.14748E9" units="cm"/>
+          <inkml:channel name="F" type="integer" max="32767" units="dev"/>
+        </inkml:traceFormat>
+        <inkml:channelProperties>
+          <inkml:channelProperty channel="X" name="resolution" value="1000" units="1/cm"/>
+          <inkml:channelProperty channel="Y" name="resolution" value="1000" units="1/cm"/>
+          <inkml:channelProperty channel="F" name="resolution" value="0" units="1/dev"/>
+        </inkml:channelProperties>
+      </inkml:inkSource>
+      <inkml:timestamp xml:id="ts0" timeString="2025-12-11T02:11:03.154"/>
+    </inkml:context>
+    <inkml:brush xml:id="br0">
+      <inkml:brushProperty name="width" value="0.35" units="cm"/>
+      <inkml:brushProperty name="height" value="0.35" units="cm"/>
+      <inkml:brushProperty name="color" value="#E71224"/>
+    </inkml:brush>
+  </inkml:definitions>
+  <inkml:trace contextRef="#ctx0" brushRef="#br0">1 1 24575,'33'0'0,"3"0"0,-8 0 0,2 0 0,-2 0 0,-2 0 0,1 0 0,-3 0 0,-6 0 0,-1 0 0,-4 0 0,-1 0 0,1 0 0,0 0 0,-1 0 0,-1 0 0,0 0 0,-3 0 0,1 0 0,3 0 0,-4 0 0,4 0 0,-2 0 0,0 0 0,0 0 0,-1 0 0,0 0 0,3 0 0,-2 0 0,2 0 0,-4 0 0,0 0 0,3 0 0,-3 0 0,3 0 0,-3 0 0,0 0 0</inkml:trace>
+</inkml:ink>
+</file>
+
+<file path=ppt/ink/ink54.xml><?xml version="1.0" encoding="utf-8"?>
+<inkml:ink xmlns:inkml="http://www.w3.org/2003/InkML">
+  <inkml:definitions>
+    <inkml:context xml:id="ctx0">
+      <inkml:inkSource xml:id="inkSrc0">
+        <inkml:traceFormat>
+          <inkml:channel name="X" type="integer" min="-2.14748E9" max="2.14748E9" units="cm"/>
+          <inkml:channel name="Y" type="integer" min="-2.14748E9" max="2.14748E9" units="cm"/>
+          <inkml:channel name="F" type="integer" max="32767" units="dev"/>
+        </inkml:traceFormat>
+        <inkml:channelProperties>
+          <inkml:channelProperty channel="X" name="resolution" value="1000" units="1/cm"/>
+          <inkml:channelProperty channel="Y" name="resolution" value="1000" units="1/cm"/>
+          <inkml:channelProperty channel="F" name="resolution" value="0" units="1/dev"/>
+        </inkml:channelProperties>
+      </inkml:inkSource>
+      <inkml:timestamp xml:id="ts0" timeString="2025-12-11T02:11:04.244"/>
+    </inkml:context>
+    <inkml:brush xml:id="br0">
+      <inkml:brushProperty name="width" value="0.35" units="cm"/>
+      <inkml:brushProperty name="height" value="0.35" units="cm"/>
+      <inkml:brushProperty name="color" value="#E71224"/>
+    </inkml:brush>
+  </inkml:definitions>
+  <inkml:trace contextRef="#ctx0" brushRef="#br0">1 1 24575,'39'4'0,"2"0"0,-9-4 0,10 0 0,3 0 0,3 0 0,-3 0 0,-2 0 0,-5 0 0,-2 0 0,-2 0 0,-7 0 0,-4 0 0,-5 0 0,-2 0 0,0 0 0,0 0 0,-2 1 0,-2 1 0,-2 0 0,-2 0 0,1-2 0,3 0 0,-2 2 0,1 0 0,-3 2 0</inkml:trace>
 </inkml:ink>
 </file>
 
@@ -5871,6 +6215,434 @@
     <p:extLst>
       <p:ext uri="{BB962C8B-B14F-4D97-AF65-F5344CB8AC3E}">
         <p14:creationId xmlns:p14="http://schemas.microsoft.com/office/powerpoint/2010/main" val="1661751703"/>
+      </p:ext>
+    </p:extLst>
+  </p:cSld>
+  <p:clrMapOvr>
+    <a:masterClrMapping/>
+  </p:clrMapOvr>
+</p:notes>
+</file>
+
+<file path=ppt/notesSlides/notesSlide42.xml><?xml version="1.0" encoding="utf-8"?>
+<p:notes xmlns:a="http://schemas.openxmlformats.org/drawingml/2006/main" xmlns:r="http://schemas.openxmlformats.org/officeDocument/2006/relationships" xmlns:p="http://schemas.openxmlformats.org/presentationml/2006/main">
+  <p:cSld>
+    <p:spTree>
+      <p:nvGrpSpPr>
+        <p:cNvPr id="1" name="">
+          <a:extLst>
+            <a:ext uri="{FF2B5EF4-FFF2-40B4-BE49-F238E27FC236}">
+              <a16:creationId xmlns:a16="http://schemas.microsoft.com/office/drawing/2014/main" id="{653D2BA0-373F-972C-0590-FA14BF54F8B4}"/>
+            </a:ext>
+          </a:extLst>
+        </p:cNvPr>
+        <p:cNvGrpSpPr/>
+        <p:nvPr/>
+      </p:nvGrpSpPr>
+      <p:grpSpPr>
+        <a:xfrm>
+          <a:off x="0" y="0"/>
+          <a:ext cx="0" cy="0"/>
+          <a:chOff x="0" y="0"/>
+          <a:chExt cx="0" cy="0"/>
+        </a:xfrm>
+      </p:grpSpPr>
+      <p:sp>
+        <p:nvSpPr>
+          <p:cNvPr id="2" name="Slide Image Placeholder 1">
+            <a:extLst>
+              <a:ext uri="{FF2B5EF4-FFF2-40B4-BE49-F238E27FC236}">
+                <a16:creationId xmlns:a16="http://schemas.microsoft.com/office/drawing/2014/main" id="{74870201-60E4-911E-5324-624B4859B0DB}"/>
+              </a:ext>
+            </a:extLst>
+          </p:cNvPr>
+          <p:cNvSpPr>
+            <a:spLocks noGrp="1" noRot="1" noChangeAspect="1"/>
+          </p:cNvSpPr>
+          <p:nvPr>
+            <p:ph type="sldImg"/>
+          </p:nvPr>
+        </p:nvSpPr>
+        <p:spPr/>
+      </p:sp>
+      <p:sp>
+        <p:nvSpPr>
+          <p:cNvPr id="3" name="Notes Placeholder 2">
+            <a:extLst>
+              <a:ext uri="{FF2B5EF4-FFF2-40B4-BE49-F238E27FC236}">
+                <a16:creationId xmlns:a16="http://schemas.microsoft.com/office/drawing/2014/main" id="{8BBFE160-3185-7D8F-2D4B-6A4E5A13BACE}"/>
+              </a:ext>
+            </a:extLst>
+          </p:cNvPr>
+          <p:cNvSpPr>
+            <a:spLocks noGrp="1"/>
+          </p:cNvSpPr>
+          <p:nvPr>
+            <p:ph type="body" idx="1"/>
+          </p:nvPr>
+        </p:nvSpPr>
+        <p:spPr/>
+        <p:txBody>
+          <a:bodyPr/>
+          <a:lstStyle/>
+          <a:p>
+            <a:endParaRPr lang="en-VN"/>
+          </a:p>
+        </p:txBody>
+      </p:sp>
+      <p:sp>
+        <p:nvSpPr>
+          <p:cNvPr id="4" name="Slide Number Placeholder 3">
+            <a:extLst>
+              <a:ext uri="{FF2B5EF4-FFF2-40B4-BE49-F238E27FC236}">
+                <a16:creationId xmlns:a16="http://schemas.microsoft.com/office/drawing/2014/main" id="{3740C6C0-DFD4-B1B1-A719-F9F445B11A04}"/>
+              </a:ext>
+            </a:extLst>
+          </p:cNvPr>
+          <p:cNvSpPr>
+            <a:spLocks noGrp="1"/>
+          </p:cNvSpPr>
+          <p:nvPr>
+            <p:ph type="sldNum" sz="quarter" idx="5"/>
+          </p:nvPr>
+        </p:nvSpPr>
+        <p:spPr/>
+        <p:txBody>
+          <a:bodyPr/>
+          <a:lstStyle/>
+          <a:p>
+            <a:fld id="{576FF3D1-0F45-2240-9B47-75654C02E24A}" type="slidenum">
+              <a:t>43</a:t>
+            </a:fld>
+            <a:endParaRPr lang="en-VN"/>
+          </a:p>
+        </p:txBody>
+      </p:sp>
+    </p:spTree>
+    <p:extLst>
+      <p:ext uri="{BB962C8B-B14F-4D97-AF65-F5344CB8AC3E}">
+        <p14:creationId xmlns:p14="http://schemas.microsoft.com/office/powerpoint/2010/main" val="2734378777"/>
+      </p:ext>
+    </p:extLst>
+  </p:cSld>
+  <p:clrMapOvr>
+    <a:masterClrMapping/>
+  </p:clrMapOvr>
+</p:notes>
+</file>
+
+<file path=ppt/notesSlides/notesSlide43.xml><?xml version="1.0" encoding="utf-8"?>
+<p:notes xmlns:a="http://schemas.openxmlformats.org/drawingml/2006/main" xmlns:r="http://schemas.openxmlformats.org/officeDocument/2006/relationships" xmlns:p="http://schemas.openxmlformats.org/presentationml/2006/main">
+  <p:cSld>
+    <p:spTree>
+      <p:nvGrpSpPr>
+        <p:cNvPr id="1" name="">
+          <a:extLst>
+            <a:ext uri="{FF2B5EF4-FFF2-40B4-BE49-F238E27FC236}">
+              <a16:creationId xmlns:a16="http://schemas.microsoft.com/office/drawing/2014/main" id="{E06BF957-4FEE-6654-7D10-C3EF4D997428}"/>
+            </a:ext>
+          </a:extLst>
+        </p:cNvPr>
+        <p:cNvGrpSpPr/>
+        <p:nvPr/>
+      </p:nvGrpSpPr>
+      <p:grpSpPr>
+        <a:xfrm>
+          <a:off x="0" y="0"/>
+          <a:ext cx="0" cy="0"/>
+          <a:chOff x="0" y="0"/>
+          <a:chExt cx="0" cy="0"/>
+        </a:xfrm>
+      </p:grpSpPr>
+      <p:sp>
+        <p:nvSpPr>
+          <p:cNvPr id="2" name="Slide Image Placeholder 1">
+            <a:extLst>
+              <a:ext uri="{FF2B5EF4-FFF2-40B4-BE49-F238E27FC236}">
+                <a16:creationId xmlns:a16="http://schemas.microsoft.com/office/drawing/2014/main" id="{DB2303C4-8882-7F89-3454-B2B0FAE24530}"/>
+              </a:ext>
+            </a:extLst>
+          </p:cNvPr>
+          <p:cNvSpPr>
+            <a:spLocks noGrp="1" noRot="1" noChangeAspect="1"/>
+          </p:cNvSpPr>
+          <p:nvPr>
+            <p:ph type="sldImg"/>
+          </p:nvPr>
+        </p:nvSpPr>
+        <p:spPr/>
+      </p:sp>
+      <p:sp>
+        <p:nvSpPr>
+          <p:cNvPr id="3" name="Notes Placeholder 2">
+            <a:extLst>
+              <a:ext uri="{FF2B5EF4-FFF2-40B4-BE49-F238E27FC236}">
+                <a16:creationId xmlns:a16="http://schemas.microsoft.com/office/drawing/2014/main" id="{C8209B4C-1ED5-C6FA-6B1B-FDA8A56677E5}"/>
+              </a:ext>
+            </a:extLst>
+          </p:cNvPr>
+          <p:cNvSpPr>
+            <a:spLocks noGrp="1"/>
+          </p:cNvSpPr>
+          <p:nvPr>
+            <p:ph type="body" idx="1"/>
+          </p:nvPr>
+        </p:nvSpPr>
+        <p:spPr/>
+        <p:txBody>
+          <a:bodyPr/>
+          <a:lstStyle/>
+          <a:p>
+            <a:endParaRPr lang="en-VN"/>
+          </a:p>
+        </p:txBody>
+      </p:sp>
+      <p:sp>
+        <p:nvSpPr>
+          <p:cNvPr id="4" name="Slide Number Placeholder 3">
+            <a:extLst>
+              <a:ext uri="{FF2B5EF4-FFF2-40B4-BE49-F238E27FC236}">
+                <a16:creationId xmlns:a16="http://schemas.microsoft.com/office/drawing/2014/main" id="{A72C0DBD-4F38-71B5-3E6F-23D9C688D005}"/>
+              </a:ext>
+            </a:extLst>
+          </p:cNvPr>
+          <p:cNvSpPr>
+            <a:spLocks noGrp="1"/>
+          </p:cNvSpPr>
+          <p:nvPr>
+            <p:ph type="sldNum" sz="quarter" idx="5"/>
+          </p:nvPr>
+        </p:nvSpPr>
+        <p:spPr/>
+        <p:txBody>
+          <a:bodyPr/>
+          <a:lstStyle/>
+          <a:p>
+            <a:fld id="{576FF3D1-0F45-2240-9B47-75654C02E24A}" type="slidenum">
+              <a:t>44</a:t>
+            </a:fld>
+            <a:endParaRPr lang="en-VN"/>
+          </a:p>
+        </p:txBody>
+      </p:sp>
+    </p:spTree>
+    <p:extLst>
+      <p:ext uri="{BB962C8B-B14F-4D97-AF65-F5344CB8AC3E}">
+        <p14:creationId xmlns:p14="http://schemas.microsoft.com/office/powerpoint/2010/main" val="1165252117"/>
+      </p:ext>
+    </p:extLst>
+  </p:cSld>
+  <p:clrMapOvr>
+    <a:masterClrMapping/>
+  </p:clrMapOvr>
+</p:notes>
+</file>
+
+<file path=ppt/notesSlides/notesSlide44.xml><?xml version="1.0" encoding="utf-8"?>
+<p:notes xmlns:a="http://schemas.openxmlformats.org/drawingml/2006/main" xmlns:r="http://schemas.openxmlformats.org/officeDocument/2006/relationships" xmlns:p="http://schemas.openxmlformats.org/presentationml/2006/main">
+  <p:cSld>
+    <p:spTree>
+      <p:nvGrpSpPr>
+        <p:cNvPr id="1" name="">
+          <a:extLst>
+            <a:ext uri="{FF2B5EF4-FFF2-40B4-BE49-F238E27FC236}">
+              <a16:creationId xmlns:a16="http://schemas.microsoft.com/office/drawing/2014/main" id="{6E6A3390-09A4-3695-687C-9A971C764087}"/>
+            </a:ext>
+          </a:extLst>
+        </p:cNvPr>
+        <p:cNvGrpSpPr/>
+        <p:nvPr/>
+      </p:nvGrpSpPr>
+      <p:grpSpPr>
+        <a:xfrm>
+          <a:off x="0" y="0"/>
+          <a:ext cx="0" cy="0"/>
+          <a:chOff x="0" y="0"/>
+          <a:chExt cx="0" cy="0"/>
+        </a:xfrm>
+      </p:grpSpPr>
+      <p:sp>
+        <p:nvSpPr>
+          <p:cNvPr id="2" name="Slide Image Placeholder 1">
+            <a:extLst>
+              <a:ext uri="{FF2B5EF4-FFF2-40B4-BE49-F238E27FC236}">
+                <a16:creationId xmlns:a16="http://schemas.microsoft.com/office/drawing/2014/main" id="{D3F2BB31-1D6C-CEA1-73E9-FA3DA88FBD97}"/>
+              </a:ext>
+            </a:extLst>
+          </p:cNvPr>
+          <p:cNvSpPr>
+            <a:spLocks noGrp="1" noRot="1" noChangeAspect="1"/>
+          </p:cNvSpPr>
+          <p:nvPr>
+            <p:ph type="sldImg"/>
+          </p:nvPr>
+        </p:nvSpPr>
+        <p:spPr/>
+      </p:sp>
+      <p:sp>
+        <p:nvSpPr>
+          <p:cNvPr id="3" name="Notes Placeholder 2">
+            <a:extLst>
+              <a:ext uri="{FF2B5EF4-FFF2-40B4-BE49-F238E27FC236}">
+                <a16:creationId xmlns:a16="http://schemas.microsoft.com/office/drawing/2014/main" id="{1C619BB7-CB14-0E84-74CF-7D85D12B3D54}"/>
+              </a:ext>
+            </a:extLst>
+          </p:cNvPr>
+          <p:cNvSpPr>
+            <a:spLocks noGrp="1"/>
+          </p:cNvSpPr>
+          <p:nvPr>
+            <p:ph type="body" idx="1"/>
+          </p:nvPr>
+        </p:nvSpPr>
+        <p:spPr/>
+        <p:txBody>
+          <a:bodyPr/>
+          <a:lstStyle/>
+          <a:p>
+            <a:endParaRPr lang="en-VN"/>
+          </a:p>
+        </p:txBody>
+      </p:sp>
+      <p:sp>
+        <p:nvSpPr>
+          <p:cNvPr id="4" name="Slide Number Placeholder 3">
+            <a:extLst>
+              <a:ext uri="{FF2B5EF4-FFF2-40B4-BE49-F238E27FC236}">
+                <a16:creationId xmlns:a16="http://schemas.microsoft.com/office/drawing/2014/main" id="{E5528250-3E08-D967-FB77-94400FCA9F02}"/>
+              </a:ext>
+            </a:extLst>
+          </p:cNvPr>
+          <p:cNvSpPr>
+            <a:spLocks noGrp="1"/>
+          </p:cNvSpPr>
+          <p:nvPr>
+            <p:ph type="sldNum" sz="quarter" idx="5"/>
+          </p:nvPr>
+        </p:nvSpPr>
+        <p:spPr/>
+        <p:txBody>
+          <a:bodyPr/>
+          <a:lstStyle/>
+          <a:p>
+            <a:fld id="{576FF3D1-0F45-2240-9B47-75654C02E24A}" type="slidenum">
+              <a:t>45</a:t>
+            </a:fld>
+            <a:endParaRPr lang="en-VN"/>
+          </a:p>
+        </p:txBody>
+      </p:sp>
+    </p:spTree>
+    <p:extLst>
+      <p:ext uri="{BB962C8B-B14F-4D97-AF65-F5344CB8AC3E}">
+        <p14:creationId xmlns:p14="http://schemas.microsoft.com/office/powerpoint/2010/main" val="2255595989"/>
+      </p:ext>
+    </p:extLst>
+  </p:cSld>
+  <p:clrMapOvr>
+    <a:masterClrMapping/>
+  </p:clrMapOvr>
+</p:notes>
+</file>
+
+<file path=ppt/notesSlides/notesSlide45.xml><?xml version="1.0" encoding="utf-8"?>
+<p:notes xmlns:a="http://schemas.openxmlformats.org/drawingml/2006/main" xmlns:r="http://schemas.openxmlformats.org/officeDocument/2006/relationships" xmlns:p="http://schemas.openxmlformats.org/presentationml/2006/main">
+  <p:cSld>
+    <p:spTree>
+      <p:nvGrpSpPr>
+        <p:cNvPr id="1" name="">
+          <a:extLst>
+            <a:ext uri="{FF2B5EF4-FFF2-40B4-BE49-F238E27FC236}">
+              <a16:creationId xmlns:a16="http://schemas.microsoft.com/office/drawing/2014/main" id="{A5C81043-8BB1-2284-4F4F-B02D3C32D50C}"/>
+            </a:ext>
+          </a:extLst>
+        </p:cNvPr>
+        <p:cNvGrpSpPr/>
+        <p:nvPr/>
+      </p:nvGrpSpPr>
+      <p:grpSpPr>
+        <a:xfrm>
+          <a:off x="0" y="0"/>
+          <a:ext cx="0" cy="0"/>
+          <a:chOff x="0" y="0"/>
+          <a:chExt cx="0" cy="0"/>
+        </a:xfrm>
+      </p:grpSpPr>
+      <p:sp>
+        <p:nvSpPr>
+          <p:cNvPr id="2" name="Slide Image Placeholder 1">
+            <a:extLst>
+              <a:ext uri="{FF2B5EF4-FFF2-40B4-BE49-F238E27FC236}">
+                <a16:creationId xmlns:a16="http://schemas.microsoft.com/office/drawing/2014/main" id="{BC6E50D6-B8B1-87D9-77BC-910E336D9D23}"/>
+              </a:ext>
+            </a:extLst>
+          </p:cNvPr>
+          <p:cNvSpPr>
+            <a:spLocks noGrp="1" noRot="1" noChangeAspect="1"/>
+          </p:cNvSpPr>
+          <p:nvPr>
+            <p:ph type="sldImg"/>
+          </p:nvPr>
+        </p:nvSpPr>
+        <p:spPr/>
+      </p:sp>
+      <p:sp>
+        <p:nvSpPr>
+          <p:cNvPr id="3" name="Notes Placeholder 2">
+            <a:extLst>
+              <a:ext uri="{FF2B5EF4-FFF2-40B4-BE49-F238E27FC236}">
+                <a16:creationId xmlns:a16="http://schemas.microsoft.com/office/drawing/2014/main" id="{94A0EA8C-CD18-44DC-4165-422AF473AAD8}"/>
+              </a:ext>
+            </a:extLst>
+          </p:cNvPr>
+          <p:cNvSpPr>
+            <a:spLocks noGrp="1"/>
+          </p:cNvSpPr>
+          <p:nvPr>
+            <p:ph type="body" idx="1"/>
+          </p:nvPr>
+        </p:nvSpPr>
+        <p:spPr/>
+        <p:txBody>
+          <a:bodyPr/>
+          <a:lstStyle/>
+          <a:p>
+            <a:endParaRPr lang="en-VN"/>
+          </a:p>
+        </p:txBody>
+      </p:sp>
+      <p:sp>
+        <p:nvSpPr>
+          <p:cNvPr id="4" name="Slide Number Placeholder 3">
+            <a:extLst>
+              <a:ext uri="{FF2B5EF4-FFF2-40B4-BE49-F238E27FC236}">
+                <a16:creationId xmlns:a16="http://schemas.microsoft.com/office/drawing/2014/main" id="{2022D41D-D6A1-753C-DD78-76AB8CB13ECD}"/>
+              </a:ext>
+            </a:extLst>
+          </p:cNvPr>
+          <p:cNvSpPr>
+            <a:spLocks noGrp="1"/>
+          </p:cNvSpPr>
+          <p:nvPr>
+            <p:ph type="sldNum" sz="quarter" idx="5"/>
+          </p:nvPr>
+        </p:nvSpPr>
+        <p:spPr/>
+        <p:txBody>
+          <a:bodyPr/>
+          <a:lstStyle/>
+          <a:p>
+            <a:fld id="{576FF3D1-0F45-2240-9B47-75654C02E24A}" type="slidenum">
+              <a:t>46</a:t>
+            </a:fld>
+            <a:endParaRPr lang="en-VN"/>
+          </a:p>
+        </p:txBody>
+      </p:sp>
+    </p:spTree>
+    <p:extLst>
+      <p:ext uri="{BB962C8B-B14F-4D97-AF65-F5344CB8AC3E}">
+        <p14:creationId xmlns:p14="http://schemas.microsoft.com/office/powerpoint/2010/main" val="1947062613"/>
       </p:ext>
     </p:extLst>
   </p:cSld>
@@ -30347,11 +31119,92 @@
               <a:rPr lang="en-US" sz="1800">
                 <a:sym typeface="Wingdings" pitchFamily="2" charset="2"/>
               </a:rPr>
-              <a:t>- If we use ... generic, then we can't use </a:t>
-            </a:r>
+              <a:t>- If we use ... generic, then we can't use ... relationship</a:t>
+            </a:r>
+          </a:p>
+          <a:p>
+            <a:pPr algn="l"/>
+            <a:r>
+              <a:rPr lang="en-US" sz="1800">
+                <a:sym typeface="Wingdings" pitchFamily="2" charset="2"/>
+              </a:rPr>
+              <a:t>(code illustration snippet 75)</a:t>
+            </a:r>
+          </a:p>
+          <a:p>
+            <a:pPr algn="l"/>
+            <a:r>
+              <a:rPr lang="en-US" sz="1800">
+                <a:sym typeface="Wingdings" pitchFamily="2" charset="2"/>
+              </a:rPr>
+              <a:t>- Instead, we have to ... generic. This generic is called ...</a:t>
+            </a:r>
+          </a:p>
+          <a:p>
+            <a:pPr algn="l"/>
+            <a:r>
+              <a:rPr lang="en-US" sz="1800">
+                <a:sym typeface="Wingdings" pitchFamily="2" charset="2"/>
+              </a:rPr>
+              <a:t>(code illustration snippet 76)</a:t>
+            </a:r>
+          </a:p>
+          <a:p>
+            <a:pPr algn="l"/>
+            <a:r>
+              <a:rPr lang="en-US" sz="1800">
+                <a:sym typeface="Wingdings" pitchFamily="2" charset="2"/>
+              </a:rPr>
+              <a:t>(code illustration snippet 77)</a:t>
+            </a:r>
+          </a:p>
+          <a:p>
+            <a:pPr algn="l"/>
+            <a:r>
+              <a:rPr lang="en-US" sz="1800">
+                <a:sym typeface="Wingdings" pitchFamily="2" charset="2"/>
+              </a:rPr>
+              <a:t>-  Of course, this also related to type ...</a:t>
+            </a:r>
+          </a:p>
+          <a:p>
+            <a:pPr algn="l"/>
+            <a:endParaRPr lang="en-US" sz="1800">
+              <a:sym typeface="Wingdings" pitchFamily="2" charset="2"/>
+            </a:endParaRPr>
           </a:p>
         </p:txBody>
       </p:sp>
+      <p:pic>
+        <p:nvPicPr>
+          <p:cNvPr id="2" name="Picture 1">
+            <a:extLst>
+              <a:ext uri="{FF2B5EF4-FFF2-40B4-BE49-F238E27FC236}">
+                <a16:creationId xmlns:a16="http://schemas.microsoft.com/office/drawing/2014/main" id="{6D2AC155-6F4C-C6E0-0153-6D56D1AA4CFD}"/>
+              </a:ext>
+            </a:extLst>
+          </p:cNvPr>
+          <p:cNvPicPr>
+            <a:picLocks noChangeAspect="1"/>
+          </p:cNvPicPr>
+          <p:nvPr/>
+        </p:nvPicPr>
+        <p:blipFill>
+          <a:blip r:embed="rId3"/>
+          <a:stretch>
+            <a:fillRect/>
+          </a:stretch>
+        </p:blipFill>
+        <p:spPr>
+          <a:xfrm>
+            <a:off x="3556000" y="3643489"/>
+            <a:ext cx="5080000" cy="2844800"/>
+          </a:xfrm>
+          <a:prstGeom prst="rect">
+            <a:avLst/>
+          </a:prstGeom>
+        </p:spPr>
+      </p:pic>
     </p:spTree>
     <p:extLst>
       <p:ext uri="{BB962C8B-B14F-4D97-AF65-F5344CB8AC3E}">
@@ -30448,6 +31301,3570 @@
                                           <p:spTgt spid="4">
                                             <p:txEl>
                                               <p:pRg st="1" end="1"/>
+                                            </p:txEl>
+                                          </p:spTgt>
+                                        </p:tgtEl>
+                                        <p:attrNameLst>
+                                          <p:attrName>style.visibility</p:attrName>
+                                        </p:attrNameLst>
+                                      </p:cBhvr>
+                                      <p:to>
+                                        <p:strVal val="visible"/>
+                                      </p:to>
+                                    </p:set>
+                                  </p:childTnLst>
+                                </p:cTn>
+                              </p:par>
+                            </p:childTnLst>
+                          </p:cTn>
+                        </p:par>
+                      </p:childTnLst>
+                    </p:cTn>
+                  </p:par>
+                  <p:par>
+                    <p:cTn id="11" fill="hold">
+                      <p:stCondLst>
+                        <p:cond delay="indefinite"/>
+                      </p:stCondLst>
+                      <p:childTnLst>
+                        <p:par>
+                          <p:cTn id="12" fill="hold">
+                            <p:stCondLst>
+                              <p:cond delay="0"/>
+                            </p:stCondLst>
+                            <p:childTnLst>
+                              <p:par>
+                                <p:cTn id="13" presetID="1" presetClass="entr" presetSubtype="0" fill="hold" nodeType="clickEffect">
+                                  <p:stCondLst>
+                                    <p:cond delay="0"/>
+                                  </p:stCondLst>
+                                  <p:childTnLst>
+                                    <p:set>
+                                      <p:cBhvr>
+                                        <p:cTn id="14" dur="1" fill="hold">
+                                          <p:stCondLst>
+                                            <p:cond delay="0"/>
+                                          </p:stCondLst>
+                                        </p:cTn>
+                                        <p:tgtEl>
+                                          <p:spTgt spid="4">
+                                            <p:txEl>
+                                              <p:pRg st="2" end="2"/>
+                                            </p:txEl>
+                                          </p:spTgt>
+                                        </p:tgtEl>
+                                        <p:attrNameLst>
+                                          <p:attrName>style.visibility</p:attrName>
+                                        </p:attrNameLst>
+                                      </p:cBhvr>
+                                      <p:to>
+                                        <p:strVal val="visible"/>
+                                      </p:to>
+                                    </p:set>
+                                  </p:childTnLst>
+                                </p:cTn>
+                              </p:par>
+                            </p:childTnLst>
+                          </p:cTn>
+                        </p:par>
+                      </p:childTnLst>
+                    </p:cTn>
+                  </p:par>
+                  <p:par>
+                    <p:cTn id="15" fill="hold">
+                      <p:stCondLst>
+                        <p:cond delay="indefinite"/>
+                      </p:stCondLst>
+                      <p:childTnLst>
+                        <p:par>
+                          <p:cTn id="16" fill="hold">
+                            <p:stCondLst>
+                              <p:cond delay="0"/>
+                            </p:stCondLst>
+                            <p:childTnLst>
+                              <p:par>
+                                <p:cTn id="17" presetID="1" presetClass="entr" presetSubtype="0" fill="hold" nodeType="clickEffect">
+                                  <p:stCondLst>
+                                    <p:cond delay="0"/>
+                                  </p:stCondLst>
+                                  <p:childTnLst>
+                                    <p:set>
+                                      <p:cBhvr>
+                                        <p:cTn id="18" dur="1" fill="hold">
+                                          <p:stCondLst>
+                                            <p:cond delay="0"/>
+                                          </p:stCondLst>
+                                        </p:cTn>
+                                        <p:tgtEl>
+                                          <p:spTgt spid="4">
+                                            <p:txEl>
+                                              <p:pRg st="3" end="3"/>
+                                            </p:txEl>
+                                          </p:spTgt>
+                                        </p:tgtEl>
+                                        <p:attrNameLst>
+                                          <p:attrName>style.visibility</p:attrName>
+                                        </p:attrNameLst>
+                                      </p:cBhvr>
+                                      <p:to>
+                                        <p:strVal val="visible"/>
+                                      </p:to>
+                                    </p:set>
+                                  </p:childTnLst>
+                                </p:cTn>
+                              </p:par>
+                            </p:childTnLst>
+                          </p:cTn>
+                        </p:par>
+                      </p:childTnLst>
+                    </p:cTn>
+                  </p:par>
+                  <p:par>
+                    <p:cTn id="19" fill="hold">
+                      <p:stCondLst>
+                        <p:cond delay="indefinite"/>
+                      </p:stCondLst>
+                      <p:childTnLst>
+                        <p:par>
+                          <p:cTn id="20" fill="hold">
+                            <p:stCondLst>
+                              <p:cond delay="0"/>
+                            </p:stCondLst>
+                            <p:childTnLst>
+                              <p:par>
+                                <p:cTn id="21" presetID="1" presetClass="entr" presetSubtype="0" fill="hold" nodeType="clickEffect">
+                                  <p:stCondLst>
+                                    <p:cond delay="0"/>
+                                  </p:stCondLst>
+                                  <p:childTnLst>
+                                    <p:set>
+                                      <p:cBhvr>
+                                        <p:cTn id="22" dur="1" fill="hold">
+                                          <p:stCondLst>
+                                            <p:cond delay="0"/>
+                                          </p:stCondLst>
+                                        </p:cTn>
+                                        <p:tgtEl>
+                                          <p:spTgt spid="4">
+                                            <p:txEl>
+                                              <p:pRg st="4" end="4"/>
+                                            </p:txEl>
+                                          </p:spTgt>
+                                        </p:tgtEl>
+                                        <p:attrNameLst>
+                                          <p:attrName>style.visibility</p:attrName>
+                                        </p:attrNameLst>
+                                      </p:cBhvr>
+                                      <p:to>
+                                        <p:strVal val="visible"/>
+                                      </p:to>
+                                    </p:set>
+                                  </p:childTnLst>
+                                </p:cTn>
+                              </p:par>
+                            </p:childTnLst>
+                          </p:cTn>
+                        </p:par>
+                      </p:childTnLst>
+                    </p:cTn>
+                  </p:par>
+                  <p:par>
+                    <p:cTn id="23" fill="hold">
+                      <p:stCondLst>
+                        <p:cond delay="indefinite"/>
+                      </p:stCondLst>
+                      <p:childTnLst>
+                        <p:par>
+                          <p:cTn id="24" fill="hold">
+                            <p:stCondLst>
+                              <p:cond delay="0"/>
+                            </p:stCondLst>
+                            <p:childTnLst>
+                              <p:par>
+                                <p:cTn id="25" presetID="1" presetClass="entr" presetSubtype="0" fill="hold" nodeType="clickEffect">
+                                  <p:stCondLst>
+                                    <p:cond delay="0"/>
+                                  </p:stCondLst>
+                                  <p:childTnLst>
+                                    <p:set>
+                                      <p:cBhvr>
+                                        <p:cTn id="26" dur="1" fill="hold">
+                                          <p:stCondLst>
+                                            <p:cond delay="0"/>
+                                          </p:stCondLst>
+                                        </p:cTn>
+                                        <p:tgtEl>
+                                          <p:spTgt spid="4">
+                                            <p:txEl>
+                                              <p:pRg st="5" end="5"/>
+                                            </p:txEl>
+                                          </p:spTgt>
+                                        </p:tgtEl>
+                                        <p:attrNameLst>
+                                          <p:attrName>style.visibility</p:attrName>
+                                        </p:attrNameLst>
+                                      </p:cBhvr>
+                                      <p:to>
+                                        <p:strVal val="visible"/>
+                                      </p:to>
+                                    </p:set>
+                                  </p:childTnLst>
+                                </p:cTn>
+                              </p:par>
+                            </p:childTnLst>
+                          </p:cTn>
+                        </p:par>
+                      </p:childTnLst>
+                    </p:cTn>
+                  </p:par>
+                  <p:par>
+                    <p:cTn id="27" fill="hold">
+                      <p:stCondLst>
+                        <p:cond delay="indefinite"/>
+                      </p:stCondLst>
+                      <p:childTnLst>
+                        <p:par>
+                          <p:cTn id="28" fill="hold">
+                            <p:stCondLst>
+                              <p:cond delay="0"/>
+                            </p:stCondLst>
+                            <p:childTnLst>
+                              <p:par>
+                                <p:cTn id="29" presetID="1" presetClass="entr" presetSubtype="0" fill="hold" nodeType="clickEffect">
+                                  <p:stCondLst>
+                                    <p:cond delay="0"/>
+                                  </p:stCondLst>
+                                  <p:childTnLst>
+                                    <p:set>
+                                      <p:cBhvr>
+                                        <p:cTn id="30" dur="1" fill="hold">
+                                          <p:stCondLst>
+                                            <p:cond delay="0"/>
+                                          </p:stCondLst>
+                                        </p:cTn>
+                                        <p:tgtEl>
+                                          <p:spTgt spid="4">
+                                            <p:txEl>
+                                              <p:pRg st="6" end="6"/>
+                                            </p:txEl>
+                                          </p:spTgt>
+                                        </p:tgtEl>
+                                        <p:attrNameLst>
+                                          <p:attrName>style.visibility</p:attrName>
+                                        </p:attrNameLst>
+                                      </p:cBhvr>
+                                      <p:to>
+                                        <p:strVal val="visible"/>
+                                      </p:to>
+                                    </p:set>
+                                  </p:childTnLst>
+                                </p:cTn>
+                              </p:par>
+                            </p:childTnLst>
+                          </p:cTn>
+                        </p:par>
+                      </p:childTnLst>
+                    </p:cTn>
+                  </p:par>
+                  <p:par>
+                    <p:cTn id="31" fill="hold">
+                      <p:stCondLst>
+                        <p:cond delay="indefinite"/>
+                      </p:stCondLst>
+                      <p:childTnLst>
+                        <p:par>
+                          <p:cTn id="32" fill="hold">
+                            <p:stCondLst>
+                              <p:cond delay="0"/>
+                            </p:stCondLst>
+                            <p:childTnLst>
+                              <p:par>
+                                <p:cTn id="33" presetID="1" presetClass="entr" presetSubtype="0" fill="hold" nodeType="clickEffect">
+                                  <p:stCondLst>
+                                    <p:cond delay="0"/>
+                                  </p:stCondLst>
+                                  <p:childTnLst>
+                                    <p:set>
+                                      <p:cBhvr>
+                                        <p:cTn id="34" dur="1" fill="hold">
+                                          <p:stCondLst>
+                                            <p:cond delay="0"/>
+                                          </p:stCondLst>
+                                        </p:cTn>
+                                        <p:tgtEl>
+                                          <p:spTgt spid="2"/>
+                                        </p:tgtEl>
+                                        <p:attrNameLst>
+                                          <p:attrName>style.visibility</p:attrName>
+                                        </p:attrNameLst>
+                                      </p:cBhvr>
+                                      <p:to>
+                                        <p:strVal val="visible"/>
+                                      </p:to>
+                                    </p:set>
+                                  </p:childTnLst>
+                                </p:cTn>
+                              </p:par>
+                            </p:childTnLst>
+                          </p:cTn>
+                        </p:par>
+                      </p:childTnLst>
+                    </p:cTn>
+                  </p:par>
+                </p:childTnLst>
+              </p:cTn>
+              <p:prevCondLst>
+                <p:cond evt="onPrev" delay="0">
+                  <p:tgtEl>
+                    <p:sldTgt/>
+                  </p:tgtEl>
+                </p:cond>
+              </p:prevCondLst>
+              <p:nextCondLst>
+                <p:cond evt="onNext" delay="0">
+                  <p:tgtEl>
+                    <p:sldTgt/>
+                  </p:tgtEl>
+                </p:cond>
+              </p:nextCondLst>
+            </p:seq>
+          </p:childTnLst>
+        </p:cTn>
+      </p:par>
+    </p:tnLst>
+  </p:timing>
+</p:sld>
+</file>
+
+<file path=ppt/slides/slide43.xml><?xml version="1.0" encoding="utf-8"?>
+<p:sld xmlns:a="http://schemas.openxmlformats.org/drawingml/2006/main" xmlns:r="http://schemas.openxmlformats.org/officeDocument/2006/relationships" xmlns:p="http://schemas.openxmlformats.org/presentationml/2006/main">
+  <p:cSld>
+    <p:spTree>
+      <p:nvGrpSpPr>
+        <p:cNvPr id="1" name="">
+          <a:extLst>
+            <a:ext uri="{FF2B5EF4-FFF2-40B4-BE49-F238E27FC236}">
+              <a16:creationId xmlns:a16="http://schemas.microsoft.com/office/drawing/2014/main" id="{FCD88041-BED6-7D3D-B4EB-59F75ED7CC2F}"/>
+            </a:ext>
+          </a:extLst>
+        </p:cNvPr>
+        <p:cNvGrpSpPr/>
+        <p:nvPr/>
+      </p:nvGrpSpPr>
+      <p:grpSpPr>
+        <a:xfrm>
+          <a:off x="0" y="0"/>
+          <a:ext cx="0" cy="0"/>
+          <a:chOff x="0" y="0"/>
+          <a:chExt cx="0" cy="0"/>
+        </a:xfrm>
+      </p:grpSpPr>
+      <p:sp>
+        <p:nvSpPr>
+          <p:cNvPr id="3" name="Subtitle 2">
+            <a:extLst>
+              <a:ext uri="{FF2B5EF4-FFF2-40B4-BE49-F238E27FC236}">
+                <a16:creationId xmlns:a16="http://schemas.microsoft.com/office/drawing/2014/main" id="{384FE267-4CB0-5C82-CCA5-E45B341FB97D}"/>
+              </a:ext>
+            </a:extLst>
+          </p:cNvPr>
+          <p:cNvSpPr>
+            <a:spLocks noGrp="1"/>
+          </p:cNvSpPr>
+          <p:nvPr>
+            <p:ph type="subTitle" idx="1"/>
+          </p:nvPr>
+        </p:nvSpPr>
+        <p:spPr>
+          <a:xfrm>
+            <a:off x="152399" y="217488"/>
+            <a:ext cx="11223171" cy="303212"/>
+          </a:xfrm>
+        </p:spPr>
+        <p:txBody>
+          <a:bodyPr>
+            <a:normAutofit fontScale="92500" lnSpcReduction="20000"/>
+          </a:bodyPr>
+          <a:lstStyle/>
+          <a:p>
+            <a:r>
+              <a:rPr lang="en-US" sz="1800" b="1"/>
+              <a:t>Chapter 9 – Collections and Generics</a:t>
+            </a:r>
+          </a:p>
+        </p:txBody>
+      </p:sp>
+      <p:sp>
+        <p:nvSpPr>
+          <p:cNvPr id="4" name="Subtitle 2">
+            <a:extLst>
+              <a:ext uri="{FF2B5EF4-FFF2-40B4-BE49-F238E27FC236}">
+                <a16:creationId xmlns:a16="http://schemas.microsoft.com/office/drawing/2014/main" id="{54668BB1-D944-1752-1A14-0B57309458C8}"/>
+              </a:ext>
+            </a:extLst>
+          </p:cNvPr>
+          <p:cNvSpPr txBox="1">
+            <a:spLocks/>
+          </p:cNvSpPr>
+          <p:nvPr/>
+        </p:nvSpPr>
+        <p:spPr>
+          <a:xfrm>
+            <a:off x="0" y="820738"/>
+            <a:ext cx="12192000" cy="6037262"/>
+          </a:xfrm>
+          <a:prstGeom prst="rect">
+            <a:avLst/>
+          </a:prstGeom>
+        </p:spPr>
+        <p:txBody>
+          <a:bodyPr vert="horz" lIns="91440" tIns="45720" rIns="91440" bIns="45720" rtlCol="0">
+            <a:normAutofit/>
+          </a:bodyPr>
+          <a:lstStyle>
+            <a:lvl1pPr marL="0" indent="0" algn="ctr" defTabSz="914400" rtl="0" eaLnBrk="1" latinLnBrk="0" hangingPunct="1">
+              <a:lnSpc>
+                <a:spcPct val="90000"/>
+              </a:lnSpc>
+              <a:spcBef>
+                <a:spcPts val="1000"/>
+              </a:spcBef>
+              <a:buFont typeface="Arial" panose="020B0604020202020204" pitchFamily="34" charset="0"/>
+              <a:buNone/>
+              <a:defRPr sz="2400" kern="1200">
+                <a:solidFill>
+                  <a:schemeClr val="tx1"/>
+                </a:solidFill>
+                <a:latin typeface="+mn-lt"/>
+                <a:ea typeface="+mn-ea"/>
+                <a:cs typeface="+mn-cs"/>
+              </a:defRPr>
+            </a:lvl1pPr>
+            <a:lvl2pPr marL="457200" indent="0" algn="ctr" defTabSz="914400" rtl="0" eaLnBrk="1" latinLnBrk="0" hangingPunct="1">
+              <a:lnSpc>
+                <a:spcPct val="90000"/>
+              </a:lnSpc>
+              <a:spcBef>
+                <a:spcPts val="500"/>
+              </a:spcBef>
+              <a:buFont typeface="Arial" panose="020B0604020202020204" pitchFamily="34" charset="0"/>
+              <a:buNone/>
+              <a:defRPr sz="2000" kern="1200">
+                <a:solidFill>
+                  <a:schemeClr val="tx1"/>
+                </a:solidFill>
+                <a:latin typeface="+mn-lt"/>
+                <a:ea typeface="+mn-ea"/>
+                <a:cs typeface="+mn-cs"/>
+              </a:defRPr>
+            </a:lvl2pPr>
+            <a:lvl3pPr marL="914400" indent="0" algn="ctr" defTabSz="914400" rtl="0" eaLnBrk="1" latinLnBrk="0" hangingPunct="1">
+              <a:lnSpc>
+                <a:spcPct val="90000"/>
+              </a:lnSpc>
+              <a:spcBef>
+                <a:spcPts val="500"/>
+              </a:spcBef>
+              <a:buFont typeface="Arial" panose="020B0604020202020204" pitchFamily="34" charset="0"/>
+              <a:buNone/>
+              <a:defRPr sz="1800" kern="1200">
+                <a:solidFill>
+                  <a:schemeClr val="tx1"/>
+                </a:solidFill>
+                <a:latin typeface="+mn-lt"/>
+                <a:ea typeface="+mn-ea"/>
+                <a:cs typeface="+mn-cs"/>
+              </a:defRPr>
+            </a:lvl3pPr>
+            <a:lvl4pPr marL="1371600" indent="0" algn="ctr" defTabSz="914400" rtl="0" eaLnBrk="1" latinLnBrk="0" hangingPunct="1">
+              <a:lnSpc>
+                <a:spcPct val="90000"/>
+              </a:lnSpc>
+              <a:spcBef>
+                <a:spcPts val="500"/>
+              </a:spcBef>
+              <a:buFont typeface="Arial" panose="020B0604020202020204" pitchFamily="34" charset="0"/>
+              <a:buNone/>
+              <a:defRPr sz="1600" kern="1200">
+                <a:solidFill>
+                  <a:schemeClr val="tx1"/>
+                </a:solidFill>
+                <a:latin typeface="+mn-lt"/>
+                <a:ea typeface="+mn-ea"/>
+                <a:cs typeface="+mn-cs"/>
+              </a:defRPr>
+            </a:lvl4pPr>
+            <a:lvl5pPr marL="1828800" indent="0" algn="ctr" defTabSz="914400" rtl="0" eaLnBrk="1" latinLnBrk="0" hangingPunct="1">
+              <a:lnSpc>
+                <a:spcPct val="90000"/>
+              </a:lnSpc>
+              <a:spcBef>
+                <a:spcPts val="500"/>
+              </a:spcBef>
+              <a:buFont typeface="Arial" panose="020B0604020202020204" pitchFamily="34" charset="0"/>
+              <a:buNone/>
+              <a:defRPr sz="1600" kern="1200">
+                <a:solidFill>
+                  <a:schemeClr val="tx1"/>
+                </a:solidFill>
+                <a:latin typeface="+mn-lt"/>
+                <a:ea typeface="+mn-ea"/>
+                <a:cs typeface="+mn-cs"/>
+              </a:defRPr>
+            </a:lvl5pPr>
+            <a:lvl6pPr marL="2286000" indent="0" algn="ctr" defTabSz="914400" rtl="0" eaLnBrk="1" latinLnBrk="0" hangingPunct="1">
+              <a:lnSpc>
+                <a:spcPct val="90000"/>
+              </a:lnSpc>
+              <a:spcBef>
+                <a:spcPts val="500"/>
+              </a:spcBef>
+              <a:buFont typeface="Arial" panose="020B0604020202020204" pitchFamily="34" charset="0"/>
+              <a:buNone/>
+              <a:defRPr sz="1600" kern="1200">
+                <a:solidFill>
+                  <a:schemeClr val="tx1"/>
+                </a:solidFill>
+                <a:latin typeface="+mn-lt"/>
+                <a:ea typeface="+mn-ea"/>
+                <a:cs typeface="+mn-cs"/>
+              </a:defRPr>
+            </a:lvl6pPr>
+            <a:lvl7pPr marL="2743200" indent="0" algn="ctr" defTabSz="914400" rtl="0" eaLnBrk="1" latinLnBrk="0" hangingPunct="1">
+              <a:lnSpc>
+                <a:spcPct val="90000"/>
+              </a:lnSpc>
+              <a:spcBef>
+                <a:spcPts val="500"/>
+              </a:spcBef>
+              <a:buFont typeface="Arial" panose="020B0604020202020204" pitchFamily="34" charset="0"/>
+              <a:buNone/>
+              <a:defRPr sz="1600" kern="1200">
+                <a:solidFill>
+                  <a:schemeClr val="tx1"/>
+                </a:solidFill>
+                <a:latin typeface="+mn-lt"/>
+                <a:ea typeface="+mn-ea"/>
+                <a:cs typeface="+mn-cs"/>
+              </a:defRPr>
+            </a:lvl7pPr>
+            <a:lvl8pPr marL="3200400" indent="0" algn="ctr" defTabSz="914400" rtl="0" eaLnBrk="1" latinLnBrk="0" hangingPunct="1">
+              <a:lnSpc>
+                <a:spcPct val="90000"/>
+              </a:lnSpc>
+              <a:spcBef>
+                <a:spcPts val="500"/>
+              </a:spcBef>
+              <a:buFont typeface="Arial" panose="020B0604020202020204" pitchFamily="34" charset="0"/>
+              <a:buNone/>
+              <a:defRPr sz="1600" kern="1200">
+                <a:solidFill>
+                  <a:schemeClr val="tx1"/>
+                </a:solidFill>
+                <a:latin typeface="+mn-lt"/>
+                <a:ea typeface="+mn-ea"/>
+                <a:cs typeface="+mn-cs"/>
+              </a:defRPr>
+            </a:lvl8pPr>
+            <a:lvl9pPr marL="3657600" indent="0" algn="ctr" defTabSz="914400" rtl="0" eaLnBrk="1" latinLnBrk="0" hangingPunct="1">
+              <a:lnSpc>
+                <a:spcPct val="90000"/>
+              </a:lnSpc>
+              <a:spcBef>
+                <a:spcPts val="500"/>
+              </a:spcBef>
+              <a:buFont typeface="Arial" panose="020B0604020202020204" pitchFamily="34" charset="0"/>
+              <a:buNone/>
+              <a:defRPr sz="1600" kern="1200">
+                <a:solidFill>
+                  <a:schemeClr val="tx1"/>
+                </a:solidFill>
+                <a:latin typeface="+mn-lt"/>
+                <a:ea typeface="+mn-ea"/>
+                <a:cs typeface="+mn-cs"/>
+              </a:defRPr>
+            </a:lvl9pPr>
+          </a:lstStyle>
+          <a:p>
+            <a:pPr algn="l"/>
+            <a:r>
+              <a:rPr lang="en-US" sz="1800">
+                <a:sym typeface="Wingdings" pitchFamily="2" charset="2"/>
+              </a:rPr>
+              <a:t>- Same with ... wildcard, ... wildcard can also be ...ed. However, the problem is that it requires ... so that it can ... =&gt; If we ... the ... wildcard =&gt; No ... =&gt; Useless (but we still can ... element)</a:t>
+            </a:r>
+          </a:p>
+          <a:p>
+            <a:pPr algn="l"/>
+            <a:r>
+              <a:rPr lang="en-US" sz="1800">
+                <a:sym typeface="Wingdings" pitchFamily="2" charset="2"/>
+              </a:rPr>
+              <a:t>(code illustration snippet 78)</a:t>
+            </a:r>
+          </a:p>
+          <a:p>
+            <a:pPr algn="l"/>
+            <a:r>
+              <a:rPr lang="en-US" sz="1800">
+                <a:sym typeface="Wingdings" pitchFamily="2" charset="2"/>
+              </a:rPr>
+              <a:t>(code illustration snippet 79)</a:t>
+            </a:r>
+          </a:p>
+          <a:p>
+            <a:pPr algn="l"/>
+            <a:r>
+              <a:rPr lang="en-US" sz="1800">
+                <a:sym typeface="Wingdings" pitchFamily="2" charset="2"/>
+              </a:rPr>
+              <a:t>- Why do we use ... keyword ? instead of ... and ... for ... and ... ?</a:t>
+            </a:r>
+          </a:p>
+          <a:p>
+            <a:pPr algn="l"/>
+            <a:r>
+              <a:rPr lang="en-US" sz="1800">
+                <a:sym typeface="Wingdings" pitchFamily="2" charset="2"/>
+              </a:rPr>
+              <a:t>- Because they keyword ... merely represent ...</a:t>
+            </a:r>
+          </a:p>
+          <a:p>
+            <a:pPr algn="l"/>
+            <a:r>
+              <a:rPr lang="en-US" sz="1800" b="1">
+                <a:sym typeface="Wingdings" pitchFamily="2" charset="2"/>
+              </a:rPr>
+              <a:t>Creating Lower-bounded Wildcards</a:t>
+            </a:r>
+            <a:endParaRPr lang="en-US" sz="1800">
+              <a:sym typeface="Wingdings" pitchFamily="2" charset="2"/>
+            </a:endParaRPr>
+          </a:p>
+          <a:p>
+            <a:pPr algn="l"/>
+            <a:r>
+              <a:rPr lang="en-US" sz="1800">
+                <a:sym typeface="Wingdings" pitchFamily="2" charset="2"/>
+              </a:rPr>
+              <a:t> </a:t>
+            </a:r>
+          </a:p>
+        </p:txBody>
+      </p:sp>
+      <p:pic>
+        <p:nvPicPr>
+          <p:cNvPr id="5" name="Picture 4">
+            <a:extLst>
+              <a:ext uri="{FF2B5EF4-FFF2-40B4-BE49-F238E27FC236}">
+                <a16:creationId xmlns:a16="http://schemas.microsoft.com/office/drawing/2014/main" id="{139BFA1D-E0F9-C26C-78CC-1968BA8F5E06}"/>
+              </a:ext>
+            </a:extLst>
+          </p:cNvPr>
+          <p:cNvPicPr>
+            <a:picLocks noChangeAspect="1"/>
+          </p:cNvPicPr>
+          <p:nvPr/>
+        </p:nvPicPr>
+        <p:blipFill>
+          <a:blip r:embed="rId3"/>
+          <a:stretch>
+            <a:fillRect/>
+          </a:stretch>
+        </p:blipFill>
+        <p:spPr>
+          <a:xfrm>
+            <a:off x="2533650" y="3664656"/>
+            <a:ext cx="7124700" cy="2260600"/>
+          </a:xfrm>
+          <a:prstGeom prst="rect">
+            <a:avLst/>
+          </a:prstGeom>
+        </p:spPr>
+      </p:pic>
+    </p:spTree>
+    <p:extLst>
+      <p:ext uri="{BB962C8B-B14F-4D97-AF65-F5344CB8AC3E}">
+        <p14:creationId xmlns:p14="http://schemas.microsoft.com/office/powerpoint/2010/main" val="1149802802"/>
+      </p:ext>
+    </p:extLst>
+  </p:cSld>
+  <p:clrMapOvr>
+    <a:masterClrMapping/>
+  </p:clrMapOvr>
+  <p:timing>
+    <p:tnLst>
+      <p:par>
+        <p:cTn id="1" dur="indefinite" restart="never" nodeType="tmRoot">
+          <p:childTnLst>
+            <p:seq concurrent="1" nextAc="seek">
+              <p:cTn id="2" dur="indefinite" nodeType="mainSeq">
+                <p:childTnLst>
+                  <p:par>
+                    <p:cTn id="3" fill="hold">
+                      <p:stCondLst>
+                        <p:cond delay="indefinite"/>
+                      </p:stCondLst>
+                      <p:childTnLst>
+                        <p:par>
+                          <p:cTn id="4" fill="hold">
+                            <p:stCondLst>
+                              <p:cond delay="0"/>
+                            </p:stCondLst>
+                            <p:childTnLst>
+                              <p:par>
+                                <p:cTn id="5" presetID="1" presetClass="entr" presetSubtype="0" fill="hold" nodeType="clickEffect">
+                                  <p:stCondLst>
+                                    <p:cond delay="0"/>
+                                  </p:stCondLst>
+                                  <p:childTnLst>
+                                    <p:set>
+                                      <p:cBhvr>
+                                        <p:cTn id="6" dur="1" fill="hold">
+                                          <p:stCondLst>
+                                            <p:cond delay="0"/>
+                                          </p:stCondLst>
+                                        </p:cTn>
+                                        <p:tgtEl>
+                                          <p:spTgt spid="4">
+                                            <p:txEl>
+                                              <p:pRg st="0" end="0"/>
+                                            </p:txEl>
+                                          </p:spTgt>
+                                        </p:tgtEl>
+                                        <p:attrNameLst>
+                                          <p:attrName>style.visibility</p:attrName>
+                                        </p:attrNameLst>
+                                      </p:cBhvr>
+                                      <p:to>
+                                        <p:strVal val="visible"/>
+                                      </p:to>
+                                    </p:set>
+                                  </p:childTnLst>
+                                </p:cTn>
+                              </p:par>
+                            </p:childTnLst>
+                          </p:cTn>
+                        </p:par>
+                      </p:childTnLst>
+                    </p:cTn>
+                  </p:par>
+                  <p:par>
+                    <p:cTn id="7" fill="hold">
+                      <p:stCondLst>
+                        <p:cond delay="indefinite"/>
+                      </p:stCondLst>
+                      <p:childTnLst>
+                        <p:par>
+                          <p:cTn id="8" fill="hold">
+                            <p:stCondLst>
+                              <p:cond delay="0"/>
+                            </p:stCondLst>
+                            <p:childTnLst>
+                              <p:par>
+                                <p:cTn id="9" presetID="1" presetClass="entr" presetSubtype="0" fill="hold" nodeType="clickEffect">
+                                  <p:stCondLst>
+                                    <p:cond delay="0"/>
+                                  </p:stCondLst>
+                                  <p:childTnLst>
+                                    <p:set>
+                                      <p:cBhvr>
+                                        <p:cTn id="10" dur="1" fill="hold">
+                                          <p:stCondLst>
+                                            <p:cond delay="0"/>
+                                          </p:stCondLst>
+                                        </p:cTn>
+                                        <p:tgtEl>
+                                          <p:spTgt spid="4">
+                                            <p:txEl>
+                                              <p:pRg st="1" end="1"/>
+                                            </p:txEl>
+                                          </p:spTgt>
+                                        </p:tgtEl>
+                                        <p:attrNameLst>
+                                          <p:attrName>style.visibility</p:attrName>
+                                        </p:attrNameLst>
+                                      </p:cBhvr>
+                                      <p:to>
+                                        <p:strVal val="visible"/>
+                                      </p:to>
+                                    </p:set>
+                                  </p:childTnLst>
+                                </p:cTn>
+                              </p:par>
+                            </p:childTnLst>
+                          </p:cTn>
+                        </p:par>
+                      </p:childTnLst>
+                    </p:cTn>
+                  </p:par>
+                  <p:par>
+                    <p:cTn id="11" fill="hold">
+                      <p:stCondLst>
+                        <p:cond delay="indefinite"/>
+                      </p:stCondLst>
+                      <p:childTnLst>
+                        <p:par>
+                          <p:cTn id="12" fill="hold">
+                            <p:stCondLst>
+                              <p:cond delay="0"/>
+                            </p:stCondLst>
+                            <p:childTnLst>
+                              <p:par>
+                                <p:cTn id="13" presetID="1" presetClass="entr" presetSubtype="0" fill="hold" nodeType="clickEffect">
+                                  <p:stCondLst>
+                                    <p:cond delay="0"/>
+                                  </p:stCondLst>
+                                  <p:childTnLst>
+                                    <p:set>
+                                      <p:cBhvr>
+                                        <p:cTn id="14" dur="1" fill="hold">
+                                          <p:stCondLst>
+                                            <p:cond delay="0"/>
+                                          </p:stCondLst>
+                                        </p:cTn>
+                                        <p:tgtEl>
+                                          <p:spTgt spid="4">
+                                            <p:txEl>
+                                              <p:pRg st="2" end="2"/>
+                                            </p:txEl>
+                                          </p:spTgt>
+                                        </p:tgtEl>
+                                        <p:attrNameLst>
+                                          <p:attrName>style.visibility</p:attrName>
+                                        </p:attrNameLst>
+                                      </p:cBhvr>
+                                      <p:to>
+                                        <p:strVal val="visible"/>
+                                      </p:to>
+                                    </p:set>
+                                  </p:childTnLst>
+                                </p:cTn>
+                              </p:par>
+                            </p:childTnLst>
+                          </p:cTn>
+                        </p:par>
+                      </p:childTnLst>
+                    </p:cTn>
+                  </p:par>
+                  <p:par>
+                    <p:cTn id="15" fill="hold">
+                      <p:stCondLst>
+                        <p:cond delay="indefinite"/>
+                      </p:stCondLst>
+                      <p:childTnLst>
+                        <p:par>
+                          <p:cTn id="16" fill="hold">
+                            <p:stCondLst>
+                              <p:cond delay="0"/>
+                            </p:stCondLst>
+                            <p:childTnLst>
+                              <p:par>
+                                <p:cTn id="17" presetID="1" presetClass="entr" presetSubtype="0" fill="hold" nodeType="clickEffect">
+                                  <p:stCondLst>
+                                    <p:cond delay="0"/>
+                                  </p:stCondLst>
+                                  <p:childTnLst>
+                                    <p:set>
+                                      <p:cBhvr>
+                                        <p:cTn id="18" dur="1" fill="hold">
+                                          <p:stCondLst>
+                                            <p:cond delay="0"/>
+                                          </p:stCondLst>
+                                        </p:cTn>
+                                        <p:tgtEl>
+                                          <p:spTgt spid="4">
+                                            <p:txEl>
+                                              <p:pRg st="3" end="3"/>
+                                            </p:txEl>
+                                          </p:spTgt>
+                                        </p:tgtEl>
+                                        <p:attrNameLst>
+                                          <p:attrName>style.visibility</p:attrName>
+                                        </p:attrNameLst>
+                                      </p:cBhvr>
+                                      <p:to>
+                                        <p:strVal val="visible"/>
+                                      </p:to>
+                                    </p:set>
+                                  </p:childTnLst>
+                                </p:cTn>
+                              </p:par>
+                            </p:childTnLst>
+                          </p:cTn>
+                        </p:par>
+                      </p:childTnLst>
+                    </p:cTn>
+                  </p:par>
+                  <p:par>
+                    <p:cTn id="19" fill="hold">
+                      <p:stCondLst>
+                        <p:cond delay="indefinite"/>
+                      </p:stCondLst>
+                      <p:childTnLst>
+                        <p:par>
+                          <p:cTn id="20" fill="hold">
+                            <p:stCondLst>
+                              <p:cond delay="0"/>
+                            </p:stCondLst>
+                            <p:childTnLst>
+                              <p:par>
+                                <p:cTn id="21" presetID="1" presetClass="entr" presetSubtype="0" fill="hold" nodeType="clickEffect">
+                                  <p:stCondLst>
+                                    <p:cond delay="0"/>
+                                  </p:stCondLst>
+                                  <p:childTnLst>
+                                    <p:set>
+                                      <p:cBhvr>
+                                        <p:cTn id="22" dur="1" fill="hold">
+                                          <p:stCondLst>
+                                            <p:cond delay="0"/>
+                                          </p:stCondLst>
+                                        </p:cTn>
+                                        <p:tgtEl>
+                                          <p:spTgt spid="4">
+                                            <p:txEl>
+                                              <p:pRg st="4" end="4"/>
+                                            </p:txEl>
+                                          </p:spTgt>
+                                        </p:tgtEl>
+                                        <p:attrNameLst>
+                                          <p:attrName>style.visibility</p:attrName>
+                                        </p:attrNameLst>
+                                      </p:cBhvr>
+                                      <p:to>
+                                        <p:strVal val="visible"/>
+                                      </p:to>
+                                    </p:set>
+                                  </p:childTnLst>
+                                </p:cTn>
+                              </p:par>
+                            </p:childTnLst>
+                          </p:cTn>
+                        </p:par>
+                      </p:childTnLst>
+                    </p:cTn>
+                  </p:par>
+                  <p:par>
+                    <p:cTn id="23" fill="hold">
+                      <p:stCondLst>
+                        <p:cond delay="indefinite"/>
+                      </p:stCondLst>
+                      <p:childTnLst>
+                        <p:par>
+                          <p:cTn id="24" fill="hold">
+                            <p:stCondLst>
+                              <p:cond delay="0"/>
+                            </p:stCondLst>
+                            <p:childTnLst>
+                              <p:par>
+                                <p:cTn id="25" presetID="1" presetClass="entr" presetSubtype="0" fill="hold" nodeType="clickEffect">
+                                  <p:stCondLst>
+                                    <p:cond delay="0"/>
+                                  </p:stCondLst>
+                                  <p:childTnLst>
+                                    <p:set>
+                                      <p:cBhvr>
+                                        <p:cTn id="26" dur="1" fill="hold">
+                                          <p:stCondLst>
+                                            <p:cond delay="0"/>
+                                          </p:stCondLst>
+                                        </p:cTn>
+                                        <p:tgtEl>
+                                          <p:spTgt spid="4">
+                                            <p:txEl>
+                                              <p:pRg st="5" end="5"/>
+                                            </p:txEl>
+                                          </p:spTgt>
+                                        </p:tgtEl>
+                                        <p:attrNameLst>
+                                          <p:attrName>style.visibility</p:attrName>
+                                        </p:attrNameLst>
+                                      </p:cBhvr>
+                                      <p:to>
+                                        <p:strVal val="visible"/>
+                                      </p:to>
+                                    </p:set>
+                                  </p:childTnLst>
+                                </p:cTn>
+                              </p:par>
+                            </p:childTnLst>
+                          </p:cTn>
+                        </p:par>
+                      </p:childTnLst>
+                    </p:cTn>
+                  </p:par>
+                  <p:par>
+                    <p:cTn id="27" fill="hold">
+                      <p:stCondLst>
+                        <p:cond delay="indefinite"/>
+                      </p:stCondLst>
+                      <p:childTnLst>
+                        <p:par>
+                          <p:cTn id="28" fill="hold">
+                            <p:stCondLst>
+                              <p:cond delay="0"/>
+                            </p:stCondLst>
+                            <p:childTnLst>
+                              <p:par>
+                                <p:cTn id="29" presetID="1" presetClass="entr" presetSubtype="0" fill="hold" nodeType="clickEffect">
+                                  <p:stCondLst>
+                                    <p:cond delay="0"/>
+                                  </p:stCondLst>
+                                  <p:childTnLst>
+                                    <p:set>
+                                      <p:cBhvr>
+                                        <p:cTn id="30" dur="1" fill="hold">
+                                          <p:stCondLst>
+                                            <p:cond delay="0"/>
+                                          </p:stCondLst>
+                                        </p:cTn>
+                                        <p:tgtEl>
+                                          <p:spTgt spid="4">
+                                            <p:txEl>
+                                              <p:pRg st="6" end="6"/>
+                                            </p:txEl>
+                                          </p:spTgt>
+                                        </p:tgtEl>
+                                        <p:attrNameLst>
+                                          <p:attrName>style.visibility</p:attrName>
+                                        </p:attrNameLst>
+                                      </p:cBhvr>
+                                      <p:to>
+                                        <p:strVal val="visible"/>
+                                      </p:to>
+                                    </p:set>
+                                  </p:childTnLst>
+                                </p:cTn>
+                              </p:par>
+                            </p:childTnLst>
+                          </p:cTn>
+                        </p:par>
+                      </p:childTnLst>
+                    </p:cTn>
+                  </p:par>
+                  <p:par>
+                    <p:cTn id="31" fill="hold">
+                      <p:stCondLst>
+                        <p:cond delay="indefinite"/>
+                      </p:stCondLst>
+                      <p:childTnLst>
+                        <p:par>
+                          <p:cTn id="32" fill="hold">
+                            <p:stCondLst>
+                              <p:cond delay="0"/>
+                            </p:stCondLst>
+                            <p:childTnLst>
+                              <p:par>
+                                <p:cTn id="33" presetID="1" presetClass="entr" presetSubtype="0" fill="hold" nodeType="clickEffect">
+                                  <p:stCondLst>
+                                    <p:cond delay="0"/>
+                                  </p:stCondLst>
+                                  <p:childTnLst>
+                                    <p:set>
+                                      <p:cBhvr>
+                                        <p:cTn id="34" dur="1" fill="hold">
+                                          <p:stCondLst>
+                                            <p:cond delay="0"/>
+                                          </p:stCondLst>
+                                        </p:cTn>
+                                        <p:tgtEl>
+                                          <p:spTgt spid="5"/>
+                                        </p:tgtEl>
+                                        <p:attrNameLst>
+                                          <p:attrName>style.visibility</p:attrName>
+                                        </p:attrNameLst>
+                                      </p:cBhvr>
+                                      <p:to>
+                                        <p:strVal val="visible"/>
+                                      </p:to>
+                                    </p:set>
+                                  </p:childTnLst>
+                                </p:cTn>
+                              </p:par>
+                            </p:childTnLst>
+                          </p:cTn>
+                        </p:par>
+                      </p:childTnLst>
+                    </p:cTn>
+                  </p:par>
+                </p:childTnLst>
+              </p:cTn>
+              <p:prevCondLst>
+                <p:cond evt="onPrev" delay="0">
+                  <p:tgtEl>
+                    <p:sldTgt/>
+                  </p:tgtEl>
+                </p:cond>
+              </p:prevCondLst>
+              <p:nextCondLst>
+                <p:cond evt="onNext" delay="0">
+                  <p:tgtEl>
+                    <p:sldTgt/>
+                  </p:tgtEl>
+                </p:cond>
+              </p:nextCondLst>
+            </p:seq>
+          </p:childTnLst>
+        </p:cTn>
+      </p:par>
+    </p:tnLst>
+  </p:timing>
+</p:sld>
+</file>
+
+<file path=ppt/slides/slide44.xml><?xml version="1.0" encoding="utf-8"?>
+<p:sld xmlns:a="http://schemas.openxmlformats.org/drawingml/2006/main" xmlns:r="http://schemas.openxmlformats.org/officeDocument/2006/relationships" xmlns:p="http://schemas.openxmlformats.org/presentationml/2006/main">
+  <p:cSld>
+    <p:spTree>
+      <p:nvGrpSpPr>
+        <p:cNvPr id="1" name="">
+          <a:extLst>
+            <a:ext uri="{FF2B5EF4-FFF2-40B4-BE49-F238E27FC236}">
+              <a16:creationId xmlns:a16="http://schemas.microsoft.com/office/drawing/2014/main" id="{D993FB2A-5516-DE70-18EC-605B385B8BB7}"/>
+            </a:ext>
+          </a:extLst>
+        </p:cNvPr>
+        <p:cNvGrpSpPr/>
+        <p:nvPr/>
+      </p:nvGrpSpPr>
+      <p:grpSpPr>
+        <a:xfrm>
+          <a:off x="0" y="0"/>
+          <a:ext cx="0" cy="0"/>
+          <a:chOff x="0" y="0"/>
+          <a:chExt cx="0" cy="0"/>
+        </a:xfrm>
+      </p:grpSpPr>
+      <p:sp>
+        <p:nvSpPr>
+          <p:cNvPr id="3" name="Subtitle 2">
+            <a:extLst>
+              <a:ext uri="{FF2B5EF4-FFF2-40B4-BE49-F238E27FC236}">
+                <a16:creationId xmlns:a16="http://schemas.microsoft.com/office/drawing/2014/main" id="{4CBF0615-0A12-8CD9-800E-473A3978A49B}"/>
+              </a:ext>
+            </a:extLst>
+          </p:cNvPr>
+          <p:cNvSpPr>
+            <a:spLocks noGrp="1"/>
+          </p:cNvSpPr>
+          <p:nvPr>
+            <p:ph type="subTitle" idx="1"/>
+          </p:nvPr>
+        </p:nvSpPr>
+        <p:spPr>
+          <a:xfrm>
+            <a:off x="152399" y="217488"/>
+            <a:ext cx="11223171" cy="303212"/>
+          </a:xfrm>
+        </p:spPr>
+        <p:txBody>
+          <a:bodyPr>
+            <a:normAutofit fontScale="92500" lnSpcReduction="20000"/>
+          </a:bodyPr>
+          <a:lstStyle/>
+          <a:p>
+            <a:r>
+              <a:rPr lang="en-US" sz="1800" b="1"/>
+              <a:t>Chapter 9 – Collections and Generics</a:t>
+            </a:r>
+          </a:p>
+        </p:txBody>
+      </p:sp>
+      <p:sp>
+        <p:nvSpPr>
+          <p:cNvPr id="4" name="Subtitle 2">
+            <a:extLst>
+              <a:ext uri="{FF2B5EF4-FFF2-40B4-BE49-F238E27FC236}">
+                <a16:creationId xmlns:a16="http://schemas.microsoft.com/office/drawing/2014/main" id="{8CF6F217-9579-9861-2FFC-3E4E06937969}"/>
+              </a:ext>
+            </a:extLst>
+          </p:cNvPr>
+          <p:cNvSpPr txBox="1">
+            <a:spLocks/>
+          </p:cNvSpPr>
+          <p:nvPr/>
+        </p:nvSpPr>
+        <p:spPr>
+          <a:xfrm>
+            <a:off x="0" y="820738"/>
+            <a:ext cx="12192000" cy="6037262"/>
+          </a:xfrm>
+          <a:prstGeom prst="rect">
+            <a:avLst/>
+          </a:prstGeom>
+        </p:spPr>
+        <p:txBody>
+          <a:bodyPr vert="horz" lIns="91440" tIns="45720" rIns="91440" bIns="45720" rtlCol="0">
+            <a:normAutofit/>
+          </a:bodyPr>
+          <a:lstStyle>
+            <a:lvl1pPr marL="0" indent="0" algn="ctr" defTabSz="914400" rtl="0" eaLnBrk="1" latinLnBrk="0" hangingPunct="1">
+              <a:lnSpc>
+                <a:spcPct val="90000"/>
+              </a:lnSpc>
+              <a:spcBef>
+                <a:spcPts val="1000"/>
+              </a:spcBef>
+              <a:buFont typeface="Arial" panose="020B0604020202020204" pitchFamily="34" charset="0"/>
+              <a:buNone/>
+              <a:defRPr sz="2400" kern="1200">
+                <a:solidFill>
+                  <a:schemeClr val="tx1"/>
+                </a:solidFill>
+                <a:latin typeface="+mn-lt"/>
+                <a:ea typeface="+mn-ea"/>
+                <a:cs typeface="+mn-cs"/>
+              </a:defRPr>
+            </a:lvl1pPr>
+            <a:lvl2pPr marL="457200" indent="0" algn="ctr" defTabSz="914400" rtl="0" eaLnBrk="1" latinLnBrk="0" hangingPunct="1">
+              <a:lnSpc>
+                <a:spcPct val="90000"/>
+              </a:lnSpc>
+              <a:spcBef>
+                <a:spcPts val="500"/>
+              </a:spcBef>
+              <a:buFont typeface="Arial" panose="020B0604020202020204" pitchFamily="34" charset="0"/>
+              <a:buNone/>
+              <a:defRPr sz="2000" kern="1200">
+                <a:solidFill>
+                  <a:schemeClr val="tx1"/>
+                </a:solidFill>
+                <a:latin typeface="+mn-lt"/>
+                <a:ea typeface="+mn-ea"/>
+                <a:cs typeface="+mn-cs"/>
+              </a:defRPr>
+            </a:lvl2pPr>
+            <a:lvl3pPr marL="914400" indent="0" algn="ctr" defTabSz="914400" rtl="0" eaLnBrk="1" latinLnBrk="0" hangingPunct="1">
+              <a:lnSpc>
+                <a:spcPct val="90000"/>
+              </a:lnSpc>
+              <a:spcBef>
+                <a:spcPts val="500"/>
+              </a:spcBef>
+              <a:buFont typeface="Arial" panose="020B0604020202020204" pitchFamily="34" charset="0"/>
+              <a:buNone/>
+              <a:defRPr sz="1800" kern="1200">
+                <a:solidFill>
+                  <a:schemeClr val="tx1"/>
+                </a:solidFill>
+                <a:latin typeface="+mn-lt"/>
+                <a:ea typeface="+mn-ea"/>
+                <a:cs typeface="+mn-cs"/>
+              </a:defRPr>
+            </a:lvl3pPr>
+            <a:lvl4pPr marL="1371600" indent="0" algn="ctr" defTabSz="914400" rtl="0" eaLnBrk="1" latinLnBrk="0" hangingPunct="1">
+              <a:lnSpc>
+                <a:spcPct val="90000"/>
+              </a:lnSpc>
+              <a:spcBef>
+                <a:spcPts val="500"/>
+              </a:spcBef>
+              <a:buFont typeface="Arial" panose="020B0604020202020204" pitchFamily="34" charset="0"/>
+              <a:buNone/>
+              <a:defRPr sz="1600" kern="1200">
+                <a:solidFill>
+                  <a:schemeClr val="tx1"/>
+                </a:solidFill>
+                <a:latin typeface="+mn-lt"/>
+                <a:ea typeface="+mn-ea"/>
+                <a:cs typeface="+mn-cs"/>
+              </a:defRPr>
+            </a:lvl4pPr>
+            <a:lvl5pPr marL="1828800" indent="0" algn="ctr" defTabSz="914400" rtl="0" eaLnBrk="1" latinLnBrk="0" hangingPunct="1">
+              <a:lnSpc>
+                <a:spcPct val="90000"/>
+              </a:lnSpc>
+              <a:spcBef>
+                <a:spcPts val="500"/>
+              </a:spcBef>
+              <a:buFont typeface="Arial" panose="020B0604020202020204" pitchFamily="34" charset="0"/>
+              <a:buNone/>
+              <a:defRPr sz="1600" kern="1200">
+                <a:solidFill>
+                  <a:schemeClr val="tx1"/>
+                </a:solidFill>
+                <a:latin typeface="+mn-lt"/>
+                <a:ea typeface="+mn-ea"/>
+                <a:cs typeface="+mn-cs"/>
+              </a:defRPr>
+            </a:lvl5pPr>
+            <a:lvl6pPr marL="2286000" indent="0" algn="ctr" defTabSz="914400" rtl="0" eaLnBrk="1" latinLnBrk="0" hangingPunct="1">
+              <a:lnSpc>
+                <a:spcPct val="90000"/>
+              </a:lnSpc>
+              <a:spcBef>
+                <a:spcPts val="500"/>
+              </a:spcBef>
+              <a:buFont typeface="Arial" panose="020B0604020202020204" pitchFamily="34" charset="0"/>
+              <a:buNone/>
+              <a:defRPr sz="1600" kern="1200">
+                <a:solidFill>
+                  <a:schemeClr val="tx1"/>
+                </a:solidFill>
+                <a:latin typeface="+mn-lt"/>
+                <a:ea typeface="+mn-ea"/>
+                <a:cs typeface="+mn-cs"/>
+              </a:defRPr>
+            </a:lvl6pPr>
+            <a:lvl7pPr marL="2743200" indent="0" algn="ctr" defTabSz="914400" rtl="0" eaLnBrk="1" latinLnBrk="0" hangingPunct="1">
+              <a:lnSpc>
+                <a:spcPct val="90000"/>
+              </a:lnSpc>
+              <a:spcBef>
+                <a:spcPts val="500"/>
+              </a:spcBef>
+              <a:buFont typeface="Arial" panose="020B0604020202020204" pitchFamily="34" charset="0"/>
+              <a:buNone/>
+              <a:defRPr sz="1600" kern="1200">
+                <a:solidFill>
+                  <a:schemeClr val="tx1"/>
+                </a:solidFill>
+                <a:latin typeface="+mn-lt"/>
+                <a:ea typeface="+mn-ea"/>
+                <a:cs typeface="+mn-cs"/>
+              </a:defRPr>
+            </a:lvl7pPr>
+            <a:lvl8pPr marL="3200400" indent="0" algn="ctr" defTabSz="914400" rtl="0" eaLnBrk="1" latinLnBrk="0" hangingPunct="1">
+              <a:lnSpc>
+                <a:spcPct val="90000"/>
+              </a:lnSpc>
+              <a:spcBef>
+                <a:spcPts val="500"/>
+              </a:spcBef>
+              <a:buFont typeface="Arial" panose="020B0604020202020204" pitchFamily="34" charset="0"/>
+              <a:buNone/>
+              <a:defRPr sz="1600" kern="1200">
+                <a:solidFill>
+                  <a:schemeClr val="tx1"/>
+                </a:solidFill>
+                <a:latin typeface="+mn-lt"/>
+                <a:ea typeface="+mn-ea"/>
+                <a:cs typeface="+mn-cs"/>
+              </a:defRPr>
+            </a:lvl8pPr>
+            <a:lvl9pPr marL="3657600" indent="0" algn="ctr" defTabSz="914400" rtl="0" eaLnBrk="1" latinLnBrk="0" hangingPunct="1">
+              <a:lnSpc>
+                <a:spcPct val="90000"/>
+              </a:lnSpc>
+              <a:spcBef>
+                <a:spcPts val="500"/>
+              </a:spcBef>
+              <a:buFont typeface="Arial" panose="020B0604020202020204" pitchFamily="34" charset="0"/>
+              <a:buNone/>
+              <a:defRPr sz="1600" kern="1200">
+                <a:solidFill>
+                  <a:schemeClr val="tx1"/>
+                </a:solidFill>
+                <a:latin typeface="+mn-lt"/>
+                <a:ea typeface="+mn-ea"/>
+                <a:cs typeface="+mn-cs"/>
+              </a:defRPr>
+            </a:lvl9pPr>
+          </a:lstStyle>
+          <a:p>
+            <a:pPr algn="l"/>
+            <a:endParaRPr lang="en-US" sz="1800">
+              <a:sym typeface="Wingdings" pitchFamily="2" charset="2"/>
+            </a:endParaRPr>
+          </a:p>
+          <a:p>
+            <a:pPr algn="l"/>
+            <a:endParaRPr lang="en-US" sz="1800">
+              <a:sym typeface="Wingdings" pitchFamily="2" charset="2"/>
+            </a:endParaRPr>
+          </a:p>
+          <a:p>
+            <a:pPr algn="l"/>
+            <a:endParaRPr lang="en-US" sz="1800">
+              <a:sym typeface="Wingdings" pitchFamily="2" charset="2"/>
+            </a:endParaRPr>
+          </a:p>
+          <a:p>
+            <a:pPr algn="l"/>
+            <a:endParaRPr lang="en-US" sz="1800">
+              <a:sym typeface="Wingdings" pitchFamily="2" charset="2"/>
+            </a:endParaRPr>
+          </a:p>
+          <a:p>
+            <a:pPr algn="l"/>
+            <a:endParaRPr lang="en-US" sz="1800">
+              <a:sym typeface="Wingdings" pitchFamily="2" charset="2"/>
+            </a:endParaRPr>
+          </a:p>
+          <a:p>
+            <a:pPr algn="l"/>
+            <a:endParaRPr lang="en-US" sz="1800">
+              <a:sym typeface="Wingdings" pitchFamily="2" charset="2"/>
+            </a:endParaRPr>
+          </a:p>
+          <a:p>
+            <a:pPr algn="l"/>
+            <a:endParaRPr lang="en-US" sz="1800">
+              <a:sym typeface="Wingdings" pitchFamily="2" charset="2"/>
+            </a:endParaRPr>
+          </a:p>
+          <a:p>
+            <a:pPr algn="l"/>
+            <a:endParaRPr lang="en-US" sz="1800">
+              <a:sym typeface="Wingdings" pitchFamily="2" charset="2"/>
+            </a:endParaRPr>
+          </a:p>
+          <a:p>
+            <a:pPr algn="l"/>
+            <a:endParaRPr lang="en-US" sz="1800">
+              <a:sym typeface="Wingdings" pitchFamily="2" charset="2"/>
+            </a:endParaRPr>
+          </a:p>
+          <a:p>
+            <a:pPr algn="l"/>
+            <a:endParaRPr lang="en-US" sz="1800">
+              <a:sym typeface="Wingdings" pitchFamily="2" charset="2"/>
+            </a:endParaRPr>
+          </a:p>
+          <a:p>
+            <a:pPr algn="l"/>
+            <a:endParaRPr lang="en-US" sz="1800">
+              <a:sym typeface="Wingdings" pitchFamily="2" charset="2"/>
+            </a:endParaRPr>
+          </a:p>
+          <a:p>
+            <a:pPr algn="l"/>
+            <a:endParaRPr lang="en-US" sz="1800">
+              <a:sym typeface="Wingdings" pitchFamily="2" charset="2"/>
+            </a:endParaRPr>
+          </a:p>
+          <a:p>
+            <a:pPr algn="l"/>
+            <a:r>
+              <a:rPr lang="en-US" sz="1800">
+                <a:sym typeface="Wingdings" pitchFamily="2" charset="2"/>
+              </a:rPr>
+              <a:t>- Note: Why ... wildcard is immutable ? This can't be proved because ...</a:t>
+            </a:r>
+          </a:p>
+          <a:p>
+            <a:pPr algn="l"/>
+            <a:r>
+              <a:rPr lang="en-US" sz="1800">
+                <a:sym typeface="Wingdings" pitchFamily="2" charset="2"/>
+              </a:rPr>
+              <a:t>- 2 ... can be ...</a:t>
+            </a:r>
+          </a:p>
+        </p:txBody>
+      </p:sp>
+      <p:pic>
+        <p:nvPicPr>
+          <p:cNvPr id="2" name="Picture 1">
+            <a:extLst>
+              <a:ext uri="{FF2B5EF4-FFF2-40B4-BE49-F238E27FC236}">
+                <a16:creationId xmlns:a16="http://schemas.microsoft.com/office/drawing/2014/main" id="{67A36625-D3C6-72B0-4539-BB59E2591E6D}"/>
+              </a:ext>
+            </a:extLst>
+          </p:cNvPr>
+          <p:cNvPicPr>
+            <a:picLocks noChangeAspect="1"/>
+          </p:cNvPicPr>
+          <p:nvPr/>
+        </p:nvPicPr>
+        <p:blipFill>
+          <a:blip r:embed="rId3"/>
+          <a:stretch>
+            <a:fillRect/>
+          </a:stretch>
+        </p:blipFill>
+        <p:spPr>
+          <a:xfrm>
+            <a:off x="2209800" y="1584942"/>
+            <a:ext cx="7772400" cy="3688116"/>
+          </a:xfrm>
+          <a:prstGeom prst="rect">
+            <a:avLst/>
+          </a:prstGeom>
+        </p:spPr>
+      </p:pic>
+      <mc:AlternateContent xmlns:mc="http://schemas.openxmlformats.org/markup-compatibility/2006">
+        <mc:Choice xmlns:p14="http://schemas.microsoft.com/office/powerpoint/2010/main" Requires="p14">
+          <p:contentPart p14:bwMode="auto" r:id="rId4">
+            <p14:nvContentPartPr>
+              <p14:cNvPr id="6" name="Ink 5">
+                <a:extLst>
+                  <a:ext uri="{FF2B5EF4-FFF2-40B4-BE49-F238E27FC236}">
+                    <a16:creationId xmlns:a16="http://schemas.microsoft.com/office/drawing/2014/main" id="{4E7AB997-B398-AF4C-630F-5A5FD495BA10}"/>
+                  </a:ext>
+                </a:extLst>
+              </p14:cNvPr>
+              <p14:cNvContentPartPr/>
+              <p14:nvPr/>
+            </p14:nvContentPartPr>
+            <p14:xfrm>
+              <a:off x="4803884" y="2820591"/>
+              <a:ext cx="1316880" cy="11520"/>
+            </p14:xfrm>
+          </p:contentPart>
+        </mc:Choice>
+        <mc:Fallback>
+          <p:pic>
+            <p:nvPicPr>
+              <p:cNvPr id="6" name="Ink 5">
+                <a:extLst>
+                  <a:ext uri="{FF2B5EF4-FFF2-40B4-BE49-F238E27FC236}">
+                    <a16:creationId xmlns:a16="http://schemas.microsoft.com/office/drawing/2014/main" id="{4E7AB997-B398-AF4C-630F-5A5FD495BA10}"/>
+                  </a:ext>
+                </a:extLst>
+              </p:cNvPr>
+              <p:cNvPicPr/>
+              <p:nvPr/>
+            </p:nvPicPr>
+            <p:blipFill>
+              <a:blip r:embed="rId5"/>
+              <a:stretch>
+                <a:fillRect/>
+              </a:stretch>
+            </p:blipFill>
+            <p:spPr>
+              <a:xfrm>
+                <a:off x="4740884" y="2757591"/>
+                <a:ext cx="1442520" cy="137160"/>
+              </a:xfrm>
+              <a:prstGeom prst="rect">
+                <a:avLst/>
+              </a:prstGeom>
+            </p:spPr>
+          </p:pic>
+        </mc:Fallback>
+      </mc:AlternateContent>
+      <mc:AlternateContent xmlns:mc="http://schemas.openxmlformats.org/markup-compatibility/2006">
+        <mc:Choice xmlns:p14="http://schemas.microsoft.com/office/powerpoint/2010/main" Requires="p14">
+          <p:contentPart p14:bwMode="auto" r:id="rId6">
+            <p14:nvContentPartPr>
+              <p14:cNvPr id="7" name="Ink 6">
+                <a:extLst>
+                  <a:ext uri="{FF2B5EF4-FFF2-40B4-BE49-F238E27FC236}">
+                    <a16:creationId xmlns:a16="http://schemas.microsoft.com/office/drawing/2014/main" id="{7808A147-8D20-C684-EE5A-A228CCF83E87}"/>
+                  </a:ext>
+                </a:extLst>
+              </p14:cNvPr>
+              <p14:cNvContentPartPr/>
+              <p14:nvPr/>
+            </p14:nvContentPartPr>
+            <p14:xfrm>
+              <a:off x="4801004" y="3028671"/>
+              <a:ext cx="1895760" cy="8280"/>
+            </p14:xfrm>
+          </p:contentPart>
+        </mc:Choice>
+        <mc:Fallback>
+          <p:pic>
+            <p:nvPicPr>
+              <p:cNvPr id="7" name="Ink 6">
+                <a:extLst>
+                  <a:ext uri="{FF2B5EF4-FFF2-40B4-BE49-F238E27FC236}">
+                    <a16:creationId xmlns:a16="http://schemas.microsoft.com/office/drawing/2014/main" id="{7808A147-8D20-C684-EE5A-A228CCF83E87}"/>
+                  </a:ext>
+                </a:extLst>
+              </p:cNvPr>
+              <p:cNvPicPr/>
+              <p:nvPr/>
+            </p:nvPicPr>
+            <p:blipFill>
+              <a:blip r:embed="rId7"/>
+              <a:stretch>
+                <a:fillRect/>
+              </a:stretch>
+            </p:blipFill>
+            <p:spPr>
+              <a:xfrm>
+                <a:off x="4738004" y="2965671"/>
+                <a:ext cx="2021400" cy="133920"/>
+              </a:xfrm>
+              <a:prstGeom prst="rect">
+                <a:avLst/>
+              </a:prstGeom>
+            </p:spPr>
+          </p:pic>
+        </mc:Fallback>
+      </mc:AlternateContent>
+      <mc:AlternateContent xmlns:mc="http://schemas.openxmlformats.org/markup-compatibility/2006">
+        <mc:Choice xmlns:p14="http://schemas.microsoft.com/office/powerpoint/2010/main" Requires="p14">
+          <p:contentPart p14:bwMode="auto" r:id="rId8">
+            <p14:nvContentPartPr>
+              <p14:cNvPr id="8" name="Ink 7">
+                <a:extLst>
+                  <a:ext uri="{FF2B5EF4-FFF2-40B4-BE49-F238E27FC236}">
+                    <a16:creationId xmlns:a16="http://schemas.microsoft.com/office/drawing/2014/main" id="{9F9D7A33-A97E-17C4-9718-D3F9F1A850B7}"/>
+                  </a:ext>
+                </a:extLst>
+              </p14:cNvPr>
+              <p14:cNvContentPartPr/>
+              <p14:nvPr/>
+            </p14:nvContentPartPr>
+            <p14:xfrm>
+              <a:off x="6982964" y="2779911"/>
+              <a:ext cx="189360" cy="73440"/>
+            </p14:xfrm>
+          </p:contentPart>
+        </mc:Choice>
+        <mc:Fallback>
+          <p:pic>
+            <p:nvPicPr>
+              <p:cNvPr id="8" name="Ink 7">
+                <a:extLst>
+                  <a:ext uri="{FF2B5EF4-FFF2-40B4-BE49-F238E27FC236}">
+                    <a16:creationId xmlns:a16="http://schemas.microsoft.com/office/drawing/2014/main" id="{9F9D7A33-A97E-17C4-9718-D3F9F1A850B7}"/>
+                  </a:ext>
+                </a:extLst>
+              </p:cNvPr>
+              <p:cNvPicPr/>
+              <p:nvPr/>
+            </p:nvPicPr>
+            <p:blipFill>
+              <a:blip r:embed="rId9"/>
+              <a:stretch>
+                <a:fillRect/>
+              </a:stretch>
+            </p:blipFill>
+            <p:spPr>
+              <a:xfrm>
+                <a:off x="6920324" y="2716911"/>
+                <a:ext cx="315000" cy="199080"/>
+              </a:xfrm>
+              <a:prstGeom prst="rect">
+                <a:avLst/>
+              </a:prstGeom>
+            </p:spPr>
+          </p:pic>
+        </mc:Fallback>
+      </mc:AlternateContent>
+      <mc:AlternateContent xmlns:mc="http://schemas.openxmlformats.org/markup-compatibility/2006">
+        <mc:Choice xmlns:p14="http://schemas.microsoft.com/office/powerpoint/2010/main" Requires="p14">
+          <p:contentPart p14:bwMode="auto" r:id="rId10">
+            <p14:nvContentPartPr>
+              <p14:cNvPr id="9" name="Ink 8">
+                <a:extLst>
+                  <a:ext uri="{FF2B5EF4-FFF2-40B4-BE49-F238E27FC236}">
+                    <a16:creationId xmlns:a16="http://schemas.microsoft.com/office/drawing/2014/main" id="{70AC456A-67CD-B126-DF25-D8710E0CB8A5}"/>
+                  </a:ext>
+                </a:extLst>
+              </p14:cNvPr>
+              <p14:cNvContentPartPr/>
+              <p14:nvPr/>
+            </p14:nvContentPartPr>
+            <p14:xfrm>
+              <a:off x="8519444" y="2802231"/>
+              <a:ext cx="283680" cy="18000"/>
+            </p14:xfrm>
+          </p:contentPart>
+        </mc:Choice>
+        <mc:Fallback>
+          <p:pic>
+            <p:nvPicPr>
+              <p:cNvPr id="9" name="Ink 8">
+                <a:extLst>
+                  <a:ext uri="{FF2B5EF4-FFF2-40B4-BE49-F238E27FC236}">
+                    <a16:creationId xmlns:a16="http://schemas.microsoft.com/office/drawing/2014/main" id="{70AC456A-67CD-B126-DF25-D8710E0CB8A5}"/>
+                  </a:ext>
+                </a:extLst>
+              </p:cNvPr>
+              <p:cNvPicPr/>
+              <p:nvPr/>
+            </p:nvPicPr>
+            <p:blipFill>
+              <a:blip r:embed="rId11"/>
+              <a:stretch>
+                <a:fillRect/>
+              </a:stretch>
+            </p:blipFill>
+            <p:spPr>
+              <a:xfrm>
+                <a:off x="8456444" y="2739591"/>
+                <a:ext cx="409320" cy="143640"/>
+              </a:xfrm>
+              <a:prstGeom prst="rect">
+                <a:avLst/>
+              </a:prstGeom>
+            </p:spPr>
+          </p:pic>
+        </mc:Fallback>
+      </mc:AlternateContent>
+      <p:grpSp>
+        <p:nvGrpSpPr>
+          <p:cNvPr id="13" name="Group 12">
+            <a:extLst>
+              <a:ext uri="{FF2B5EF4-FFF2-40B4-BE49-F238E27FC236}">
+                <a16:creationId xmlns:a16="http://schemas.microsoft.com/office/drawing/2014/main" id="{B631678A-EA80-C1AB-F270-A9997D0A8E4D}"/>
+              </a:ext>
+            </a:extLst>
+          </p:cNvPr>
+          <p:cNvGrpSpPr/>
+          <p:nvPr/>
+        </p:nvGrpSpPr>
+        <p:grpSpPr>
+          <a:xfrm>
+            <a:off x="4802804" y="3430431"/>
+            <a:ext cx="2325960" cy="262800"/>
+            <a:chOff x="4802804" y="3430431"/>
+            <a:chExt cx="2325960" cy="262800"/>
+          </a:xfrm>
+        </p:grpSpPr>
+        <mc:AlternateContent xmlns:mc="http://schemas.openxmlformats.org/markup-compatibility/2006">
+          <mc:Choice xmlns:p14="http://schemas.microsoft.com/office/powerpoint/2010/main" Requires="p14">
+            <p:contentPart p14:bwMode="auto" r:id="rId12">
+              <p14:nvContentPartPr>
+                <p14:cNvPr id="10" name="Ink 9">
+                  <a:extLst>
+                    <a:ext uri="{FF2B5EF4-FFF2-40B4-BE49-F238E27FC236}">
+                      <a16:creationId xmlns:a16="http://schemas.microsoft.com/office/drawing/2014/main" id="{38B5B7F7-5125-280D-0790-FA8720360E9D}"/>
+                    </a:ext>
+                  </a:extLst>
+                </p14:cNvPr>
+                <p14:cNvContentPartPr/>
+                <p14:nvPr/>
+              </p14:nvContentPartPr>
+              <p14:xfrm>
+                <a:off x="4802804" y="3445551"/>
+                <a:ext cx="1932840" cy="247680"/>
+              </p14:xfrm>
+            </p:contentPart>
+          </mc:Choice>
+          <mc:Fallback>
+            <p:pic>
+              <p:nvPicPr>
+                <p:cNvPr id="10" name="Ink 9">
+                  <a:extLst>
+                    <a:ext uri="{FF2B5EF4-FFF2-40B4-BE49-F238E27FC236}">
+                      <a16:creationId xmlns:a16="http://schemas.microsoft.com/office/drawing/2014/main" id="{38B5B7F7-5125-280D-0790-FA8720360E9D}"/>
+                    </a:ext>
+                  </a:extLst>
+                </p:cNvPr>
+                <p:cNvPicPr/>
+                <p:nvPr/>
+              </p:nvPicPr>
+              <p:blipFill>
+                <a:blip r:embed="rId13"/>
+                <a:stretch>
+                  <a:fillRect/>
+                </a:stretch>
+              </p:blipFill>
+              <p:spPr>
+                <a:xfrm>
+                  <a:off x="4740164" y="3382551"/>
+                  <a:ext cx="2058480" cy="373320"/>
+                </a:xfrm>
+                <a:prstGeom prst="rect">
+                  <a:avLst/>
+                </a:prstGeom>
+              </p:spPr>
+            </p:pic>
+          </mc:Fallback>
+        </mc:AlternateContent>
+        <mc:AlternateContent xmlns:mc="http://schemas.openxmlformats.org/markup-compatibility/2006">
+          <mc:Choice xmlns:p14="http://schemas.microsoft.com/office/powerpoint/2010/main" Requires="p14">
+            <p:contentPart p14:bwMode="auto" r:id="rId14">
+              <p14:nvContentPartPr>
+                <p14:cNvPr id="11" name="Ink 10">
+                  <a:extLst>
+                    <a:ext uri="{FF2B5EF4-FFF2-40B4-BE49-F238E27FC236}">
+                      <a16:creationId xmlns:a16="http://schemas.microsoft.com/office/drawing/2014/main" id="{41494FAE-34AA-60F6-7DAB-69CC45821B0D}"/>
+                    </a:ext>
+                  </a:extLst>
+                </p14:cNvPr>
+                <p14:cNvContentPartPr/>
+                <p14:nvPr/>
+              </p14:nvContentPartPr>
+              <p14:xfrm>
+                <a:off x="6906284" y="3430431"/>
+                <a:ext cx="222480" cy="47160"/>
+              </p14:xfrm>
+            </p:contentPart>
+          </mc:Choice>
+          <mc:Fallback>
+            <p:pic>
+              <p:nvPicPr>
+                <p:cNvPr id="11" name="Ink 10">
+                  <a:extLst>
+                    <a:ext uri="{FF2B5EF4-FFF2-40B4-BE49-F238E27FC236}">
+                      <a16:creationId xmlns:a16="http://schemas.microsoft.com/office/drawing/2014/main" id="{41494FAE-34AA-60F6-7DAB-69CC45821B0D}"/>
+                    </a:ext>
+                  </a:extLst>
+                </p:cNvPr>
+                <p:cNvPicPr/>
+                <p:nvPr/>
+              </p:nvPicPr>
+              <p:blipFill>
+                <a:blip r:embed="rId15"/>
+                <a:stretch>
+                  <a:fillRect/>
+                </a:stretch>
+              </p:blipFill>
+              <p:spPr>
+                <a:xfrm>
+                  <a:off x="6843644" y="3367791"/>
+                  <a:ext cx="348120" cy="172800"/>
+                </a:xfrm>
+                <a:prstGeom prst="rect">
+                  <a:avLst/>
+                </a:prstGeom>
+              </p:spPr>
+            </p:pic>
+          </mc:Fallback>
+        </mc:AlternateContent>
+      </p:grpSp>
+      <mc:AlternateContent xmlns:mc="http://schemas.openxmlformats.org/markup-compatibility/2006">
+        <mc:Choice xmlns:p14="http://schemas.microsoft.com/office/powerpoint/2010/main" Requires="p14">
+          <p:contentPart p14:bwMode="auto" r:id="rId16">
+            <p14:nvContentPartPr>
+              <p14:cNvPr id="14" name="Ink 13">
+                <a:extLst>
+                  <a:ext uri="{FF2B5EF4-FFF2-40B4-BE49-F238E27FC236}">
+                    <a16:creationId xmlns:a16="http://schemas.microsoft.com/office/drawing/2014/main" id="{0BCB3C41-C9E6-2F73-49E5-F9610D0E0DD8}"/>
+                  </a:ext>
+                </a:extLst>
+              </p14:cNvPr>
+              <p14:cNvContentPartPr/>
+              <p14:nvPr/>
+            </p14:nvContentPartPr>
+            <p14:xfrm>
+              <a:off x="8529884" y="3410631"/>
+              <a:ext cx="318240" cy="32760"/>
+            </p14:xfrm>
+          </p:contentPart>
+        </mc:Choice>
+        <mc:Fallback>
+          <p:pic>
+            <p:nvPicPr>
+              <p:cNvPr id="14" name="Ink 13">
+                <a:extLst>
+                  <a:ext uri="{FF2B5EF4-FFF2-40B4-BE49-F238E27FC236}">
+                    <a16:creationId xmlns:a16="http://schemas.microsoft.com/office/drawing/2014/main" id="{0BCB3C41-C9E6-2F73-49E5-F9610D0E0DD8}"/>
+                  </a:ext>
+                </a:extLst>
+              </p:cNvPr>
+              <p:cNvPicPr/>
+              <p:nvPr/>
+            </p:nvPicPr>
+            <p:blipFill>
+              <a:blip r:embed="rId17"/>
+              <a:stretch>
+                <a:fillRect/>
+              </a:stretch>
+            </p:blipFill>
+            <p:spPr>
+              <a:xfrm>
+                <a:off x="8466884" y="3347631"/>
+                <a:ext cx="443880" cy="158400"/>
+              </a:xfrm>
+              <a:prstGeom prst="rect">
+                <a:avLst/>
+              </a:prstGeom>
+            </p:spPr>
+          </p:pic>
+        </mc:Fallback>
+      </mc:AlternateContent>
+      <mc:AlternateContent xmlns:mc="http://schemas.openxmlformats.org/markup-compatibility/2006">
+        <mc:Choice xmlns:p14="http://schemas.microsoft.com/office/powerpoint/2010/main" Requires="p14">
+          <p:contentPart p14:bwMode="auto" r:id="rId18">
+            <p14:nvContentPartPr>
+              <p14:cNvPr id="15" name="Ink 14">
+                <a:extLst>
+                  <a:ext uri="{FF2B5EF4-FFF2-40B4-BE49-F238E27FC236}">
+                    <a16:creationId xmlns:a16="http://schemas.microsoft.com/office/drawing/2014/main" id="{B30BB316-24E8-30CA-F1EE-B415F1801CA6}"/>
+                  </a:ext>
+                </a:extLst>
+              </p14:cNvPr>
+              <p14:cNvContentPartPr/>
+              <p14:nvPr/>
+            </p14:nvContentPartPr>
+            <p14:xfrm>
+              <a:off x="4796684" y="4017231"/>
+              <a:ext cx="307440" cy="72360"/>
+            </p14:xfrm>
+          </p:contentPart>
+        </mc:Choice>
+        <mc:Fallback>
+          <p:pic>
+            <p:nvPicPr>
+              <p:cNvPr id="15" name="Ink 14">
+                <a:extLst>
+                  <a:ext uri="{FF2B5EF4-FFF2-40B4-BE49-F238E27FC236}">
+                    <a16:creationId xmlns:a16="http://schemas.microsoft.com/office/drawing/2014/main" id="{B30BB316-24E8-30CA-F1EE-B415F1801CA6}"/>
+                  </a:ext>
+                </a:extLst>
+              </p:cNvPr>
+              <p:cNvPicPr/>
+              <p:nvPr/>
+            </p:nvPicPr>
+            <p:blipFill>
+              <a:blip r:embed="rId19"/>
+              <a:stretch>
+                <a:fillRect/>
+              </a:stretch>
+            </p:blipFill>
+            <p:spPr>
+              <a:xfrm>
+                <a:off x="4733684" y="3954591"/>
+                <a:ext cx="433080" cy="198000"/>
+              </a:xfrm>
+              <a:prstGeom prst="rect">
+                <a:avLst/>
+              </a:prstGeom>
+            </p:spPr>
+          </p:pic>
+        </mc:Fallback>
+      </mc:AlternateContent>
+      <mc:AlternateContent xmlns:mc="http://schemas.openxmlformats.org/markup-compatibility/2006">
+        <mc:Choice xmlns:p14="http://schemas.microsoft.com/office/powerpoint/2010/main" Requires="p14">
+          <p:contentPart p14:bwMode="auto" r:id="rId20">
+            <p14:nvContentPartPr>
+              <p14:cNvPr id="16" name="Ink 15">
+                <a:extLst>
+                  <a:ext uri="{FF2B5EF4-FFF2-40B4-BE49-F238E27FC236}">
+                    <a16:creationId xmlns:a16="http://schemas.microsoft.com/office/drawing/2014/main" id="{2A4DB4E4-8432-B946-C18D-BBE172C857F2}"/>
+                  </a:ext>
+                </a:extLst>
+              </p14:cNvPr>
+              <p14:cNvContentPartPr/>
+              <p14:nvPr/>
+            </p14:nvContentPartPr>
+            <p14:xfrm>
+              <a:off x="6901964" y="4073391"/>
+              <a:ext cx="1838520" cy="431280"/>
+            </p14:xfrm>
+          </p:contentPart>
+        </mc:Choice>
+        <mc:Fallback>
+          <p:pic>
+            <p:nvPicPr>
+              <p:cNvPr id="16" name="Ink 15">
+                <a:extLst>
+                  <a:ext uri="{FF2B5EF4-FFF2-40B4-BE49-F238E27FC236}">
+                    <a16:creationId xmlns:a16="http://schemas.microsoft.com/office/drawing/2014/main" id="{2A4DB4E4-8432-B946-C18D-BBE172C857F2}"/>
+                  </a:ext>
+                </a:extLst>
+              </p:cNvPr>
+              <p:cNvPicPr/>
+              <p:nvPr/>
+            </p:nvPicPr>
+            <p:blipFill>
+              <a:blip r:embed="rId21"/>
+              <a:stretch>
+                <a:fillRect/>
+              </a:stretch>
+            </p:blipFill>
+            <p:spPr>
+              <a:xfrm>
+                <a:off x="6839324" y="4010751"/>
+                <a:ext cx="1964160" cy="556920"/>
+              </a:xfrm>
+              <a:prstGeom prst="rect">
+                <a:avLst/>
+              </a:prstGeom>
+            </p:spPr>
+          </p:pic>
+        </mc:Fallback>
+      </mc:AlternateContent>
+      <mc:AlternateContent xmlns:mc="http://schemas.openxmlformats.org/markup-compatibility/2006">
+        <mc:Choice xmlns:p14="http://schemas.microsoft.com/office/powerpoint/2010/main" Requires="p14">
+          <p:contentPart p14:bwMode="auto" r:id="rId22">
+            <p14:nvContentPartPr>
+              <p14:cNvPr id="17" name="Ink 16">
+                <a:extLst>
+                  <a:ext uri="{FF2B5EF4-FFF2-40B4-BE49-F238E27FC236}">
+                    <a16:creationId xmlns:a16="http://schemas.microsoft.com/office/drawing/2014/main" id="{E4622632-D49F-A910-CCF9-E9BC74AEE8D7}"/>
+                  </a:ext>
+                </a:extLst>
+              </p14:cNvPr>
+              <p14:cNvContentPartPr/>
+              <p14:nvPr/>
+            </p14:nvContentPartPr>
+            <p14:xfrm>
+              <a:off x="4820084" y="4915071"/>
+              <a:ext cx="226080" cy="3240"/>
+            </p14:xfrm>
+          </p:contentPart>
+        </mc:Choice>
+        <mc:Fallback>
+          <p:pic>
+            <p:nvPicPr>
+              <p:cNvPr id="17" name="Ink 16">
+                <a:extLst>
+                  <a:ext uri="{FF2B5EF4-FFF2-40B4-BE49-F238E27FC236}">
+                    <a16:creationId xmlns:a16="http://schemas.microsoft.com/office/drawing/2014/main" id="{E4622632-D49F-A910-CCF9-E9BC74AEE8D7}"/>
+                  </a:ext>
+                </a:extLst>
+              </p:cNvPr>
+              <p:cNvPicPr/>
+              <p:nvPr/>
+            </p:nvPicPr>
+            <p:blipFill>
+              <a:blip r:embed="rId23"/>
+              <a:stretch>
+                <a:fillRect/>
+              </a:stretch>
+            </p:blipFill>
+            <p:spPr>
+              <a:xfrm>
+                <a:off x="4757444" y="4852431"/>
+                <a:ext cx="351720" cy="128880"/>
+              </a:xfrm>
+              <a:prstGeom prst="rect">
+                <a:avLst/>
+              </a:prstGeom>
+            </p:spPr>
+          </p:pic>
+        </mc:Fallback>
+      </mc:AlternateContent>
+      <mc:AlternateContent xmlns:mc="http://schemas.openxmlformats.org/markup-compatibility/2006">
+        <mc:Choice xmlns:p14="http://schemas.microsoft.com/office/powerpoint/2010/main" Requires="p14">
+          <p:contentPart p14:bwMode="auto" r:id="rId24">
+            <p14:nvContentPartPr>
+              <p14:cNvPr id="18" name="Ink 17">
+                <a:extLst>
+                  <a:ext uri="{FF2B5EF4-FFF2-40B4-BE49-F238E27FC236}">
+                    <a16:creationId xmlns:a16="http://schemas.microsoft.com/office/drawing/2014/main" id="{C434B0D9-2750-37F0-305E-B60AADCCD247}"/>
+                  </a:ext>
+                </a:extLst>
+              </p14:cNvPr>
+              <p14:cNvContentPartPr/>
+              <p14:nvPr/>
+            </p14:nvContentPartPr>
+            <p14:xfrm>
+              <a:off x="6970364" y="4908591"/>
+              <a:ext cx="196920" cy="360"/>
+            </p14:xfrm>
+          </p:contentPart>
+        </mc:Choice>
+        <mc:Fallback>
+          <p:pic>
+            <p:nvPicPr>
+              <p:cNvPr id="18" name="Ink 17">
+                <a:extLst>
+                  <a:ext uri="{FF2B5EF4-FFF2-40B4-BE49-F238E27FC236}">
+                    <a16:creationId xmlns:a16="http://schemas.microsoft.com/office/drawing/2014/main" id="{C434B0D9-2750-37F0-305E-B60AADCCD247}"/>
+                  </a:ext>
+                </a:extLst>
+              </p:cNvPr>
+              <p:cNvPicPr/>
+              <p:nvPr/>
+            </p:nvPicPr>
+            <p:blipFill>
+              <a:blip r:embed="rId25"/>
+              <a:stretch>
+                <a:fillRect/>
+              </a:stretch>
+            </p:blipFill>
+            <p:spPr>
+              <a:xfrm>
+                <a:off x="6907724" y="4845951"/>
+                <a:ext cx="322560" cy="126000"/>
+              </a:xfrm>
+              <a:prstGeom prst="rect">
+                <a:avLst/>
+              </a:prstGeom>
+            </p:spPr>
+          </p:pic>
+        </mc:Fallback>
+      </mc:AlternateContent>
+      <mc:AlternateContent xmlns:mc="http://schemas.openxmlformats.org/markup-compatibility/2006">
+        <mc:Choice xmlns:p14="http://schemas.microsoft.com/office/powerpoint/2010/main" Requires="p14">
+          <p:contentPart p14:bwMode="auto" r:id="rId26">
+            <p14:nvContentPartPr>
+              <p14:cNvPr id="19" name="Ink 18">
+                <a:extLst>
+                  <a:ext uri="{FF2B5EF4-FFF2-40B4-BE49-F238E27FC236}">
+                    <a16:creationId xmlns:a16="http://schemas.microsoft.com/office/drawing/2014/main" id="{F09C3CD0-5BD0-FCB8-16B3-5F29CEA9FCA2}"/>
+                  </a:ext>
+                </a:extLst>
+              </p14:cNvPr>
+              <p14:cNvContentPartPr/>
+              <p14:nvPr/>
+            </p14:nvContentPartPr>
+            <p14:xfrm>
+              <a:off x="8547524" y="4899951"/>
+              <a:ext cx="235440" cy="8640"/>
+            </p14:xfrm>
+          </p:contentPart>
+        </mc:Choice>
+        <mc:Fallback>
+          <p:pic>
+            <p:nvPicPr>
+              <p:cNvPr id="19" name="Ink 18">
+                <a:extLst>
+                  <a:ext uri="{FF2B5EF4-FFF2-40B4-BE49-F238E27FC236}">
+                    <a16:creationId xmlns:a16="http://schemas.microsoft.com/office/drawing/2014/main" id="{F09C3CD0-5BD0-FCB8-16B3-5F29CEA9FCA2}"/>
+                  </a:ext>
+                </a:extLst>
+              </p:cNvPr>
+              <p:cNvPicPr/>
+              <p:nvPr/>
+            </p:nvPicPr>
+            <p:blipFill>
+              <a:blip r:embed="rId27"/>
+              <a:stretch>
+                <a:fillRect/>
+              </a:stretch>
+            </p:blipFill>
+            <p:spPr>
+              <a:xfrm>
+                <a:off x="8484884" y="4837311"/>
+                <a:ext cx="361080" cy="134280"/>
+              </a:xfrm>
+              <a:prstGeom prst="rect">
+                <a:avLst/>
+              </a:prstGeom>
+            </p:spPr>
+          </p:pic>
+        </mc:Fallback>
+      </mc:AlternateContent>
+    </p:spTree>
+    <p:extLst>
+      <p:ext uri="{BB962C8B-B14F-4D97-AF65-F5344CB8AC3E}">
+        <p14:creationId xmlns:p14="http://schemas.microsoft.com/office/powerpoint/2010/main" val="2087037758"/>
+      </p:ext>
+    </p:extLst>
+  </p:cSld>
+  <p:clrMapOvr>
+    <a:masterClrMapping/>
+  </p:clrMapOvr>
+  <p:timing>
+    <p:tnLst>
+      <p:par>
+        <p:cTn id="1" dur="indefinite" restart="never" nodeType="tmRoot">
+          <p:childTnLst>
+            <p:seq concurrent="1" nextAc="seek">
+              <p:cTn id="2" dur="indefinite" nodeType="mainSeq">
+                <p:childTnLst>
+                  <p:par>
+                    <p:cTn id="3" fill="hold">
+                      <p:stCondLst>
+                        <p:cond delay="indefinite"/>
+                      </p:stCondLst>
+                      <p:childTnLst>
+                        <p:par>
+                          <p:cTn id="4" fill="hold">
+                            <p:stCondLst>
+                              <p:cond delay="0"/>
+                            </p:stCondLst>
+                            <p:childTnLst>
+                              <p:par>
+                                <p:cTn id="5" presetID="1" presetClass="entr" presetSubtype="0" fill="hold" nodeType="clickEffect">
+                                  <p:stCondLst>
+                                    <p:cond delay="0"/>
+                                  </p:stCondLst>
+                                  <p:childTnLst>
+                                    <p:set>
+                                      <p:cBhvr>
+                                        <p:cTn id="6" dur="1" fill="hold">
+                                          <p:stCondLst>
+                                            <p:cond delay="0"/>
+                                          </p:stCondLst>
+                                        </p:cTn>
+                                        <p:tgtEl>
+                                          <p:spTgt spid="4">
+                                            <p:txEl>
+                                              <p:pRg st="12" end="12"/>
+                                            </p:txEl>
+                                          </p:spTgt>
+                                        </p:tgtEl>
+                                        <p:attrNameLst>
+                                          <p:attrName>style.visibility</p:attrName>
+                                        </p:attrNameLst>
+                                      </p:cBhvr>
+                                      <p:to>
+                                        <p:strVal val="visible"/>
+                                      </p:to>
+                                    </p:set>
+                                  </p:childTnLst>
+                                </p:cTn>
+                              </p:par>
+                            </p:childTnLst>
+                          </p:cTn>
+                        </p:par>
+                      </p:childTnLst>
+                    </p:cTn>
+                  </p:par>
+                  <p:par>
+                    <p:cTn id="7" fill="hold">
+                      <p:stCondLst>
+                        <p:cond delay="indefinite"/>
+                      </p:stCondLst>
+                      <p:childTnLst>
+                        <p:par>
+                          <p:cTn id="8" fill="hold">
+                            <p:stCondLst>
+                              <p:cond delay="0"/>
+                            </p:stCondLst>
+                            <p:childTnLst>
+                              <p:par>
+                                <p:cTn id="9" presetID="1" presetClass="entr" presetSubtype="0" fill="hold" nodeType="clickEffect">
+                                  <p:stCondLst>
+                                    <p:cond delay="0"/>
+                                  </p:stCondLst>
+                                  <p:childTnLst>
+                                    <p:set>
+                                      <p:cBhvr>
+                                        <p:cTn id="10" dur="1" fill="hold">
+                                          <p:stCondLst>
+                                            <p:cond delay="0"/>
+                                          </p:stCondLst>
+                                        </p:cTn>
+                                        <p:tgtEl>
+                                          <p:spTgt spid="4">
+                                            <p:txEl>
+                                              <p:pRg st="13" end="13"/>
+                                            </p:txEl>
+                                          </p:spTgt>
+                                        </p:tgtEl>
+                                        <p:attrNameLst>
+                                          <p:attrName>style.visibility</p:attrName>
+                                        </p:attrNameLst>
+                                      </p:cBhvr>
+                                      <p:to>
+                                        <p:strVal val="visible"/>
+                                      </p:to>
+                                    </p:set>
+                                  </p:childTnLst>
+                                </p:cTn>
+                              </p:par>
+                            </p:childTnLst>
+                          </p:cTn>
+                        </p:par>
+                      </p:childTnLst>
+                    </p:cTn>
+                  </p:par>
+                  <p:par>
+                    <p:cTn id="11" fill="hold">
+                      <p:stCondLst>
+                        <p:cond delay="indefinite"/>
+                      </p:stCondLst>
+                      <p:childTnLst>
+                        <p:par>
+                          <p:cTn id="12" fill="hold">
+                            <p:stCondLst>
+                              <p:cond delay="0"/>
+                            </p:stCondLst>
+                            <p:childTnLst>
+                              <p:par>
+                                <p:cTn id="13" presetID="1" presetClass="entr" presetSubtype="0" fill="hold" nodeType="clickEffect">
+                                  <p:stCondLst>
+                                    <p:cond delay="0"/>
+                                  </p:stCondLst>
+                                  <p:childTnLst>
+                                    <p:set>
+                                      <p:cBhvr>
+                                        <p:cTn id="14" dur="1" fill="hold">
+                                          <p:stCondLst>
+                                            <p:cond delay="0"/>
+                                          </p:stCondLst>
+                                        </p:cTn>
+                                        <p:tgtEl>
+                                          <p:spTgt spid="2"/>
+                                        </p:tgtEl>
+                                        <p:attrNameLst>
+                                          <p:attrName>style.visibility</p:attrName>
+                                        </p:attrNameLst>
+                                      </p:cBhvr>
+                                      <p:to>
+                                        <p:strVal val="visible"/>
+                                      </p:to>
+                                    </p:set>
+                                  </p:childTnLst>
+                                </p:cTn>
+                              </p:par>
+                              <p:par>
+                                <p:cTn id="15" presetID="1" presetClass="entr" presetSubtype="0" fill="hold" nodeType="withEffect">
+                                  <p:stCondLst>
+                                    <p:cond delay="0"/>
+                                  </p:stCondLst>
+                                  <p:childTnLst>
+                                    <p:set>
+                                      <p:cBhvr>
+                                        <p:cTn id="16" dur="1" fill="hold">
+                                          <p:stCondLst>
+                                            <p:cond delay="0"/>
+                                          </p:stCondLst>
+                                        </p:cTn>
+                                        <p:tgtEl>
+                                          <p:spTgt spid="6"/>
+                                        </p:tgtEl>
+                                        <p:attrNameLst>
+                                          <p:attrName>style.visibility</p:attrName>
+                                        </p:attrNameLst>
+                                      </p:cBhvr>
+                                      <p:to>
+                                        <p:strVal val="visible"/>
+                                      </p:to>
+                                    </p:set>
+                                  </p:childTnLst>
+                                </p:cTn>
+                              </p:par>
+                              <p:par>
+                                <p:cTn id="17" presetID="1" presetClass="entr" presetSubtype="0" fill="hold" nodeType="withEffect">
+                                  <p:stCondLst>
+                                    <p:cond delay="0"/>
+                                  </p:stCondLst>
+                                  <p:childTnLst>
+                                    <p:set>
+                                      <p:cBhvr>
+                                        <p:cTn id="18" dur="1" fill="hold">
+                                          <p:stCondLst>
+                                            <p:cond delay="0"/>
+                                          </p:stCondLst>
+                                        </p:cTn>
+                                        <p:tgtEl>
+                                          <p:spTgt spid="7"/>
+                                        </p:tgtEl>
+                                        <p:attrNameLst>
+                                          <p:attrName>style.visibility</p:attrName>
+                                        </p:attrNameLst>
+                                      </p:cBhvr>
+                                      <p:to>
+                                        <p:strVal val="visible"/>
+                                      </p:to>
+                                    </p:set>
+                                  </p:childTnLst>
+                                </p:cTn>
+                              </p:par>
+                              <p:par>
+                                <p:cTn id="19" presetID="1" presetClass="entr" presetSubtype="0" fill="hold" nodeType="withEffect">
+                                  <p:stCondLst>
+                                    <p:cond delay="0"/>
+                                  </p:stCondLst>
+                                  <p:childTnLst>
+                                    <p:set>
+                                      <p:cBhvr>
+                                        <p:cTn id="20" dur="1" fill="hold">
+                                          <p:stCondLst>
+                                            <p:cond delay="0"/>
+                                          </p:stCondLst>
+                                        </p:cTn>
+                                        <p:tgtEl>
+                                          <p:spTgt spid="8"/>
+                                        </p:tgtEl>
+                                        <p:attrNameLst>
+                                          <p:attrName>style.visibility</p:attrName>
+                                        </p:attrNameLst>
+                                      </p:cBhvr>
+                                      <p:to>
+                                        <p:strVal val="visible"/>
+                                      </p:to>
+                                    </p:set>
+                                  </p:childTnLst>
+                                </p:cTn>
+                              </p:par>
+                              <p:par>
+                                <p:cTn id="21" presetID="1" presetClass="entr" presetSubtype="0" fill="hold" nodeType="withEffect">
+                                  <p:stCondLst>
+                                    <p:cond delay="0"/>
+                                  </p:stCondLst>
+                                  <p:childTnLst>
+                                    <p:set>
+                                      <p:cBhvr>
+                                        <p:cTn id="22" dur="1" fill="hold">
+                                          <p:stCondLst>
+                                            <p:cond delay="0"/>
+                                          </p:stCondLst>
+                                        </p:cTn>
+                                        <p:tgtEl>
+                                          <p:spTgt spid="9"/>
+                                        </p:tgtEl>
+                                        <p:attrNameLst>
+                                          <p:attrName>style.visibility</p:attrName>
+                                        </p:attrNameLst>
+                                      </p:cBhvr>
+                                      <p:to>
+                                        <p:strVal val="visible"/>
+                                      </p:to>
+                                    </p:set>
+                                  </p:childTnLst>
+                                </p:cTn>
+                              </p:par>
+                              <p:par>
+                                <p:cTn id="23" presetID="1" presetClass="entr" presetSubtype="0" fill="hold" nodeType="withEffect">
+                                  <p:stCondLst>
+                                    <p:cond delay="0"/>
+                                  </p:stCondLst>
+                                  <p:childTnLst>
+                                    <p:set>
+                                      <p:cBhvr>
+                                        <p:cTn id="24" dur="1" fill="hold">
+                                          <p:stCondLst>
+                                            <p:cond delay="0"/>
+                                          </p:stCondLst>
+                                        </p:cTn>
+                                        <p:tgtEl>
+                                          <p:spTgt spid="13"/>
+                                        </p:tgtEl>
+                                        <p:attrNameLst>
+                                          <p:attrName>style.visibility</p:attrName>
+                                        </p:attrNameLst>
+                                      </p:cBhvr>
+                                      <p:to>
+                                        <p:strVal val="visible"/>
+                                      </p:to>
+                                    </p:set>
+                                  </p:childTnLst>
+                                </p:cTn>
+                              </p:par>
+                              <p:par>
+                                <p:cTn id="25" presetID="1" presetClass="entr" presetSubtype="0" fill="hold" nodeType="withEffect">
+                                  <p:stCondLst>
+                                    <p:cond delay="0"/>
+                                  </p:stCondLst>
+                                  <p:childTnLst>
+                                    <p:set>
+                                      <p:cBhvr>
+                                        <p:cTn id="26" dur="1" fill="hold">
+                                          <p:stCondLst>
+                                            <p:cond delay="0"/>
+                                          </p:stCondLst>
+                                        </p:cTn>
+                                        <p:tgtEl>
+                                          <p:spTgt spid="14"/>
+                                        </p:tgtEl>
+                                        <p:attrNameLst>
+                                          <p:attrName>style.visibility</p:attrName>
+                                        </p:attrNameLst>
+                                      </p:cBhvr>
+                                      <p:to>
+                                        <p:strVal val="visible"/>
+                                      </p:to>
+                                    </p:set>
+                                  </p:childTnLst>
+                                </p:cTn>
+                              </p:par>
+                              <p:par>
+                                <p:cTn id="27" presetID="1" presetClass="entr" presetSubtype="0" fill="hold" nodeType="withEffect">
+                                  <p:stCondLst>
+                                    <p:cond delay="0"/>
+                                  </p:stCondLst>
+                                  <p:childTnLst>
+                                    <p:set>
+                                      <p:cBhvr>
+                                        <p:cTn id="28" dur="1" fill="hold">
+                                          <p:stCondLst>
+                                            <p:cond delay="0"/>
+                                          </p:stCondLst>
+                                        </p:cTn>
+                                        <p:tgtEl>
+                                          <p:spTgt spid="15"/>
+                                        </p:tgtEl>
+                                        <p:attrNameLst>
+                                          <p:attrName>style.visibility</p:attrName>
+                                        </p:attrNameLst>
+                                      </p:cBhvr>
+                                      <p:to>
+                                        <p:strVal val="visible"/>
+                                      </p:to>
+                                    </p:set>
+                                  </p:childTnLst>
+                                </p:cTn>
+                              </p:par>
+                              <p:par>
+                                <p:cTn id="29" presetID="1" presetClass="entr" presetSubtype="0" fill="hold" nodeType="withEffect">
+                                  <p:stCondLst>
+                                    <p:cond delay="0"/>
+                                  </p:stCondLst>
+                                  <p:childTnLst>
+                                    <p:set>
+                                      <p:cBhvr>
+                                        <p:cTn id="30" dur="1" fill="hold">
+                                          <p:stCondLst>
+                                            <p:cond delay="0"/>
+                                          </p:stCondLst>
+                                        </p:cTn>
+                                        <p:tgtEl>
+                                          <p:spTgt spid="16"/>
+                                        </p:tgtEl>
+                                        <p:attrNameLst>
+                                          <p:attrName>style.visibility</p:attrName>
+                                        </p:attrNameLst>
+                                      </p:cBhvr>
+                                      <p:to>
+                                        <p:strVal val="visible"/>
+                                      </p:to>
+                                    </p:set>
+                                  </p:childTnLst>
+                                </p:cTn>
+                              </p:par>
+                              <p:par>
+                                <p:cTn id="31" presetID="1" presetClass="entr" presetSubtype="0" fill="hold" nodeType="withEffect">
+                                  <p:stCondLst>
+                                    <p:cond delay="0"/>
+                                  </p:stCondLst>
+                                  <p:childTnLst>
+                                    <p:set>
+                                      <p:cBhvr>
+                                        <p:cTn id="32" dur="1" fill="hold">
+                                          <p:stCondLst>
+                                            <p:cond delay="0"/>
+                                          </p:stCondLst>
+                                        </p:cTn>
+                                        <p:tgtEl>
+                                          <p:spTgt spid="17"/>
+                                        </p:tgtEl>
+                                        <p:attrNameLst>
+                                          <p:attrName>style.visibility</p:attrName>
+                                        </p:attrNameLst>
+                                      </p:cBhvr>
+                                      <p:to>
+                                        <p:strVal val="visible"/>
+                                      </p:to>
+                                    </p:set>
+                                  </p:childTnLst>
+                                </p:cTn>
+                              </p:par>
+                              <p:par>
+                                <p:cTn id="33" presetID="1" presetClass="entr" presetSubtype="0" fill="hold" nodeType="withEffect">
+                                  <p:stCondLst>
+                                    <p:cond delay="0"/>
+                                  </p:stCondLst>
+                                  <p:childTnLst>
+                                    <p:set>
+                                      <p:cBhvr>
+                                        <p:cTn id="34" dur="1" fill="hold">
+                                          <p:stCondLst>
+                                            <p:cond delay="0"/>
+                                          </p:stCondLst>
+                                        </p:cTn>
+                                        <p:tgtEl>
+                                          <p:spTgt spid="18"/>
+                                        </p:tgtEl>
+                                        <p:attrNameLst>
+                                          <p:attrName>style.visibility</p:attrName>
+                                        </p:attrNameLst>
+                                      </p:cBhvr>
+                                      <p:to>
+                                        <p:strVal val="visible"/>
+                                      </p:to>
+                                    </p:set>
+                                  </p:childTnLst>
+                                </p:cTn>
+                              </p:par>
+                              <p:par>
+                                <p:cTn id="35" presetID="1" presetClass="entr" presetSubtype="0" fill="hold" nodeType="withEffect">
+                                  <p:stCondLst>
+                                    <p:cond delay="0"/>
+                                  </p:stCondLst>
+                                  <p:childTnLst>
+                                    <p:set>
+                                      <p:cBhvr>
+                                        <p:cTn id="36" dur="1" fill="hold">
+                                          <p:stCondLst>
+                                            <p:cond delay="0"/>
+                                          </p:stCondLst>
+                                        </p:cTn>
+                                        <p:tgtEl>
+                                          <p:spTgt spid="19"/>
+                                        </p:tgtEl>
+                                        <p:attrNameLst>
+                                          <p:attrName>style.visibility</p:attrName>
+                                        </p:attrNameLst>
+                                      </p:cBhvr>
+                                      <p:to>
+                                        <p:strVal val="visible"/>
+                                      </p:to>
+                                    </p:set>
+                                  </p:childTnLst>
+                                </p:cTn>
+                              </p:par>
+                            </p:childTnLst>
+                          </p:cTn>
+                        </p:par>
+                      </p:childTnLst>
+                    </p:cTn>
+                  </p:par>
+                </p:childTnLst>
+              </p:cTn>
+              <p:prevCondLst>
+                <p:cond evt="onPrev" delay="0">
+                  <p:tgtEl>
+                    <p:sldTgt/>
+                  </p:tgtEl>
+                </p:cond>
+              </p:prevCondLst>
+              <p:nextCondLst>
+                <p:cond evt="onNext" delay="0">
+                  <p:tgtEl>
+                    <p:sldTgt/>
+                  </p:tgtEl>
+                </p:cond>
+              </p:nextCondLst>
+            </p:seq>
+          </p:childTnLst>
+        </p:cTn>
+      </p:par>
+    </p:tnLst>
+  </p:timing>
+</p:sld>
+</file>
+
+<file path=ppt/slides/slide45.xml><?xml version="1.0" encoding="utf-8"?>
+<p:sld xmlns:a="http://schemas.openxmlformats.org/drawingml/2006/main" xmlns:r="http://schemas.openxmlformats.org/officeDocument/2006/relationships" xmlns:p="http://schemas.openxmlformats.org/presentationml/2006/main">
+  <p:cSld>
+    <p:spTree>
+      <p:nvGrpSpPr>
+        <p:cNvPr id="1" name="">
+          <a:extLst>
+            <a:ext uri="{FF2B5EF4-FFF2-40B4-BE49-F238E27FC236}">
+              <a16:creationId xmlns:a16="http://schemas.microsoft.com/office/drawing/2014/main" id="{0B468CD1-8331-E08D-519E-DD8131F4FF49}"/>
+            </a:ext>
+          </a:extLst>
+        </p:cNvPr>
+        <p:cNvGrpSpPr/>
+        <p:nvPr/>
+      </p:nvGrpSpPr>
+      <p:grpSpPr>
+        <a:xfrm>
+          <a:off x="0" y="0"/>
+          <a:ext cx="0" cy="0"/>
+          <a:chOff x="0" y="0"/>
+          <a:chExt cx="0" cy="0"/>
+        </a:xfrm>
+      </p:grpSpPr>
+      <p:sp>
+        <p:nvSpPr>
+          <p:cNvPr id="3" name="Subtitle 2">
+            <a:extLst>
+              <a:ext uri="{FF2B5EF4-FFF2-40B4-BE49-F238E27FC236}">
+                <a16:creationId xmlns:a16="http://schemas.microsoft.com/office/drawing/2014/main" id="{DA70D04D-495C-88D4-45C4-6B777DC413F7}"/>
+              </a:ext>
+            </a:extLst>
+          </p:cNvPr>
+          <p:cNvSpPr>
+            <a:spLocks noGrp="1"/>
+          </p:cNvSpPr>
+          <p:nvPr>
+            <p:ph type="subTitle" idx="1"/>
+          </p:nvPr>
+        </p:nvSpPr>
+        <p:spPr>
+          <a:xfrm>
+            <a:off x="152399" y="217488"/>
+            <a:ext cx="11223171" cy="303212"/>
+          </a:xfrm>
+        </p:spPr>
+        <p:txBody>
+          <a:bodyPr>
+            <a:normAutofit fontScale="92500" lnSpcReduction="20000"/>
+          </a:bodyPr>
+          <a:lstStyle/>
+          <a:p>
+            <a:r>
+              <a:rPr lang="en-US" sz="1800" b="1"/>
+              <a:t>Chapter 9 – Collections and Generics</a:t>
+            </a:r>
+          </a:p>
+        </p:txBody>
+      </p:sp>
+      <p:sp>
+        <p:nvSpPr>
+          <p:cNvPr id="4" name="Subtitle 2">
+            <a:extLst>
+              <a:ext uri="{FF2B5EF4-FFF2-40B4-BE49-F238E27FC236}">
+                <a16:creationId xmlns:a16="http://schemas.microsoft.com/office/drawing/2014/main" id="{E1ADA3A9-0084-EABC-242C-33990A8B7759}"/>
+              </a:ext>
+            </a:extLst>
+          </p:cNvPr>
+          <p:cNvSpPr txBox="1">
+            <a:spLocks/>
+          </p:cNvSpPr>
+          <p:nvPr/>
+        </p:nvSpPr>
+        <p:spPr>
+          <a:xfrm>
+            <a:off x="0" y="820738"/>
+            <a:ext cx="12192000" cy="6037262"/>
+          </a:xfrm>
+          <a:prstGeom prst="rect">
+            <a:avLst/>
+          </a:prstGeom>
+        </p:spPr>
+        <p:txBody>
+          <a:bodyPr vert="horz" lIns="91440" tIns="45720" rIns="91440" bIns="45720" rtlCol="0">
+            <a:normAutofit/>
+          </a:bodyPr>
+          <a:lstStyle>
+            <a:lvl1pPr marL="0" indent="0" algn="ctr" defTabSz="914400" rtl="0" eaLnBrk="1" latinLnBrk="0" hangingPunct="1">
+              <a:lnSpc>
+                <a:spcPct val="90000"/>
+              </a:lnSpc>
+              <a:spcBef>
+                <a:spcPts val="1000"/>
+              </a:spcBef>
+              <a:buFont typeface="Arial" panose="020B0604020202020204" pitchFamily="34" charset="0"/>
+              <a:buNone/>
+              <a:defRPr sz="2400" kern="1200">
+                <a:solidFill>
+                  <a:schemeClr val="tx1"/>
+                </a:solidFill>
+                <a:latin typeface="+mn-lt"/>
+                <a:ea typeface="+mn-ea"/>
+                <a:cs typeface="+mn-cs"/>
+              </a:defRPr>
+            </a:lvl1pPr>
+            <a:lvl2pPr marL="457200" indent="0" algn="ctr" defTabSz="914400" rtl="0" eaLnBrk="1" latinLnBrk="0" hangingPunct="1">
+              <a:lnSpc>
+                <a:spcPct val="90000"/>
+              </a:lnSpc>
+              <a:spcBef>
+                <a:spcPts val="500"/>
+              </a:spcBef>
+              <a:buFont typeface="Arial" panose="020B0604020202020204" pitchFamily="34" charset="0"/>
+              <a:buNone/>
+              <a:defRPr sz="2000" kern="1200">
+                <a:solidFill>
+                  <a:schemeClr val="tx1"/>
+                </a:solidFill>
+                <a:latin typeface="+mn-lt"/>
+                <a:ea typeface="+mn-ea"/>
+                <a:cs typeface="+mn-cs"/>
+              </a:defRPr>
+            </a:lvl2pPr>
+            <a:lvl3pPr marL="914400" indent="0" algn="ctr" defTabSz="914400" rtl="0" eaLnBrk="1" latinLnBrk="0" hangingPunct="1">
+              <a:lnSpc>
+                <a:spcPct val="90000"/>
+              </a:lnSpc>
+              <a:spcBef>
+                <a:spcPts val="500"/>
+              </a:spcBef>
+              <a:buFont typeface="Arial" panose="020B0604020202020204" pitchFamily="34" charset="0"/>
+              <a:buNone/>
+              <a:defRPr sz="1800" kern="1200">
+                <a:solidFill>
+                  <a:schemeClr val="tx1"/>
+                </a:solidFill>
+                <a:latin typeface="+mn-lt"/>
+                <a:ea typeface="+mn-ea"/>
+                <a:cs typeface="+mn-cs"/>
+              </a:defRPr>
+            </a:lvl3pPr>
+            <a:lvl4pPr marL="1371600" indent="0" algn="ctr" defTabSz="914400" rtl="0" eaLnBrk="1" latinLnBrk="0" hangingPunct="1">
+              <a:lnSpc>
+                <a:spcPct val="90000"/>
+              </a:lnSpc>
+              <a:spcBef>
+                <a:spcPts val="500"/>
+              </a:spcBef>
+              <a:buFont typeface="Arial" panose="020B0604020202020204" pitchFamily="34" charset="0"/>
+              <a:buNone/>
+              <a:defRPr sz="1600" kern="1200">
+                <a:solidFill>
+                  <a:schemeClr val="tx1"/>
+                </a:solidFill>
+                <a:latin typeface="+mn-lt"/>
+                <a:ea typeface="+mn-ea"/>
+                <a:cs typeface="+mn-cs"/>
+              </a:defRPr>
+            </a:lvl4pPr>
+            <a:lvl5pPr marL="1828800" indent="0" algn="ctr" defTabSz="914400" rtl="0" eaLnBrk="1" latinLnBrk="0" hangingPunct="1">
+              <a:lnSpc>
+                <a:spcPct val="90000"/>
+              </a:lnSpc>
+              <a:spcBef>
+                <a:spcPts val="500"/>
+              </a:spcBef>
+              <a:buFont typeface="Arial" panose="020B0604020202020204" pitchFamily="34" charset="0"/>
+              <a:buNone/>
+              <a:defRPr sz="1600" kern="1200">
+                <a:solidFill>
+                  <a:schemeClr val="tx1"/>
+                </a:solidFill>
+                <a:latin typeface="+mn-lt"/>
+                <a:ea typeface="+mn-ea"/>
+                <a:cs typeface="+mn-cs"/>
+              </a:defRPr>
+            </a:lvl5pPr>
+            <a:lvl6pPr marL="2286000" indent="0" algn="ctr" defTabSz="914400" rtl="0" eaLnBrk="1" latinLnBrk="0" hangingPunct="1">
+              <a:lnSpc>
+                <a:spcPct val="90000"/>
+              </a:lnSpc>
+              <a:spcBef>
+                <a:spcPts val="500"/>
+              </a:spcBef>
+              <a:buFont typeface="Arial" panose="020B0604020202020204" pitchFamily="34" charset="0"/>
+              <a:buNone/>
+              <a:defRPr sz="1600" kern="1200">
+                <a:solidFill>
+                  <a:schemeClr val="tx1"/>
+                </a:solidFill>
+                <a:latin typeface="+mn-lt"/>
+                <a:ea typeface="+mn-ea"/>
+                <a:cs typeface="+mn-cs"/>
+              </a:defRPr>
+            </a:lvl6pPr>
+            <a:lvl7pPr marL="2743200" indent="0" algn="ctr" defTabSz="914400" rtl="0" eaLnBrk="1" latinLnBrk="0" hangingPunct="1">
+              <a:lnSpc>
+                <a:spcPct val="90000"/>
+              </a:lnSpc>
+              <a:spcBef>
+                <a:spcPts val="500"/>
+              </a:spcBef>
+              <a:buFont typeface="Arial" panose="020B0604020202020204" pitchFamily="34" charset="0"/>
+              <a:buNone/>
+              <a:defRPr sz="1600" kern="1200">
+                <a:solidFill>
+                  <a:schemeClr val="tx1"/>
+                </a:solidFill>
+                <a:latin typeface="+mn-lt"/>
+                <a:ea typeface="+mn-ea"/>
+                <a:cs typeface="+mn-cs"/>
+              </a:defRPr>
+            </a:lvl7pPr>
+            <a:lvl8pPr marL="3200400" indent="0" algn="ctr" defTabSz="914400" rtl="0" eaLnBrk="1" latinLnBrk="0" hangingPunct="1">
+              <a:lnSpc>
+                <a:spcPct val="90000"/>
+              </a:lnSpc>
+              <a:spcBef>
+                <a:spcPts val="500"/>
+              </a:spcBef>
+              <a:buFont typeface="Arial" panose="020B0604020202020204" pitchFamily="34" charset="0"/>
+              <a:buNone/>
+              <a:defRPr sz="1600" kern="1200">
+                <a:solidFill>
+                  <a:schemeClr val="tx1"/>
+                </a:solidFill>
+                <a:latin typeface="+mn-lt"/>
+                <a:ea typeface="+mn-ea"/>
+                <a:cs typeface="+mn-cs"/>
+              </a:defRPr>
+            </a:lvl8pPr>
+            <a:lvl9pPr marL="3657600" indent="0" algn="ctr" defTabSz="914400" rtl="0" eaLnBrk="1" latinLnBrk="0" hangingPunct="1">
+              <a:lnSpc>
+                <a:spcPct val="90000"/>
+              </a:lnSpc>
+              <a:spcBef>
+                <a:spcPts val="500"/>
+              </a:spcBef>
+              <a:buFont typeface="Arial" panose="020B0604020202020204" pitchFamily="34" charset="0"/>
+              <a:buNone/>
+              <a:defRPr sz="1600" kern="1200">
+                <a:solidFill>
+                  <a:schemeClr val="tx1"/>
+                </a:solidFill>
+                <a:latin typeface="+mn-lt"/>
+                <a:ea typeface="+mn-ea"/>
+                <a:cs typeface="+mn-cs"/>
+              </a:defRPr>
+            </a:lvl9pPr>
+          </a:lstStyle>
+          <a:p>
+            <a:pPr algn="l"/>
+            <a:endParaRPr lang="en-US" sz="1800">
+              <a:sym typeface="Wingdings" pitchFamily="2" charset="2"/>
+            </a:endParaRPr>
+          </a:p>
+        </p:txBody>
+      </p:sp>
+      <p:pic>
+        <p:nvPicPr>
+          <p:cNvPr id="5" name="Picture 4">
+            <a:extLst>
+              <a:ext uri="{FF2B5EF4-FFF2-40B4-BE49-F238E27FC236}">
+                <a16:creationId xmlns:a16="http://schemas.microsoft.com/office/drawing/2014/main" id="{C075222F-2DDB-497C-F2F4-4C591130BA84}"/>
+              </a:ext>
+            </a:extLst>
+          </p:cNvPr>
+          <p:cNvPicPr>
+            <a:picLocks noChangeAspect="1"/>
+          </p:cNvPicPr>
+          <p:nvPr/>
+        </p:nvPicPr>
+        <p:blipFill>
+          <a:blip r:embed="rId3"/>
+          <a:stretch>
+            <a:fillRect/>
+          </a:stretch>
+        </p:blipFill>
+        <p:spPr>
+          <a:xfrm>
+            <a:off x="2286000" y="2876550"/>
+            <a:ext cx="7620000" cy="1104900"/>
+          </a:xfrm>
+          <a:prstGeom prst="rect">
+            <a:avLst/>
+          </a:prstGeom>
+        </p:spPr>
+      </p:pic>
+    </p:spTree>
+    <p:extLst>
+      <p:ext uri="{BB962C8B-B14F-4D97-AF65-F5344CB8AC3E}">
+        <p14:creationId xmlns:p14="http://schemas.microsoft.com/office/powerpoint/2010/main" val="1189984612"/>
+      </p:ext>
+    </p:extLst>
+  </p:cSld>
+  <p:clrMapOvr>
+    <a:masterClrMapping/>
+  </p:clrMapOvr>
+</p:sld>
+</file>
+
+<file path=ppt/slides/slide46.xml><?xml version="1.0" encoding="utf-8"?>
+<p:sld xmlns:a="http://schemas.openxmlformats.org/drawingml/2006/main" xmlns:r="http://schemas.openxmlformats.org/officeDocument/2006/relationships" xmlns:p="http://schemas.openxmlformats.org/presentationml/2006/main">
+  <p:cSld>
+    <p:spTree>
+      <p:nvGrpSpPr>
+        <p:cNvPr id="1" name="">
+          <a:extLst>
+            <a:ext uri="{FF2B5EF4-FFF2-40B4-BE49-F238E27FC236}">
+              <a16:creationId xmlns:a16="http://schemas.microsoft.com/office/drawing/2014/main" id="{BEB55F46-08E7-ACE4-5F91-2664BC56E831}"/>
+            </a:ext>
+          </a:extLst>
+        </p:cNvPr>
+        <p:cNvGrpSpPr/>
+        <p:nvPr/>
+      </p:nvGrpSpPr>
+      <p:grpSpPr>
+        <a:xfrm>
+          <a:off x="0" y="0"/>
+          <a:ext cx="0" cy="0"/>
+          <a:chOff x="0" y="0"/>
+          <a:chExt cx="0" cy="0"/>
+        </a:xfrm>
+      </p:grpSpPr>
+      <p:sp>
+        <p:nvSpPr>
+          <p:cNvPr id="3" name="Subtitle 2">
+            <a:extLst>
+              <a:ext uri="{FF2B5EF4-FFF2-40B4-BE49-F238E27FC236}">
+                <a16:creationId xmlns:a16="http://schemas.microsoft.com/office/drawing/2014/main" id="{AFEC0EC7-43F7-03A0-9F90-1C2E5D870B1D}"/>
+              </a:ext>
+            </a:extLst>
+          </p:cNvPr>
+          <p:cNvSpPr>
+            <a:spLocks noGrp="1"/>
+          </p:cNvSpPr>
+          <p:nvPr>
+            <p:ph type="subTitle" idx="1"/>
+          </p:nvPr>
+        </p:nvSpPr>
+        <p:spPr>
+          <a:xfrm>
+            <a:off x="152399" y="217488"/>
+            <a:ext cx="11223171" cy="303212"/>
+          </a:xfrm>
+        </p:spPr>
+        <p:txBody>
+          <a:bodyPr>
+            <a:normAutofit fontScale="92500" lnSpcReduction="20000"/>
+          </a:bodyPr>
+          <a:lstStyle/>
+          <a:p>
+            <a:r>
+              <a:rPr lang="en-US" sz="1800" b="1"/>
+              <a:t>Chapter 9 – Collections and Generics</a:t>
+            </a:r>
+          </a:p>
+        </p:txBody>
+      </p:sp>
+      <p:sp>
+        <p:nvSpPr>
+          <p:cNvPr id="4" name="Subtitle 2">
+            <a:extLst>
+              <a:ext uri="{FF2B5EF4-FFF2-40B4-BE49-F238E27FC236}">
+                <a16:creationId xmlns:a16="http://schemas.microsoft.com/office/drawing/2014/main" id="{194B4533-6F37-73FC-1B76-537B052A3457}"/>
+              </a:ext>
+            </a:extLst>
+          </p:cNvPr>
+          <p:cNvSpPr txBox="1">
+            <a:spLocks/>
+          </p:cNvSpPr>
+          <p:nvPr/>
+        </p:nvSpPr>
+        <p:spPr>
+          <a:xfrm>
+            <a:off x="0" y="820738"/>
+            <a:ext cx="12192000" cy="6037262"/>
+          </a:xfrm>
+          <a:prstGeom prst="rect">
+            <a:avLst/>
+          </a:prstGeom>
+        </p:spPr>
+        <p:txBody>
+          <a:bodyPr vert="horz" lIns="91440" tIns="45720" rIns="91440" bIns="45720" rtlCol="0">
+            <a:normAutofit/>
+          </a:bodyPr>
+          <a:lstStyle>
+            <a:lvl1pPr marL="0" indent="0" algn="ctr" defTabSz="914400" rtl="0" eaLnBrk="1" latinLnBrk="0" hangingPunct="1">
+              <a:lnSpc>
+                <a:spcPct val="90000"/>
+              </a:lnSpc>
+              <a:spcBef>
+                <a:spcPts val="1000"/>
+              </a:spcBef>
+              <a:buFont typeface="Arial" panose="020B0604020202020204" pitchFamily="34" charset="0"/>
+              <a:buNone/>
+              <a:defRPr sz="2400" kern="1200">
+                <a:solidFill>
+                  <a:schemeClr val="tx1"/>
+                </a:solidFill>
+                <a:latin typeface="+mn-lt"/>
+                <a:ea typeface="+mn-ea"/>
+                <a:cs typeface="+mn-cs"/>
+              </a:defRPr>
+            </a:lvl1pPr>
+            <a:lvl2pPr marL="457200" indent="0" algn="ctr" defTabSz="914400" rtl="0" eaLnBrk="1" latinLnBrk="0" hangingPunct="1">
+              <a:lnSpc>
+                <a:spcPct val="90000"/>
+              </a:lnSpc>
+              <a:spcBef>
+                <a:spcPts val="500"/>
+              </a:spcBef>
+              <a:buFont typeface="Arial" panose="020B0604020202020204" pitchFamily="34" charset="0"/>
+              <a:buNone/>
+              <a:defRPr sz="2000" kern="1200">
+                <a:solidFill>
+                  <a:schemeClr val="tx1"/>
+                </a:solidFill>
+                <a:latin typeface="+mn-lt"/>
+                <a:ea typeface="+mn-ea"/>
+                <a:cs typeface="+mn-cs"/>
+              </a:defRPr>
+            </a:lvl2pPr>
+            <a:lvl3pPr marL="914400" indent="0" algn="ctr" defTabSz="914400" rtl="0" eaLnBrk="1" latinLnBrk="0" hangingPunct="1">
+              <a:lnSpc>
+                <a:spcPct val="90000"/>
+              </a:lnSpc>
+              <a:spcBef>
+                <a:spcPts val="500"/>
+              </a:spcBef>
+              <a:buFont typeface="Arial" panose="020B0604020202020204" pitchFamily="34" charset="0"/>
+              <a:buNone/>
+              <a:defRPr sz="1800" kern="1200">
+                <a:solidFill>
+                  <a:schemeClr val="tx1"/>
+                </a:solidFill>
+                <a:latin typeface="+mn-lt"/>
+                <a:ea typeface="+mn-ea"/>
+                <a:cs typeface="+mn-cs"/>
+              </a:defRPr>
+            </a:lvl3pPr>
+            <a:lvl4pPr marL="1371600" indent="0" algn="ctr" defTabSz="914400" rtl="0" eaLnBrk="1" latinLnBrk="0" hangingPunct="1">
+              <a:lnSpc>
+                <a:spcPct val="90000"/>
+              </a:lnSpc>
+              <a:spcBef>
+                <a:spcPts val="500"/>
+              </a:spcBef>
+              <a:buFont typeface="Arial" panose="020B0604020202020204" pitchFamily="34" charset="0"/>
+              <a:buNone/>
+              <a:defRPr sz="1600" kern="1200">
+                <a:solidFill>
+                  <a:schemeClr val="tx1"/>
+                </a:solidFill>
+                <a:latin typeface="+mn-lt"/>
+                <a:ea typeface="+mn-ea"/>
+                <a:cs typeface="+mn-cs"/>
+              </a:defRPr>
+            </a:lvl4pPr>
+            <a:lvl5pPr marL="1828800" indent="0" algn="ctr" defTabSz="914400" rtl="0" eaLnBrk="1" latinLnBrk="0" hangingPunct="1">
+              <a:lnSpc>
+                <a:spcPct val="90000"/>
+              </a:lnSpc>
+              <a:spcBef>
+                <a:spcPts val="500"/>
+              </a:spcBef>
+              <a:buFont typeface="Arial" panose="020B0604020202020204" pitchFamily="34" charset="0"/>
+              <a:buNone/>
+              <a:defRPr sz="1600" kern="1200">
+                <a:solidFill>
+                  <a:schemeClr val="tx1"/>
+                </a:solidFill>
+                <a:latin typeface="+mn-lt"/>
+                <a:ea typeface="+mn-ea"/>
+                <a:cs typeface="+mn-cs"/>
+              </a:defRPr>
+            </a:lvl5pPr>
+            <a:lvl6pPr marL="2286000" indent="0" algn="ctr" defTabSz="914400" rtl="0" eaLnBrk="1" latinLnBrk="0" hangingPunct="1">
+              <a:lnSpc>
+                <a:spcPct val="90000"/>
+              </a:lnSpc>
+              <a:spcBef>
+                <a:spcPts val="500"/>
+              </a:spcBef>
+              <a:buFont typeface="Arial" panose="020B0604020202020204" pitchFamily="34" charset="0"/>
+              <a:buNone/>
+              <a:defRPr sz="1600" kern="1200">
+                <a:solidFill>
+                  <a:schemeClr val="tx1"/>
+                </a:solidFill>
+                <a:latin typeface="+mn-lt"/>
+                <a:ea typeface="+mn-ea"/>
+                <a:cs typeface="+mn-cs"/>
+              </a:defRPr>
+            </a:lvl6pPr>
+            <a:lvl7pPr marL="2743200" indent="0" algn="ctr" defTabSz="914400" rtl="0" eaLnBrk="1" latinLnBrk="0" hangingPunct="1">
+              <a:lnSpc>
+                <a:spcPct val="90000"/>
+              </a:lnSpc>
+              <a:spcBef>
+                <a:spcPts val="500"/>
+              </a:spcBef>
+              <a:buFont typeface="Arial" panose="020B0604020202020204" pitchFamily="34" charset="0"/>
+              <a:buNone/>
+              <a:defRPr sz="1600" kern="1200">
+                <a:solidFill>
+                  <a:schemeClr val="tx1"/>
+                </a:solidFill>
+                <a:latin typeface="+mn-lt"/>
+                <a:ea typeface="+mn-ea"/>
+                <a:cs typeface="+mn-cs"/>
+              </a:defRPr>
+            </a:lvl7pPr>
+            <a:lvl8pPr marL="3200400" indent="0" algn="ctr" defTabSz="914400" rtl="0" eaLnBrk="1" latinLnBrk="0" hangingPunct="1">
+              <a:lnSpc>
+                <a:spcPct val="90000"/>
+              </a:lnSpc>
+              <a:spcBef>
+                <a:spcPts val="500"/>
+              </a:spcBef>
+              <a:buFont typeface="Arial" panose="020B0604020202020204" pitchFamily="34" charset="0"/>
+              <a:buNone/>
+              <a:defRPr sz="1600" kern="1200">
+                <a:solidFill>
+                  <a:schemeClr val="tx1"/>
+                </a:solidFill>
+                <a:latin typeface="+mn-lt"/>
+                <a:ea typeface="+mn-ea"/>
+                <a:cs typeface="+mn-cs"/>
+              </a:defRPr>
+            </a:lvl8pPr>
+            <a:lvl9pPr marL="3657600" indent="0" algn="ctr" defTabSz="914400" rtl="0" eaLnBrk="1" latinLnBrk="0" hangingPunct="1">
+              <a:lnSpc>
+                <a:spcPct val="90000"/>
+              </a:lnSpc>
+              <a:spcBef>
+                <a:spcPts val="500"/>
+              </a:spcBef>
+              <a:buFont typeface="Arial" panose="020B0604020202020204" pitchFamily="34" charset="0"/>
+              <a:buNone/>
+              <a:defRPr sz="1600" kern="1200">
+                <a:solidFill>
+                  <a:schemeClr val="tx1"/>
+                </a:solidFill>
+                <a:latin typeface="+mn-lt"/>
+                <a:ea typeface="+mn-ea"/>
+                <a:cs typeface="+mn-cs"/>
+              </a:defRPr>
+            </a:lvl9pPr>
+          </a:lstStyle>
+          <a:p>
+            <a:pPr algn="l"/>
+            <a:r>
+              <a:rPr lang="en-US" sz="1800">
+                <a:sym typeface="Wingdings" pitchFamily="2" charset="2"/>
+              </a:rPr>
+              <a:t>(code illustration snippet 80)</a:t>
+            </a:r>
+          </a:p>
+          <a:p>
+            <a:pPr algn="l"/>
+            <a:r>
+              <a:rPr lang="en-US" sz="1800" b="1">
+                <a:sym typeface="Wingdings" pitchFamily="2" charset="2"/>
+              </a:rPr>
+              <a:t>Combining Generic Declarations</a:t>
+            </a:r>
+            <a:endParaRPr lang="en-US" sz="1800">
+              <a:sym typeface="Wingdings" pitchFamily="2" charset="2"/>
+            </a:endParaRPr>
+          </a:p>
+          <a:p>
+            <a:pPr algn="l"/>
+            <a:r>
+              <a:rPr lang="en-US" sz="1800">
+                <a:sym typeface="Wingdings" pitchFamily="2" charset="2"/>
+              </a:rPr>
+              <a:t>(code illustration snippet 81)</a:t>
+            </a:r>
+          </a:p>
+          <a:p>
+            <a:pPr algn="l"/>
+            <a:r>
+              <a:rPr lang="en-US" sz="1800">
+                <a:sym typeface="Wingdings" pitchFamily="2" charset="2"/>
+              </a:rPr>
+              <a:t>(code illustration snippet 82)</a:t>
+            </a:r>
+          </a:p>
+          <a:p>
+            <a:pPr algn="l"/>
+            <a:r>
+              <a:rPr lang="en-US" sz="1800" b="1">
+                <a:sym typeface="Wingdings" pitchFamily="2" charset="2"/>
+              </a:rPr>
+              <a:t>Passing Generic Argument</a:t>
+            </a:r>
+          </a:p>
+          <a:p>
+            <a:pPr algn="l"/>
+            <a:r>
+              <a:rPr lang="en-US" sz="1800">
+                <a:sym typeface="Wingdings" pitchFamily="2" charset="2"/>
+              </a:rPr>
+              <a:t>(code illustration snippet 83,84,85,86,87)</a:t>
+            </a:r>
+          </a:p>
+          <a:p>
+            <a:pPr algn="l"/>
+            <a:endParaRPr lang="en-US" sz="1800">
+              <a:sym typeface="Wingdings" pitchFamily="2" charset="2"/>
+            </a:endParaRPr>
+          </a:p>
+          <a:p>
+            <a:pPr algn="l"/>
+            <a:r>
+              <a:rPr lang="en-US" sz="1800">
+                <a:sym typeface="Wingdings" pitchFamily="2" charset="2"/>
+              </a:rPr>
+              <a:t>- this chapter is hard bruh</a:t>
+            </a:r>
+          </a:p>
+        </p:txBody>
+      </p:sp>
+    </p:spTree>
+    <p:extLst>
+      <p:ext uri="{BB962C8B-B14F-4D97-AF65-F5344CB8AC3E}">
+        <p14:creationId xmlns:p14="http://schemas.microsoft.com/office/powerpoint/2010/main" val="5516092"/>
+      </p:ext>
+    </p:extLst>
+  </p:cSld>
+  <p:clrMapOvr>
+    <a:masterClrMapping/>
+  </p:clrMapOvr>
+  <p:timing>
+    <p:tnLst>
+      <p:par>
+        <p:cTn id="1" dur="indefinite" restart="never" nodeType="tmRoot">
+          <p:childTnLst>
+            <p:seq concurrent="1" nextAc="seek">
+              <p:cTn id="2" dur="indefinite" nodeType="mainSeq">
+                <p:childTnLst>
+                  <p:par>
+                    <p:cTn id="3" fill="hold">
+                      <p:stCondLst>
+                        <p:cond delay="indefinite"/>
+                      </p:stCondLst>
+                      <p:childTnLst>
+                        <p:par>
+                          <p:cTn id="4" fill="hold">
+                            <p:stCondLst>
+                              <p:cond delay="0"/>
+                            </p:stCondLst>
+                            <p:childTnLst>
+                              <p:par>
+                                <p:cTn id="5" presetID="1" presetClass="entr" presetSubtype="0" fill="hold" nodeType="clickEffect">
+                                  <p:stCondLst>
+                                    <p:cond delay="0"/>
+                                  </p:stCondLst>
+                                  <p:childTnLst>
+                                    <p:set>
+                                      <p:cBhvr>
+                                        <p:cTn id="6" dur="1" fill="hold">
+                                          <p:stCondLst>
+                                            <p:cond delay="0"/>
+                                          </p:stCondLst>
+                                        </p:cTn>
+                                        <p:tgtEl>
+                                          <p:spTgt spid="4">
+                                            <p:txEl>
+                                              <p:pRg st="0" end="0"/>
+                                            </p:txEl>
+                                          </p:spTgt>
+                                        </p:tgtEl>
+                                        <p:attrNameLst>
+                                          <p:attrName>style.visibility</p:attrName>
+                                        </p:attrNameLst>
+                                      </p:cBhvr>
+                                      <p:to>
+                                        <p:strVal val="visible"/>
+                                      </p:to>
+                                    </p:set>
+                                  </p:childTnLst>
+                                </p:cTn>
+                              </p:par>
+                            </p:childTnLst>
+                          </p:cTn>
+                        </p:par>
+                      </p:childTnLst>
+                    </p:cTn>
+                  </p:par>
+                  <p:par>
+                    <p:cTn id="7" fill="hold">
+                      <p:stCondLst>
+                        <p:cond delay="indefinite"/>
+                      </p:stCondLst>
+                      <p:childTnLst>
+                        <p:par>
+                          <p:cTn id="8" fill="hold">
+                            <p:stCondLst>
+                              <p:cond delay="0"/>
+                            </p:stCondLst>
+                            <p:childTnLst>
+                              <p:par>
+                                <p:cTn id="9" presetID="1" presetClass="entr" presetSubtype="0" fill="hold" nodeType="clickEffect">
+                                  <p:stCondLst>
+                                    <p:cond delay="0"/>
+                                  </p:stCondLst>
+                                  <p:childTnLst>
+                                    <p:set>
+                                      <p:cBhvr>
+                                        <p:cTn id="10" dur="1" fill="hold">
+                                          <p:stCondLst>
+                                            <p:cond delay="0"/>
+                                          </p:stCondLst>
+                                        </p:cTn>
+                                        <p:tgtEl>
+                                          <p:spTgt spid="4">
+                                            <p:txEl>
+                                              <p:pRg st="1" end="1"/>
+                                            </p:txEl>
+                                          </p:spTgt>
+                                        </p:tgtEl>
+                                        <p:attrNameLst>
+                                          <p:attrName>style.visibility</p:attrName>
+                                        </p:attrNameLst>
+                                      </p:cBhvr>
+                                      <p:to>
+                                        <p:strVal val="visible"/>
+                                      </p:to>
+                                    </p:set>
+                                  </p:childTnLst>
+                                </p:cTn>
+                              </p:par>
+                            </p:childTnLst>
+                          </p:cTn>
+                        </p:par>
+                      </p:childTnLst>
+                    </p:cTn>
+                  </p:par>
+                  <p:par>
+                    <p:cTn id="11" fill="hold">
+                      <p:stCondLst>
+                        <p:cond delay="indefinite"/>
+                      </p:stCondLst>
+                      <p:childTnLst>
+                        <p:par>
+                          <p:cTn id="12" fill="hold">
+                            <p:stCondLst>
+                              <p:cond delay="0"/>
+                            </p:stCondLst>
+                            <p:childTnLst>
+                              <p:par>
+                                <p:cTn id="13" presetID="1" presetClass="entr" presetSubtype="0" fill="hold" nodeType="clickEffect">
+                                  <p:stCondLst>
+                                    <p:cond delay="0"/>
+                                  </p:stCondLst>
+                                  <p:childTnLst>
+                                    <p:set>
+                                      <p:cBhvr>
+                                        <p:cTn id="14" dur="1" fill="hold">
+                                          <p:stCondLst>
+                                            <p:cond delay="0"/>
+                                          </p:stCondLst>
+                                        </p:cTn>
+                                        <p:tgtEl>
+                                          <p:spTgt spid="4">
+                                            <p:txEl>
+                                              <p:pRg st="2" end="2"/>
+                                            </p:txEl>
+                                          </p:spTgt>
+                                        </p:tgtEl>
+                                        <p:attrNameLst>
+                                          <p:attrName>style.visibility</p:attrName>
+                                        </p:attrNameLst>
+                                      </p:cBhvr>
+                                      <p:to>
+                                        <p:strVal val="visible"/>
+                                      </p:to>
+                                    </p:set>
+                                  </p:childTnLst>
+                                </p:cTn>
+                              </p:par>
+                            </p:childTnLst>
+                          </p:cTn>
+                        </p:par>
+                      </p:childTnLst>
+                    </p:cTn>
+                  </p:par>
+                  <p:par>
+                    <p:cTn id="15" fill="hold">
+                      <p:stCondLst>
+                        <p:cond delay="indefinite"/>
+                      </p:stCondLst>
+                      <p:childTnLst>
+                        <p:par>
+                          <p:cTn id="16" fill="hold">
+                            <p:stCondLst>
+                              <p:cond delay="0"/>
+                            </p:stCondLst>
+                            <p:childTnLst>
+                              <p:par>
+                                <p:cTn id="17" presetID="1" presetClass="entr" presetSubtype="0" fill="hold" nodeType="clickEffect">
+                                  <p:stCondLst>
+                                    <p:cond delay="0"/>
+                                  </p:stCondLst>
+                                  <p:childTnLst>
+                                    <p:set>
+                                      <p:cBhvr>
+                                        <p:cTn id="18" dur="1" fill="hold">
+                                          <p:stCondLst>
+                                            <p:cond delay="0"/>
+                                          </p:stCondLst>
+                                        </p:cTn>
+                                        <p:tgtEl>
+                                          <p:spTgt spid="4">
+                                            <p:txEl>
+                                              <p:pRg st="3" end="3"/>
+                                            </p:txEl>
+                                          </p:spTgt>
+                                        </p:tgtEl>
+                                        <p:attrNameLst>
+                                          <p:attrName>style.visibility</p:attrName>
+                                        </p:attrNameLst>
+                                      </p:cBhvr>
+                                      <p:to>
+                                        <p:strVal val="visible"/>
+                                      </p:to>
+                                    </p:set>
+                                  </p:childTnLst>
+                                </p:cTn>
+                              </p:par>
+                            </p:childTnLst>
+                          </p:cTn>
+                        </p:par>
+                      </p:childTnLst>
+                    </p:cTn>
+                  </p:par>
+                  <p:par>
+                    <p:cTn id="19" fill="hold">
+                      <p:stCondLst>
+                        <p:cond delay="indefinite"/>
+                      </p:stCondLst>
+                      <p:childTnLst>
+                        <p:par>
+                          <p:cTn id="20" fill="hold">
+                            <p:stCondLst>
+                              <p:cond delay="0"/>
+                            </p:stCondLst>
+                            <p:childTnLst>
+                              <p:par>
+                                <p:cTn id="21" presetID="1" presetClass="entr" presetSubtype="0" fill="hold" nodeType="clickEffect">
+                                  <p:stCondLst>
+                                    <p:cond delay="0"/>
+                                  </p:stCondLst>
+                                  <p:childTnLst>
+                                    <p:set>
+                                      <p:cBhvr>
+                                        <p:cTn id="22" dur="1" fill="hold">
+                                          <p:stCondLst>
+                                            <p:cond delay="0"/>
+                                          </p:stCondLst>
+                                        </p:cTn>
+                                        <p:tgtEl>
+                                          <p:spTgt spid="4">
+                                            <p:txEl>
+                                              <p:pRg st="4" end="4"/>
+                                            </p:txEl>
+                                          </p:spTgt>
+                                        </p:tgtEl>
+                                        <p:attrNameLst>
+                                          <p:attrName>style.visibility</p:attrName>
+                                        </p:attrNameLst>
+                                      </p:cBhvr>
+                                      <p:to>
+                                        <p:strVal val="visible"/>
+                                      </p:to>
+                                    </p:set>
+                                  </p:childTnLst>
+                                </p:cTn>
+                              </p:par>
+                            </p:childTnLst>
+                          </p:cTn>
+                        </p:par>
+                      </p:childTnLst>
+                    </p:cTn>
+                  </p:par>
+                  <p:par>
+                    <p:cTn id="23" fill="hold">
+                      <p:stCondLst>
+                        <p:cond delay="indefinite"/>
+                      </p:stCondLst>
+                      <p:childTnLst>
+                        <p:par>
+                          <p:cTn id="24" fill="hold">
+                            <p:stCondLst>
+                              <p:cond delay="0"/>
+                            </p:stCondLst>
+                            <p:childTnLst>
+                              <p:par>
+                                <p:cTn id="25" presetID="1" presetClass="entr" presetSubtype="0" fill="hold" nodeType="clickEffect">
+                                  <p:stCondLst>
+                                    <p:cond delay="0"/>
+                                  </p:stCondLst>
+                                  <p:childTnLst>
+                                    <p:set>
+                                      <p:cBhvr>
+                                        <p:cTn id="26" dur="1" fill="hold">
+                                          <p:stCondLst>
+                                            <p:cond delay="0"/>
+                                          </p:stCondLst>
+                                        </p:cTn>
+                                        <p:tgtEl>
+                                          <p:spTgt spid="4">
+                                            <p:txEl>
+                                              <p:pRg st="5" end="5"/>
+                                            </p:txEl>
+                                          </p:spTgt>
+                                        </p:tgtEl>
+                                        <p:attrNameLst>
+                                          <p:attrName>style.visibility</p:attrName>
+                                        </p:attrNameLst>
+                                      </p:cBhvr>
+                                      <p:to>
+                                        <p:strVal val="visible"/>
+                                      </p:to>
+                                    </p:set>
+                                  </p:childTnLst>
+                                </p:cTn>
+                              </p:par>
+                            </p:childTnLst>
+                          </p:cTn>
+                        </p:par>
+                      </p:childTnLst>
+                    </p:cTn>
+                  </p:par>
+                  <p:par>
+                    <p:cTn id="27" fill="hold">
+                      <p:stCondLst>
+                        <p:cond delay="indefinite"/>
+                      </p:stCondLst>
+                      <p:childTnLst>
+                        <p:par>
+                          <p:cTn id="28" fill="hold">
+                            <p:stCondLst>
+                              <p:cond delay="0"/>
+                            </p:stCondLst>
+                            <p:childTnLst>
+                              <p:par>
+                                <p:cTn id="29" presetID="1" presetClass="entr" presetSubtype="0" fill="hold" nodeType="clickEffect">
+                                  <p:stCondLst>
+                                    <p:cond delay="0"/>
+                                  </p:stCondLst>
+                                  <p:childTnLst>
+                                    <p:set>
+                                      <p:cBhvr>
+                                        <p:cTn id="30" dur="1" fill="hold">
+                                          <p:stCondLst>
+                                            <p:cond delay="0"/>
+                                          </p:stCondLst>
+                                        </p:cTn>
+                                        <p:tgtEl>
+                                          <p:spTgt spid="4">
+                                            <p:txEl>
+                                              <p:pRg st="7" end="7"/>
                                             </p:txEl>
                                           </p:spTgt>
                                         </p:tgtEl>

</xml_diff>